<commit_message>
dodano slajdy do prezentacji
</commit_message>
<xml_diff>
--- a/Implementacja kodu wielomianowego CRC-32 – IEEE 802-3.pptx
+++ b/Implementacja kodu wielomianowego CRC-32 – IEEE 802-3.pptx
@@ -5,10 +5,10 @@
     <p:sldMasterId id="2147483684" r:id="rId4"/>
   </p:sldMasterIdLst>
   <p:notesMasterIdLst>
-    <p:notesMasterId r:id="rId20"/>
+    <p:notesMasterId r:id="rId21"/>
   </p:notesMasterIdLst>
   <p:handoutMasterIdLst>
-    <p:handoutMasterId r:id="rId21"/>
+    <p:handoutMasterId r:id="rId22"/>
   </p:handoutMasterIdLst>
   <p:sldIdLst>
     <p:sldId id="317" r:id="rId5"/>
@@ -16,16 +16,17 @@
     <p:sldId id="389" r:id="rId7"/>
     <p:sldId id="392" r:id="rId8"/>
     <p:sldId id="393" r:id="rId9"/>
-    <p:sldId id="394" r:id="rId10"/>
-    <p:sldId id="277" r:id="rId11"/>
-    <p:sldId id="384" r:id="rId12"/>
-    <p:sldId id="279" r:id="rId13"/>
-    <p:sldId id="268" r:id="rId14"/>
-    <p:sldId id="272" r:id="rId15"/>
-    <p:sldId id="270" r:id="rId16"/>
-    <p:sldId id="281" r:id="rId17"/>
-    <p:sldId id="321" r:id="rId18"/>
-    <p:sldId id="391" r:id="rId19"/>
+    <p:sldId id="395" r:id="rId10"/>
+    <p:sldId id="396" r:id="rId11"/>
+    <p:sldId id="394" r:id="rId12"/>
+    <p:sldId id="277" r:id="rId13"/>
+    <p:sldId id="279" r:id="rId14"/>
+    <p:sldId id="268" r:id="rId15"/>
+    <p:sldId id="272" r:id="rId16"/>
+    <p:sldId id="270" r:id="rId17"/>
+    <p:sldId id="281" r:id="rId18"/>
+    <p:sldId id="321" r:id="rId19"/>
+    <p:sldId id="391" r:id="rId20"/>
   </p:sldIdLst>
   <p:sldSz cx="12192000" cy="6858000"/>
   <p:notesSz cx="6858000" cy="9144000"/>
@@ -5298,7 +5299,7 @@
             <a:pPr rtl="0"/>
             <a:fld id="{1983A999-5E0E-42CA-8400-604AE921FF7C}" type="slidenum">
               <a:rPr lang="pl-PL" smtClean="0"/>
-              <a:t>8</a:t>
+              <a:t>11</a:t>
             </a:fld>
             <a:endParaRPr lang="pl-PL"/>
           </a:p>
@@ -5309,7 +5310,7 @@
           <p:cNvPr id="5" name="Symbol zastępczy daty 4">
             <a:extLst>
               <a:ext uri="{FF2B5EF4-FFF2-40B4-BE49-F238E27FC236}">
-                <a16:creationId xmlns:a16="http://schemas.microsoft.com/office/drawing/2014/main" id="{9B290639-4E92-4ED8-8D96-471111637F13}"/>
+                <a16:creationId xmlns:a16="http://schemas.microsoft.com/office/drawing/2014/main" id="{E233BE3D-D76F-4FC3-90DD-076CC61266C6}"/>
               </a:ext>
             </a:extLst>
           </p:cNvPr>
@@ -5326,7 +5327,7 @@
           <a:lstStyle/>
           <a:p>
             <a:pPr rtl="0"/>
-            <a:fld id="{725DCC78-8463-444F-A0CF-2EABB296C18C}" type="datetime1">
+            <a:fld id="{0A1D9C8C-C657-40A7-B3BC-81AB0E04CBBF}" type="datetime1">
               <a:rPr lang="pl-PL" smtClean="0"/>
               <a:t>01.06.2025</a:t>
             </a:fld>
@@ -5337,7 +5338,7 @@
     </p:spTree>
     <p:extLst>
       <p:ext uri="{BB962C8B-B14F-4D97-AF65-F5344CB8AC3E}">
-        <p14:creationId xmlns:p14="http://schemas.microsoft.com/office/powerpoint/2010/main" val="2100331255"/>
+        <p14:creationId xmlns:p14="http://schemas.microsoft.com/office/powerpoint/2010/main" val="396330408"/>
       </p:ext>
     </p:extLst>
   </p:cSld>
@@ -5392,7 +5393,7 @@
           <a:lstStyle/>
           <a:p>
             <a:pPr rtl="0"/>
-            <a:endParaRPr lang="pl-PL" dirty="0"/>
+            <a:endParaRPr lang="pl-PL"/>
           </a:p>
         </p:txBody>
       </p:sp>
@@ -5403,7 +5404,7 @@
             <a:spLocks noGrp="1"/>
           </p:cNvSpPr>
           <p:nvPr>
-            <p:ph type="sldNum" sz="quarter" idx="5"/>
+            <p:ph type="sldNum" sz="quarter" idx="10"/>
           </p:nvPr>
         </p:nvSpPr>
         <p:spPr/>
@@ -5412,9 +5413,9 @@
           <a:lstStyle/>
           <a:p>
             <a:pPr rtl="0"/>
-            <a:fld id="{1983A999-5E0E-42CA-8400-604AE921FF7C}" type="slidenum">
+            <a:fld id="{32DC0559-D619-4E56-BF6F-3712370C2150}" type="slidenum">
               <a:rPr lang="pl-PL" smtClean="0"/>
-              <a:t>10</a:t>
+              <a:t>12</a:t>
             </a:fld>
             <a:endParaRPr lang="pl-PL"/>
           </a:p>
@@ -5425,7 +5426,7 @@
           <p:cNvPr id="5" name="Symbol zastępczy daty 4">
             <a:extLst>
               <a:ext uri="{FF2B5EF4-FFF2-40B4-BE49-F238E27FC236}">
-                <a16:creationId xmlns:a16="http://schemas.microsoft.com/office/drawing/2014/main" id="{E233BE3D-D76F-4FC3-90DD-076CC61266C6}"/>
+                <a16:creationId xmlns:a16="http://schemas.microsoft.com/office/drawing/2014/main" id="{53161216-F533-408B-AC3D-C1534949BCE4}"/>
               </a:ext>
             </a:extLst>
           </p:cNvPr>
@@ -5442,7 +5443,7 @@
           <a:lstStyle/>
           <a:p>
             <a:pPr rtl="0"/>
-            <a:fld id="{0A1D9C8C-C657-40A7-B3BC-81AB0E04CBBF}" type="datetime1">
+            <a:fld id="{23B35D52-2BE3-474F-A65D-1C57A1E9C8EA}" type="datetime1">
               <a:rPr lang="pl-PL" smtClean="0"/>
               <a:t>01.06.2025</a:t>
             </a:fld>
@@ -5453,7 +5454,7 @@
     </p:spTree>
     <p:extLst>
       <p:ext uri="{BB962C8B-B14F-4D97-AF65-F5344CB8AC3E}">
-        <p14:creationId xmlns:p14="http://schemas.microsoft.com/office/powerpoint/2010/main" val="396330408"/>
+        <p14:creationId xmlns:p14="http://schemas.microsoft.com/office/powerpoint/2010/main" val="514541281"/>
       </p:ext>
     </p:extLst>
   </p:cSld>
@@ -5508,7 +5509,7 @@
           <a:lstStyle/>
           <a:p>
             <a:pPr rtl="0"/>
-            <a:endParaRPr lang="pl-PL"/>
+            <a:endParaRPr lang="pl-PL" dirty="0"/>
           </a:p>
         </p:txBody>
       </p:sp>
@@ -5519,7 +5520,7 @@
             <a:spLocks noGrp="1"/>
           </p:cNvSpPr>
           <p:nvPr>
-            <p:ph type="sldNum" sz="quarter" idx="10"/>
+            <p:ph type="sldNum" sz="quarter" idx="5"/>
           </p:nvPr>
         </p:nvSpPr>
         <p:spPr/>
@@ -5528,9 +5529,9 @@
           <a:lstStyle/>
           <a:p>
             <a:pPr rtl="0"/>
-            <a:fld id="{32DC0559-D619-4E56-BF6F-3712370C2150}" type="slidenum">
+            <a:fld id="{1983A999-5E0E-42CA-8400-604AE921FF7C}" type="slidenum">
               <a:rPr lang="pl-PL" smtClean="0"/>
-              <a:t>11</a:t>
+              <a:t>13</a:t>
             </a:fld>
             <a:endParaRPr lang="pl-PL"/>
           </a:p>
@@ -5541,7 +5542,7 @@
           <p:cNvPr id="5" name="Symbol zastępczy daty 4">
             <a:extLst>
               <a:ext uri="{FF2B5EF4-FFF2-40B4-BE49-F238E27FC236}">
-                <a16:creationId xmlns:a16="http://schemas.microsoft.com/office/drawing/2014/main" id="{53161216-F533-408B-AC3D-C1534949BCE4}"/>
+                <a16:creationId xmlns:a16="http://schemas.microsoft.com/office/drawing/2014/main" id="{96F04566-63C4-4E04-95F6-F236912A2F8F}"/>
               </a:ext>
             </a:extLst>
           </p:cNvPr>
@@ -5558,7 +5559,7 @@
           <a:lstStyle/>
           <a:p>
             <a:pPr rtl="0"/>
-            <a:fld id="{23B35D52-2BE3-474F-A65D-1C57A1E9C8EA}" type="datetime1">
+            <a:fld id="{349161C6-02E6-4A51-9612-82E8932FCFC9}" type="datetime1">
               <a:rPr lang="pl-PL" smtClean="0"/>
               <a:t>01.06.2025</a:t>
             </a:fld>
@@ -5569,7 +5570,7 @@
     </p:spTree>
     <p:extLst>
       <p:ext uri="{BB962C8B-B14F-4D97-AF65-F5344CB8AC3E}">
-        <p14:creationId xmlns:p14="http://schemas.microsoft.com/office/powerpoint/2010/main" val="514541281"/>
+        <p14:creationId xmlns:p14="http://schemas.microsoft.com/office/powerpoint/2010/main" val="404304175"/>
       </p:ext>
     </p:extLst>
   </p:cSld>
@@ -5580,6 +5581,121 @@
 </file>
 
 <file path=ppt/notesSlides/notesSlide5.xml><?xml version="1.0" encoding="utf-8"?>
+<p:notes xmlns:a="http://schemas.openxmlformats.org/drawingml/2006/main" xmlns:r="http://schemas.openxmlformats.org/officeDocument/2006/relationships" xmlns:p="http://schemas.openxmlformats.org/presentationml/2006/main">
+  <p:cSld>
+    <p:spTree>
+      <p:nvGrpSpPr>
+        <p:cNvPr id="1" name=""/>
+        <p:cNvGrpSpPr/>
+        <p:nvPr/>
+      </p:nvGrpSpPr>
+      <p:grpSpPr>
+        <a:xfrm>
+          <a:off x="0" y="0"/>
+          <a:ext cx="0" cy="0"/>
+          <a:chOff x="0" y="0"/>
+          <a:chExt cx="0" cy="0"/>
+        </a:xfrm>
+      </p:grpSpPr>
+      <p:sp>
+        <p:nvSpPr>
+          <p:cNvPr id="2" name="Symbol zastępczy obrazu slajdu 1"/>
+          <p:cNvSpPr>
+            <a:spLocks noGrp="1" noRot="1" noChangeAspect="1"/>
+          </p:cNvSpPr>
+          <p:nvPr>
+            <p:ph type="sldImg"/>
+          </p:nvPr>
+        </p:nvSpPr>
+        <p:spPr/>
+      </p:sp>
+      <p:sp>
+        <p:nvSpPr>
+          <p:cNvPr id="3" name="Symbol zastępczy notatek 2"/>
+          <p:cNvSpPr>
+            <a:spLocks noGrp="1"/>
+          </p:cNvSpPr>
+          <p:nvPr>
+            <p:ph type="body" idx="1"/>
+          </p:nvPr>
+        </p:nvSpPr>
+        <p:spPr/>
+        <p:txBody>
+          <a:bodyPr/>
+          <a:lstStyle/>
+          <a:p>
+            <a:endParaRPr lang="pl-PL" dirty="0"/>
+          </a:p>
+        </p:txBody>
+      </p:sp>
+      <p:sp>
+        <p:nvSpPr>
+          <p:cNvPr id="4" name="Symbol zastępczy numeru slajdu 3"/>
+          <p:cNvSpPr>
+            <a:spLocks noGrp="1"/>
+          </p:cNvSpPr>
+          <p:nvPr>
+            <p:ph type="sldNum" sz="quarter" idx="5"/>
+          </p:nvPr>
+        </p:nvSpPr>
+        <p:spPr/>
+        <p:txBody>
+          <a:bodyPr/>
+          <a:lstStyle/>
+          <a:p>
+            <a:pPr rtl="0"/>
+            <a:fld id="{E7CCE34D-CFF1-4FFE-815B-D050E7ED2DFD}" type="slidenum">
+              <a:rPr lang="pl-PL" smtClean="0"/>
+              <a:t>14</a:t>
+            </a:fld>
+            <a:endParaRPr lang="pl-PL"/>
+          </a:p>
+        </p:txBody>
+      </p:sp>
+      <p:sp>
+        <p:nvSpPr>
+          <p:cNvPr id="5" name="Symbol zastępczy daty 4">
+            <a:extLst>
+              <a:ext uri="{FF2B5EF4-FFF2-40B4-BE49-F238E27FC236}">
+                <a16:creationId xmlns:a16="http://schemas.microsoft.com/office/drawing/2014/main" id="{E4891A17-6249-461C-B075-652AEA2598D9}"/>
+              </a:ext>
+            </a:extLst>
+          </p:cNvPr>
+          <p:cNvSpPr>
+            <a:spLocks noGrp="1"/>
+          </p:cNvSpPr>
+          <p:nvPr>
+            <p:ph type="dt" idx="1"/>
+          </p:nvPr>
+        </p:nvSpPr>
+        <p:spPr/>
+        <p:txBody>
+          <a:bodyPr/>
+          <a:lstStyle/>
+          <a:p>
+            <a:pPr rtl="0"/>
+            <a:fld id="{0CE26397-7EB8-4E6D-9388-C37617315B24}" type="datetime1">
+              <a:rPr lang="pl-PL" smtClean="0"/>
+              <a:t>01.06.2025</a:t>
+            </a:fld>
+            <a:endParaRPr lang="pl-PL"/>
+          </a:p>
+        </p:txBody>
+      </p:sp>
+    </p:spTree>
+    <p:extLst>
+      <p:ext uri="{BB962C8B-B14F-4D97-AF65-F5344CB8AC3E}">
+        <p14:creationId xmlns:p14="http://schemas.microsoft.com/office/powerpoint/2010/main" val="438094687"/>
+      </p:ext>
+    </p:extLst>
+  </p:cSld>
+  <p:clrMapOvr>
+    <a:masterClrMapping/>
+  </p:clrMapOvr>
+</p:notes>
+</file>
+
+<file path=ppt/notesSlides/notesSlide6.xml><?xml version="1.0" encoding="utf-8"?>
 <p:notes xmlns:a="http://schemas.openxmlformats.org/drawingml/2006/main" xmlns:r="http://schemas.openxmlformats.org/officeDocument/2006/relationships" xmlns:p="http://schemas.openxmlformats.org/presentationml/2006/main">
   <p:cSld>
     <p:spTree>
@@ -5646,238 +5762,7 @@
             <a:pPr rtl="0"/>
             <a:fld id="{1983A999-5E0E-42CA-8400-604AE921FF7C}" type="slidenum">
               <a:rPr lang="pl-PL" smtClean="0"/>
-              <a:t>12</a:t>
-            </a:fld>
-            <a:endParaRPr lang="pl-PL"/>
-          </a:p>
-        </p:txBody>
-      </p:sp>
-      <p:sp>
-        <p:nvSpPr>
-          <p:cNvPr id="5" name="Symbol zastępczy daty 4">
-            <a:extLst>
-              <a:ext uri="{FF2B5EF4-FFF2-40B4-BE49-F238E27FC236}">
-                <a16:creationId xmlns:a16="http://schemas.microsoft.com/office/drawing/2014/main" id="{96F04566-63C4-4E04-95F6-F236912A2F8F}"/>
-              </a:ext>
-            </a:extLst>
-          </p:cNvPr>
-          <p:cNvSpPr>
-            <a:spLocks noGrp="1"/>
-          </p:cNvSpPr>
-          <p:nvPr>
-            <p:ph type="dt" idx="1"/>
-          </p:nvPr>
-        </p:nvSpPr>
-        <p:spPr/>
-        <p:txBody>
-          <a:bodyPr/>
-          <a:lstStyle/>
-          <a:p>
-            <a:pPr rtl="0"/>
-            <a:fld id="{349161C6-02E6-4A51-9612-82E8932FCFC9}" type="datetime1">
-              <a:rPr lang="pl-PL" smtClean="0"/>
-              <a:t>01.06.2025</a:t>
-            </a:fld>
-            <a:endParaRPr lang="pl-PL"/>
-          </a:p>
-        </p:txBody>
-      </p:sp>
-    </p:spTree>
-    <p:extLst>
-      <p:ext uri="{BB962C8B-B14F-4D97-AF65-F5344CB8AC3E}">
-        <p14:creationId xmlns:p14="http://schemas.microsoft.com/office/powerpoint/2010/main" val="404304175"/>
-      </p:ext>
-    </p:extLst>
-  </p:cSld>
-  <p:clrMapOvr>
-    <a:masterClrMapping/>
-  </p:clrMapOvr>
-</p:notes>
-</file>
-
-<file path=ppt/notesSlides/notesSlide6.xml><?xml version="1.0" encoding="utf-8"?>
-<p:notes xmlns:a="http://schemas.openxmlformats.org/drawingml/2006/main" xmlns:r="http://schemas.openxmlformats.org/officeDocument/2006/relationships" xmlns:p="http://schemas.openxmlformats.org/presentationml/2006/main">
-  <p:cSld>
-    <p:spTree>
-      <p:nvGrpSpPr>
-        <p:cNvPr id="1" name=""/>
-        <p:cNvGrpSpPr/>
-        <p:nvPr/>
-      </p:nvGrpSpPr>
-      <p:grpSpPr>
-        <a:xfrm>
-          <a:off x="0" y="0"/>
-          <a:ext cx="0" cy="0"/>
-          <a:chOff x="0" y="0"/>
-          <a:chExt cx="0" cy="0"/>
-        </a:xfrm>
-      </p:grpSpPr>
-      <p:sp>
-        <p:nvSpPr>
-          <p:cNvPr id="2" name="Symbol zastępczy obrazu slajdu 1"/>
-          <p:cNvSpPr>
-            <a:spLocks noGrp="1" noRot="1" noChangeAspect="1"/>
-          </p:cNvSpPr>
-          <p:nvPr>
-            <p:ph type="sldImg"/>
-          </p:nvPr>
-        </p:nvSpPr>
-        <p:spPr/>
-      </p:sp>
-      <p:sp>
-        <p:nvSpPr>
-          <p:cNvPr id="3" name="Symbol zastępczy notatek 2"/>
-          <p:cNvSpPr>
-            <a:spLocks noGrp="1"/>
-          </p:cNvSpPr>
-          <p:nvPr>
-            <p:ph type="body" idx="1"/>
-          </p:nvPr>
-        </p:nvSpPr>
-        <p:spPr/>
-        <p:txBody>
-          <a:bodyPr/>
-          <a:lstStyle/>
-          <a:p>
-            <a:endParaRPr lang="pl-PL" dirty="0"/>
-          </a:p>
-        </p:txBody>
-      </p:sp>
-      <p:sp>
-        <p:nvSpPr>
-          <p:cNvPr id="4" name="Symbol zastępczy numeru slajdu 3"/>
-          <p:cNvSpPr>
-            <a:spLocks noGrp="1"/>
-          </p:cNvSpPr>
-          <p:nvPr>
-            <p:ph type="sldNum" sz="quarter" idx="5"/>
-          </p:nvPr>
-        </p:nvSpPr>
-        <p:spPr/>
-        <p:txBody>
-          <a:bodyPr/>
-          <a:lstStyle/>
-          <a:p>
-            <a:pPr rtl="0"/>
-            <a:fld id="{E7CCE34D-CFF1-4FFE-815B-D050E7ED2DFD}" type="slidenum">
-              <a:rPr lang="pl-PL" smtClean="0"/>
-              <a:t>13</a:t>
-            </a:fld>
-            <a:endParaRPr lang="pl-PL"/>
-          </a:p>
-        </p:txBody>
-      </p:sp>
-      <p:sp>
-        <p:nvSpPr>
-          <p:cNvPr id="5" name="Symbol zastępczy daty 4">
-            <a:extLst>
-              <a:ext uri="{FF2B5EF4-FFF2-40B4-BE49-F238E27FC236}">
-                <a16:creationId xmlns:a16="http://schemas.microsoft.com/office/drawing/2014/main" id="{E4891A17-6249-461C-B075-652AEA2598D9}"/>
-              </a:ext>
-            </a:extLst>
-          </p:cNvPr>
-          <p:cNvSpPr>
-            <a:spLocks noGrp="1"/>
-          </p:cNvSpPr>
-          <p:nvPr>
-            <p:ph type="dt" idx="1"/>
-          </p:nvPr>
-        </p:nvSpPr>
-        <p:spPr/>
-        <p:txBody>
-          <a:bodyPr/>
-          <a:lstStyle/>
-          <a:p>
-            <a:pPr rtl="0"/>
-            <a:fld id="{0CE26397-7EB8-4E6D-9388-C37617315B24}" type="datetime1">
-              <a:rPr lang="pl-PL" smtClean="0"/>
-              <a:t>01.06.2025</a:t>
-            </a:fld>
-            <a:endParaRPr lang="pl-PL"/>
-          </a:p>
-        </p:txBody>
-      </p:sp>
-    </p:spTree>
-    <p:extLst>
-      <p:ext uri="{BB962C8B-B14F-4D97-AF65-F5344CB8AC3E}">
-        <p14:creationId xmlns:p14="http://schemas.microsoft.com/office/powerpoint/2010/main" val="438094687"/>
-      </p:ext>
-    </p:extLst>
-  </p:cSld>
-  <p:clrMapOvr>
-    <a:masterClrMapping/>
-  </p:clrMapOvr>
-</p:notes>
-</file>
-
-<file path=ppt/notesSlides/notesSlide7.xml><?xml version="1.0" encoding="utf-8"?>
-<p:notes xmlns:a="http://schemas.openxmlformats.org/drawingml/2006/main" xmlns:r="http://schemas.openxmlformats.org/officeDocument/2006/relationships" xmlns:p="http://schemas.openxmlformats.org/presentationml/2006/main">
-  <p:cSld>
-    <p:spTree>
-      <p:nvGrpSpPr>
-        <p:cNvPr id="1" name=""/>
-        <p:cNvGrpSpPr/>
-        <p:nvPr/>
-      </p:nvGrpSpPr>
-      <p:grpSpPr>
-        <a:xfrm>
-          <a:off x="0" y="0"/>
-          <a:ext cx="0" cy="0"/>
-          <a:chOff x="0" y="0"/>
-          <a:chExt cx="0" cy="0"/>
-        </a:xfrm>
-      </p:grpSpPr>
-      <p:sp>
-        <p:nvSpPr>
-          <p:cNvPr id="2" name="Obraz slajdu — symbol zastępczy 1"/>
-          <p:cNvSpPr>
-            <a:spLocks noGrp="1" noRot="1" noChangeAspect="1"/>
-          </p:cNvSpPr>
-          <p:nvPr>
-            <p:ph type="sldImg"/>
-          </p:nvPr>
-        </p:nvSpPr>
-        <p:spPr/>
-      </p:sp>
-      <p:sp>
-        <p:nvSpPr>
-          <p:cNvPr id="3" name="Notatki — symbol zastępczy 2"/>
-          <p:cNvSpPr>
-            <a:spLocks noGrp="1"/>
-          </p:cNvSpPr>
-          <p:nvPr>
-            <p:ph type="body" idx="1"/>
-          </p:nvPr>
-        </p:nvSpPr>
-        <p:spPr/>
-        <p:txBody>
-          <a:bodyPr rtlCol="0"/>
-          <a:lstStyle/>
-          <a:p>
-            <a:pPr rtl="0"/>
-            <a:endParaRPr lang="pl-PL" dirty="0"/>
-          </a:p>
-        </p:txBody>
-      </p:sp>
-      <p:sp>
-        <p:nvSpPr>
-          <p:cNvPr id="4" name="Numer slajdu — symbol zastępczy 3"/>
-          <p:cNvSpPr>
-            <a:spLocks noGrp="1"/>
-          </p:cNvSpPr>
-          <p:nvPr>
-            <p:ph type="sldNum" sz="quarter" idx="5"/>
-          </p:nvPr>
-        </p:nvSpPr>
-        <p:spPr/>
-        <p:txBody>
-          <a:bodyPr rtlCol="0"/>
-          <a:lstStyle/>
-          <a:p>
-            <a:pPr rtl="0"/>
-            <a:fld id="{1983A999-5E0E-42CA-8400-604AE921FF7C}" type="slidenum">
-              <a:rPr lang="pl-PL" smtClean="0"/>
-              <a:t>14</a:t>
+              <a:t>15</a:t>
             </a:fld>
             <a:endParaRPr lang="pl-PL"/>
           </a:p>
@@ -19266,6 +19151,113 @@
       </p:grpSpPr>
       <p:sp>
         <p:nvSpPr>
+          <p:cNvPr id="21" name="Numer slajdu — symbol zastępczy 20">
+            <a:extLst>
+              <a:ext uri="{FF2B5EF4-FFF2-40B4-BE49-F238E27FC236}">
+                <a16:creationId xmlns:a16="http://schemas.microsoft.com/office/drawing/2014/main" id="{1C563B34-DD53-4FB1-B8C2-8914E01C6365}"/>
+              </a:ext>
+            </a:extLst>
+          </p:cNvPr>
+          <p:cNvSpPr>
+            <a:spLocks noGrp="1"/>
+          </p:cNvSpPr>
+          <p:nvPr>
+            <p:ph type="sldNum" sz="quarter" idx="12"/>
+          </p:nvPr>
+        </p:nvSpPr>
+        <p:spPr>
+          <a:xfrm>
+            <a:off x="9948863" y="6507212"/>
+            <a:ext cx="1692274" cy="153888"/>
+          </a:xfrm>
+        </p:spPr>
+        <p:txBody>
+          <a:bodyPr rtlCol="0"/>
+          <a:lstStyle/>
+          <a:p>
+            <a:pPr rtl="0"/>
+            <a:fld id="{DBA1B0FB-D917-4C8C-928F-313BD683BF39}" type="slidenum">
+              <a:rPr lang="pl-PL" smtClean="0"/>
+              <a:pPr rtl="0"/>
+              <a:t>10</a:t>
+            </a:fld>
+            <a:endParaRPr lang="pl-PL"/>
+          </a:p>
+        </p:txBody>
+      </p:sp>
+      <p:sp>
+        <p:nvSpPr>
+          <p:cNvPr id="5" name="Symbol zastępczy zawartości 4">
+            <a:extLst>
+              <a:ext uri="{FF2B5EF4-FFF2-40B4-BE49-F238E27FC236}">
+                <a16:creationId xmlns:a16="http://schemas.microsoft.com/office/drawing/2014/main" id="{7148E578-9F75-6F03-CDDA-52AA93C2811F}"/>
+              </a:ext>
+            </a:extLst>
+          </p:cNvPr>
+          <p:cNvSpPr>
+            <a:spLocks noGrp="1"/>
+          </p:cNvSpPr>
+          <p:nvPr>
+            <p:ph sz="quarter" idx="15"/>
+          </p:nvPr>
+        </p:nvSpPr>
+        <p:spPr>
+          <a:xfrm>
+            <a:off x="550863" y="196901"/>
+            <a:ext cx="11090274" cy="5991464"/>
+          </a:xfrm>
+        </p:spPr>
+        <p:txBody>
+          <a:bodyPr/>
+          <a:lstStyle/>
+          <a:p>
+            <a:pPr marL="285750" indent="-285750">
+              <a:buFont typeface="Arial" panose="020B0604020202020204" pitchFamily="34" charset="0"/>
+              <a:buChar char="•"/>
+            </a:pPr>
+            <a:r>
+              <a:rPr lang="pl-PL" sz="1500" dirty="0"/>
+              <a:t>Błędy z nieparzystą liczbą bitów</a:t>
+            </a:r>
+            <a:br>
+              <a:rPr lang="pl-PL" sz="1500" dirty="0"/>
+            </a:br>
+            <a:endParaRPr lang="pl-PL" sz="1500" dirty="0"/>
+          </a:p>
+        </p:txBody>
+      </p:sp>
+    </p:spTree>
+    <p:extLst>
+      <p:ext uri="{BB962C8B-B14F-4D97-AF65-F5344CB8AC3E}">
+        <p14:creationId xmlns:p14="http://schemas.microsoft.com/office/powerpoint/2010/main" val="395518310"/>
+      </p:ext>
+    </p:extLst>
+  </p:cSld>
+  <p:clrMapOvr>
+    <a:masterClrMapping/>
+  </p:clrMapOvr>
+</p:sld>
+</file>
+
+<file path=ppt/slides/slide11.xml><?xml version="1.0" encoding="utf-8"?>
+<p:sld xmlns:a="http://schemas.openxmlformats.org/drawingml/2006/main" xmlns:r="http://schemas.openxmlformats.org/officeDocument/2006/relationships" xmlns:p="http://schemas.openxmlformats.org/presentationml/2006/main">
+  <p:cSld>
+    <p:spTree>
+      <p:nvGrpSpPr>
+        <p:cNvPr id="1" name=""/>
+        <p:cNvGrpSpPr/>
+        <p:nvPr/>
+      </p:nvGrpSpPr>
+      <p:grpSpPr>
+        <a:xfrm>
+          <a:off x="0" y="0"/>
+          <a:ext cx="0" cy="0"/>
+          <a:chOff x="0" y="0"/>
+          <a:chExt cx="0" cy="0"/>
+        </a:xfrm>
+      </p:grpSpPr>
+      <p:sp>
+        <p:nvSpPr>
           <p:cNvPr id="6" name="Tytuł 5">
             <a:extLst>
               <a:ext uri="{FF2B5EF4-FFF2-40B4-BE49-F238E27FC236}">
@@ -19805,7 +19797,7 @@
             <a:fld id="{DBA1B0FB-D917-4C8C-928F-313BD683BF39}" type="slidenum">
               <a:rPr lang="pl-PL" smtClean="0"/>
               <a:pPr rtl="0"/>
-              <a:t>10</a:t>
+              <a:t>11</a:t>
             </a:fld>
             <a:endParaRPr lang="pl-PL"/>
           </a:p>
@@ -19824,7 +19816,7 @@
 </p:sld>
 </file>
 
-<file path=ppt/slides/slide11.xml><?xml version="1.0" encoding="utf-8"?>
+<file path=ppt/slides/slide12.xml><?xml version="1.0" encoding="utf-8"?>
 <p:sld xmlns:a="http://schemas.openxmlformats.org/drawingml/2006/main" xmlns:r="http://schemas.openxmlformats.org/officeDocument/2006/relationships" xmlns:p="http://schemas.openxmlformats.org/presentationml/2006/main">
   <p:cSld>
     <p:spTree>
@@ -20005,7 +19997,7 @@
             <a:fld id="{DBA1B0FB-D917-4C8C-928F-313BD683BF39}" type="slidenum">
               <a:rPr lang="pl-PL" smtClean="0"/>
               <a:pPr rtl="0"/>
-              <a:t>11</a:t>
+              <a:t>12</a:t>
             </a:fld>
             <a:endParaRPr lang="pl-PL"/>
           </a:p>
@@ -20024,7 +20016,7 @@
 </p:sld>
 </file>
 
-<file path=ppt/slides/slide12.xml><?xml version="1.0" encoding="utf-8"?>
+<file path=ppt/slides/slide13.xml><?xml version="1.0" encoding="utf-8"?>
 <p:sld xmlns:a="http://schemas.openxmlformats.org/drawingml/2006/main" xmlns:r="http://schemas.openxmlformats.org/officeDocument/2006/relationships" xmlns:p="http://schemas.openxmlformats.org/presentationml/2006/main">
   <p:cSld>
     <p:spTree>
@@ -20468,21 +20460,21 @@
           <a:p>
             <a:pPr rtl="0"/>
             <a:r>
-              <a:rPr lang="pl-PL"/>
+              <a:rPr lang="pl-PL" dirty="0"/>
               <a:t>Dodaj tekst, obrazy, grafiki i klipy wideo. </a:t>
             </a:r>
           </a:p>
           <a:p>
             <a:pPr rtl="0"/>
             <a:r>
-              <a:rPr lang="pl-PL"/>
+              <a:rPr lang="pl-PL" dirty="0"/>
               <a:t>Dodaj przejścia, animacje i ruch. </a:t>
             </a:r>
           </a:p>
           <a:p>
             <a:pPr rtl="0"/>
             <a:r>
-              <a:rPr lang="pl-PL"/>
+              <a:rPr lang="pl-PL" dirty="0"/>
               <a:t>Zapisuj prezentacje w usłudze OneDrive, aby uzyskać do nich dostęp z komputera, tabletu lub telefonu. </a:t>
             </a:r>
           </a:p>
@@ -20666,7 +20658,7 @@
             <a:fld id="{DBA1B0FB-D917-4C8C-928F-313BD683BF39}" type="slidenum">
               <a:rPr lang="pl-PL" smtClean="0"/>
               <a:pPr rtl="0"/>
-              <a:t>12</a:t>
+              <a:t>13</a:t>
             </a:fld>
             <a:endParaRPr lang="pl-PL"/>
           </a:p>
@@ -20846,7 +20838,7 @@
 </p:sld>
 </file>
 
-<file path=ppt/slides/slide13.xml><?xml version="1.0" encoding="utf-8"?>
+<file path=ppt/slides/slide14.xml><?xml version="1.0" encoding="utf-8"?>
 <p:sld xmlns:a="http://schemas.openxmlformats.org/drawingml/2006/main" xmlns:r="http://schemas.openxmlformats.org/officeDocument/2006/relationships" xmlns:p="http://schemas.openxmlformats.org/presentationml/2006/main">
   <p:cSld>
     <p:spTree>
@@ -20955,44 +20947,9 @@
         </p:spPr>
         <p:txBody>
           <a:bodyPr rtlCol="0">
-            <a:normAutofit fontScale="92500" lnSpcReduction="10000"/>
+            <a:normAutofit/>
           </a:bodyPr>
           <a:lstStyle/>
-          <a:p>
-            <a:pPr lvl="0" rtl="0"/>
-            <a:r>
-              <a:rPr lang="pl-PL" sz="1600" dirty="0"/>
-              <a:t>Dodaj tekst, obrazy, grafiki i klipy wideo. </a:t>
-            </a:r>
-          </a:p>
-          <a:p>
-            <a:pPr lvl="0" rtl="0"/>
-            <a:r>
-              <a:rPr lang="pl-PL" sz="1600" dirty="0"/>
-              <a:t>Dodaj przejścia, animacje i ruch. </a:t>
-            </a:r>
-          </a:p>
-          <a:p>
-            <a:pPr lvl="0" rtl="0"/>
-            <a:r>
-              <a:rPr lang="pl-PL" sz="1600" dirty="0"/>
-              <a:t>Zapisuj prezentacje w usłudze OneDrive, aby uzyskać do nich dostęp z komputera, tabletu lub telefonu. </a:t>
-            </a:r>
-          </a:p>
-          <a:p>
-            <a:pPr rtl="0"/>
-            <a:r>
-              <a:rPr lang="pl-PL" sz="1600" dirty="0"/>
-              <a:t>Otwórz okienko Pomysły dotyczące projektu, aby korzystać z błyskawicznych przeobrażeń slajdów. </a:t>
-            </a:r>
-          </a:p>
-          <a:p>
-            <a:pPr rtl="0"/>
-            <a:r>
-              <a:rPr lang="pl-PL" sz="1600" dirty="0"/>
-              <a:t>W tym miejscu będziemy przedstawiać nasze pomysły projektowe. </a:t>
-            </a:r>
-          </a:p>
           <a:p>
             <a:pPr lvl="0" rtl="0"/>
             <a:endParaRPr lang="pl-PL" sz="1600" dirty="0"/>
@@ -21299,7 +21256,7 @@
             <a:fld id="{DBA1B0FB-D917-4C8C-928F-313BD683BF39}" type="slidenum">
               <a:rPr lang="pl-PL" smtClean="0"/>
               <a:pPr rtl="0"/>
-              <a:t>13</a:t>
+              <a:t>14</a:t>
             </a:fld>
             <a:endParaRPr lang="pl-PL"/>
           </a:p>
@@ -21309,207 +21266,6 @@
     <p:extLst>
       <p:ext uri="{BB962C8B-B14F-4D97-AF65-F5344CB8AC3E}">
         <p14:creationId xmlns:p14="http://schemas.microsoft.com/office/powerpoint/2010/main" val="1420547054"/>
-      </p:ext>
-    </p:extLst>
-  </p:cSld>
-  <p:clrMapOvr>
-    <a:masterClrMapping/>
-  </p:clrMapOvr>
-</p:sld>
-</file>
-
-<file path=ppt/slides/slide14.xml><?xml version="1.0" encoding="utf-8"?>
-<p:sld xmlns:a="http://schemas.openxmlformats.org/drawingml/2006/main" xmlns:r="http://schemas.openxmlformats.org/officeDocument/2006/relationships" xmlns:p="http://schemas.openxmlformats.org/presentationml/2006/main">
-  <p:cSld>
-    <p:spTree>
-      <p:nvGrpSpPr>
-        <p:cNvPr id="1" name=""/>
-        <p:cNvGrpSpPr/>
-        <p:nvPr/>
-      </p:nvGrpSpPr>
-      <p:grpSpPr>
-        <a:xfrm>
-          <a:off x="0" y="0"/>
-          <a:ext cx="0" cy="0"/>
-          <a:chOff x="0" y="0"/>
-          <a:chExt cx="0" cy="0"/>
-        </a:xfrm>
-      </p:grpSpPr>
-      <p:sp>
-        <p:nvSpPr>
-          <p:cNvPr id="11" name="Tytuł 10">
-            <a:extLst>
-              <a:ext uri="{FF2B5EF4-FFF2-40B4-BE49-F238E27FC236}">
-                <a16:creationId xmlns:a16="http://schemas.microsoft.com/office/drawing/2014/main" id="{581E8936-2270-47FE-94A4-398CB123EF90}"/>
-              </a:ext>
-            </a:extLst>
-          </p:cNvPr>
-          <p:cNvSpPr>
-            <a:spLocks noGrp="1"/>
-          </p:cNvSpPr>
-          <p:nvPr>
-            <p:ph type="title"/>
-          </p:nvPr>
-        </p:nvSpPr>
-        <p:spPr>
-          <a:xfrm>
-            <a:off x="550863" y="549275"/>
-            <a:ext cx="11090274" cy="1332000"/>
-          </a:xfrm>
-        </p:spPr>
-        <p:txBody>
-          <a:bodyPr wrap="square" rtlCol="0" anchor="t">
-            <a:normAutofit/>
-          </a:bodyPr>
-          <a:lstStyle/>
-          <a:p>
-            <a:pPr rtl="0"/>
-            <a:r>
-              <a:rPr lang="pl-PL" dirty="0"/>
-              <a:t>Bibliografia</a:t>
-            </a:r>
-          </a:p>
-        </p:txBody>
-      </p:sp>
-      <p:sp>
-        <p:nvSpPr>
-          <p:cNvPr id="13" name="Zawartość — symbol zastępczy 12">
-            <a:extLst>
-              <a:ext uri="{FF2B5EF4-FFF2-40B4-BE49-F238E27FC236}">
-                <a16:creationId xmlns:a16="http://schemas.microsoft.com/office/drawing/2014/main" id="{C0287FEC-3826-4868-8D93-52429C6156F5}"/>
-              </a:ext>
-            </a:extLst>
-          </p:cNvPr>
-          <p:cNvSpPr>
-            <a:spLocks noGrp="1"/>
-          </p:cNvSpPr>
-          <p:nvPr>
-            <p:ph sz="half" idx="1"/>
-          </p:nvPr>
-        </p:nvSpPr>
-        <p:spPr>
-          <a:xfrm>
-            <a:off x="550862" y="2097175"/>
-            <a:ext cx="5435600" cy="3995650"/>
-          </a:xfrm>
-        </p:spPr>
-        <p:txBody>
-          <a:bodyPr wrap="square" rtlCol="0">
-            <a:normAutofit/>
-          </a:bodyPr>
-          <a:lstStyle/>
-          <a:p>
-            <a:pPr rtl="0"/>
-            <a:r>
-              <a:rPr lang="pl-PL" dirty="0"/>
-              <a:t>[1]</a:t>
-            </a:r>
-            <a:r>
-              <a:rPr lang="pl-PL" dirty="0" err="1">
-                <a:hlinkClick r:id="rId3"/>
-              </a:rPr>
-              <a:t>Cyclic_redundancy_check_wikipedia</a:t>
-            </a:r>
-            <a:endParaRPr lang="pl-PL" dirty="0"/>
-          </a:p>
-          <a:p>
-            <a:pPr rtl="0"/>
-            <a:r>
-              <a:rPr lang="pl-PL" dirty="0"/>
-              <a:t>[2]</a:t>
-            </a:r>
-            <a:r>
-              <a:rPr lang="pl-PL" dirty="0" err="1">
-                <a:hlinkClick r:id="rId4"/>
-              </a:rPr>
-              <a:t>Mathematics_of_CRC</a:t>
-            </a:r>
-            <a:endParaRPr lang="pl-PL" dirty="0"/>
-          </a:p>
-          <a:p>
-            <a:pPr rtl="0"/>
-            <a:r>
-              <a:rPr lang="pl-PL" dirty="0"/>
-              <a:t>[3]</a:t>
-            </a:r>
-          </a:p>
-        </p:txBody>
-      </p:sp>
-      <p:sp>
-        <p:nvSpPr>
-          <p:cNvPr id="6" name="Numer slajdu — symbol zastępczy 5">
-            <a:extLst>
-              <a:ext uri="{FF2B5EF4-FFF2-40B4-BE49-F238E27FC236}">
-                <a16:creationId xmlns:a16="http://schemas.microsoft.com/office/drawing/2014/main" id="{9ED907F8-C614-4D59-A03F-BF9CD5E35703}"/>
-              </a:ext>
-            </a:extLst>
-          </p:cNvPr>
-          <p:cNvSpPr>
-            <a:spLocks noGrp="1"/>
-          </p:cNvSpPr>
-          <p:nvPr>
-            <p:ph type="sldNum" sz="quarter" idx="12"/>
-          </p:nvPr>
-        </p:nvSpPr>
-        <p:spPr>
-          <a:xfrm>
-            <a:off x="9948863" y="6507212"/>
-            <a:ext cx="1692274" cy="153888"/>
-          </a:xfrm>
-        </p:spPr>
-        <p:txBody>
-          <a:bodyPr wrap="square" rtlCol="0" anchor="ctr">
-            <a:normAutofit/>
-          </a:bodyPr>
-          <a:lstStyle/>
-          <a:p>
-            <a:pPr rtl="0">
-              <a:spcAft>
-                <a:spcPts val="600"/>
-              </a:spcAft>
-            </a:pPr>
-            <a:fld id="{DBA1B0FB-D917-4C8C-928F-313BD683BF39}" type="slidenum">
-              <a:rPr lang="pl-PL" smtClean="0"/>
-              <a:pPr rtl="0">
-                <a:spcAft>
-                  <a:spcPts val="600"/>
-                </a:spcAft>
-              </a:pPr>
-              <a:t>14</a:t>
-            </a:fld>
-            <a:endParaRPr lang="pl-PL"/>
-          </a:p>
-        </p:txBody>
-      </p:sp>
-      <p:sp>
-        <p:nvSpPr>
-          <p:cNvPr id="3" name="Symbol zastępczy zawartości 2">
-            <a:extLst>
-              <a:ext uri="{FF2B5EF4-FFF2-40B4-BE49-F238E27FC236}">
-                <a16:creationId xmlns:a16="http://schemas.microsoft.com/office/drawing/2014/main" id="{6529BA9D-6250-284C-255C-31D8AC37A94A}"/>
-              </a:ext>
-            </a:extLst>
-          </p:cNvPr>
-          <p:cNvSpPr>
-            <a:spLocks noGrp="1"/>
-          </p:cNvSpPr>
-          <p:nvPr>
-            <p:ph sz="half" idx="2"/>
-          </p:nvPr>
-        </p:nvSpPr>
-        <p:spPr/>
-        <p:txBody>
-          <a:bodyPr/>
-          <a:lstStyle/>
-          <a:p>
-            <a:endParaRPr lang="pl-PL"/>
-          </a:p>
-        </p:txBody>
-      </p:sp>
-    </p:spTree>
-    <p:extLst>
-      <p:ext uri="{BB962C8B-B14F-4D97-AF65-F5344CB8AC3E}">
-        <p14:creationId xmlns:p14="http://schemas.microsoft.com/office/powerpoint/2010/main" val="3521561301"/>
       </p:ext>
     </p:extLst>
   </p:cSld>
@@ -21538,6 +21294,214 @@
       </p:grpSpPr>
       <p:sp>
         <p:nvSpPr>
+          <p:cNvPr id="11" name="Tytuł 10">
+            <a:extLst>
+              <a:ext uri="{FF2B5EF4-FFF2-40B4-BE49-F238E27FC236}">
+                <a16:creationId xmlns:a16="http://schemas.microsoft.com/office/drawing/2014/main" id="{581E8936-2270-47FE-94A4-398CB123EF90}"/>
+              </a:ext>
+            </a:extLst>
+          </p:cNvPr>
+          <p:cNvSpPr>
+            <a:spLocks noGrp="1"/>
+          </p:cNvSpPr>
+          <p:nvPr>
+            <p:ph type="title"/>
+          </p:nvPr>
+        </p:nvSpPr>
+        <p:spPr>
+          <a:xfrm>
+            <a:off x="550863" y="549275"/>
+            <a:ext cx="11090274" cy="1332000"/>
+          </a:xfrm>
+        </p:spPr>
+        <p:txBody>
+          <a:bodyPr wrap="square" rtlCol="0" anchor="t">
+            <a:normAutofit/>
+          </a:bodyPr>
+          <a:lstStyle/>
+          <a:p>
+            <a:pPr rtl="0"/>
+            <a:r>
+              <a:rPr lang="pl-PL" dirty="0"/>
+              <a:t>Bibliografia</a:t>
+            </a:r>
+          </a:p>
+        </p:txBody>
+      </p:sp>
+      <p:sp>
+        <p:nvSpPr>
+          <p:cNvPr id="13" name="Zawartość — symbol zastępczy 12">
+            <a:extLst>
+              <a:ext uri="{FF2B5EF4-FFF2-40B4-BE49-F238E27FC236}">
+                <a16:creationId xmlns:a16="http://schemas.microsoft.com/office/drawing/2014/main" id="{C0287FEC-3826-4868-8D93-52429C6156F5}"/>
+              </a:ext>
+            </a:extLst>
+          </p:cNvPr>
+          <p:cNvSpPr>
+            <a:spLocks noGrp="1"/>
+          </p:cNvSpPr>
+          <p:nvPr>
+            <p:ph sz="half" idx="1"/>
+          </p:nvPr>
+        </p:nvSpPr>
+        <p:spPr>
+          <a:xfrm>
+            <a:off x="550862" y="2097175"/>
+            <a:ext cx="5435600" cy="3995650"/>
+          </a:xfrm>
+        </p:spPr>
+        <p:txBody>
+          <a:bodyPr wrap="square" rtlCol="0">
+            <a:normAutofit/>
+          </a:bodyPr>
+          <a:lstStyle/>
+          <a:p>
+            <a:pPr rtl="0"/>
+            <a:r>
+              <a:rPr lang="pl-PL" dirty="0"/>
+              <a:t>[1]</a:t>
+            </a:r>
+            <a:r>
+              <a:rPr lang="pl-PL" dirty="0" err="1">
+                <a:hlinkClick r:id="rId3"/>
+              </a:rPr>
+              <a:t>Cyclic_redundancy_check_wikipedia</a:t>
+            </a:r>
+            <a:endParaRPr lang="pl-PL" dirty="0"/>
+          </a:p>
+          <a:p>
+            <a:pPr rtl="0"/>
+            <a:r>
+              <a:rPr lang="pl-PL" dirty="0"/>
+              <a:t>[2]</a:t>
+            </a:r>
+            <a:r>
+              <a:rPr lang="pl-PL" dirty="0" err="1">
+                <a:hlinkClick r:id="rId4"/>
+              </a:rPr>
+              <a:t>Mathematics_of_CRC</a:t>
+            </a:r>
+            <a:endParaRPr lang="pl-PL" dirty="0"/>
+          </a:p>
+          <a:p>
+            <a:pPr rtl="0"/>
+            <a:r>
+              <a:rPr lang="pl-PL" dirty="0"/>
+              <a:t>[3]</a:t>
+            </a:r>
+            <a:r>
+              <a:rPr lang="pl-PL" dirty="0">
+                <a:hlinkClick r:id="rId5"/>
+              </a:rPr>
+              <a:t>IEEE 802.3 - 2022</a:t>
+            </a:r>
+            <a:endParaRPr lang="pl-PL" dirty="0"/>
+          </a:p>
+        </p:txBody>
+      </p:sp>
+      <p:sp>
+        <p:nvSpPr>
+          <p:cNvPr id="6" name="Numer slajdu — symbol zastępczy 5">
+            <a:extLst>
+              <a:ext uri="{FF2B5EF4-FFF2-40B4-BE49-F238E27FC236}">
+                <a16:creationId xmlns:a16="http://schemas.microsoft.com/office/drawing/2014/main" id="{9ED907F8-C614-4D59-A03F-BF9CD5E35703}"/>
+              </a:ext>
+            </a:extLst>
+          </p:cNvPr>
+          <p:cNvSpPr>
+            <a:spLocks noGrp="1"/>
+          </p:cNvSpPr>
+          <p:nvPr>
+            <p:ph type="sldNum" sz="quarter" idx="12"/>
+          </p:nvPr>
+        </p:nvSpPr>
+        <p:spPr>
+          <a:xfrm>
+            <a:off x="9948863" y="6507212"/>
+            <a:ext cx="1692274" cy="153888"/>
+          </a:xfrm>
+        </p:spPr>
+        <p:txBody>
+          <a:bodyPr wrap="square" rtlCol="0" anchor="ctr">
+            <a:normAutofit/>
+          </a:bodyPr>
+          <a:lstStyle/>
+          <a:p>
+            <a:pPr rtl="0">
+              <a:spcAft>
+                <a:spcPts val="600"/>
+              </a:spcAft>
+            </a:pPr>
+            <a:fld id="{DBA1B0FB-D917-4C8C-928F-313BD683BF39}" type="slidenum">
+              <a:rPr lang="pl-PL" smtClean="0"/>
+              <a:pPr rtl="0">
+                <a:spcAft>
+                  <a:spcPts val="600"/>
+                </a:spcAft>
+              </a:pPr>
+              <a:t>15</a:t>
+            </a:fld>
+            <a:endParaRPr lang="pl-PL"/>
+          </a:p>
+        </p:txBody>
+      </p:sp>
+      <p:sp>
+        <p:nvSpPr>
+          <p:cNvPr id="3" name="Symbol zastępczy zawartości 2">
+            <a:extLst>
+              <a:ext uri="{FF2B5EF4-FFF2-40B4-BE49-F238E27FC236}">
+                <a16:creationId xmlns:a16="http://schemas.microsoft.com/office/drawing/2014/main" id="{6529BA9D-6250-284C-255C-31D8AC37A94A}"/>
+              </a:ext>
+            </a:extLst>
+          </p:cNvPr>
+          <p:cNvSpPr>
+            <a:spLocks noGrp="1"/>
+          </p:cNvSpPr>
+          <p:nvPr>
+            <p:ph sz="half" idx="2"/>
+          </p:nvPr>
+        </p:nvSpPr>
+        <p:spPr/>
+        <p:txBody>
+          <a:bodyPr/>
+          <a:lstStyle/>
+          <a:p>
+            <a:endParaRPr lang="pl-PL"/>
+          </a:p>
+        </p:txBody>
+      </p:sp>
+    </p:spTree>
+    <p:extLst>
+      <p:ext uri="{BB962C8B-B14F-4D97-AF65-F5344CB8AC3E}">
+        <p14:creationId xmlns:p14="http://schemas.microsoft.com/office/powerpoint/2010/main" val="3521561301"/>
+      </p:ext>
+    </p:extLst>
+  </p:cSld>
+  <p:clrMapOvr>
+    <a:masterClrMapping/>
+  </p:clrMapOvr>
+</p:sld>
+</file>
+
+<file path=ppt/slides/slide16.xml><?xml version="1.0" encoding="utf-8"?>
+<p:sld xmlns:a="http://schemas.openxmlformats.org/drawingml/2006/main" xmlns:r="http://schemas.openxmlformats.org/officeDocument/2006/relationships" xmlns:p="http://schemas.openxmlformats.org/presentationml/2006/main">
+  <p:cSld>
+    <p:spTree>
+      <p:nvGrpSpPr>
+        <p:cNvPr id="1" name=""/>
+        <p:cNvGrpSpPr/>
+        <p:nvPr/>
+      </p:nvGrpSpPr>
+      <p:grpSpPr>
+        <a:xfrm>
+          <a:off x="0" y="0"/>
+          <a:ext cx="0" cy="0"/>
+          <a:chOff x="0" y="0"/>
+          <a:chExt cx="0" cy="0"/>
+        </a:xfrm>
+      </p:grpSpPr>
+      <p:sp>
+        <p:nvSpPr>
           <p:cNvPr id="22" name="Tytuł 21">
             <a:extLst>
               <a:ext uri="{FF2B5EF4-FFF2-40B4-BE49-F238E27FC236}">
@@ -21784,7 +21748,7 @@
             <a:fld id="{DBA1B0FB-D917-4C8C-928F-313BD683BF39}" type="slidenum">
               <a:rPr lang="pl-PL" smtClean="0"/>
               <a:pPr rtl="0"/>
-              <a:t>15</a:t>
+              <a:t>16</a:t>
             </a:fld>
             <a:endParaRPr lang="pl-PL"/>
           </a:p>
@@ -23257,8 +23221,8 @@
           <a:chExt cx="0" cy="0"/>
         </a:xfrm>
       </p:grpSpPr>
-      <mc:AlternateContent xmlns:mc="http://schemas.openxmlformats.org/markup-compatibility/2006" xmlns:a14="http://schemas.microsoft.com/office/drawing/2010/main">
-        <mc:Choice Requires="a14">
+      <mc:AlternateContent xmlns:mc="http://schemas.openxmlformats.org/markup-compatibility/2006">
+        <mc:Choice xmlns:a14="http://schemas.microsoft.com/office/drawing/2010/main" Requires="a14">
           <p:sp>
             <p:nvSpPr>
               <p:cNvPr id="14" name="Content Placeholder 2">
@@ -23707,28 +23671,13 @@
                 <a:endParaRPr lang="pl-PL" sz="1600" b="0" dirty="0"/>
               </a:p>
               <a:p>
-                <a:pPr marL="342900" indent="-342900">
-                  <a:buFont typeface="Arial" panose="020B0604020202020204" pitchFamily="34" charset="0"/>
-                  <a:buChar char="•"/>
-                </a:pPr>
+                <a:pPr marL="0" indent="0"/>
                 <a:endParaRPr lang="pl-PL" sz="1600" dirty="0"/>
-              </a:p>
-              <a:p>
-                <a:pPr marL="0" indent="0" algn="ctr"/>
-                <a:r>
-                  <a:rPr lang="pl-PL" sz="1600" b="0" dirty="0"/>
-                  <a:t>Standard 802.11 dodaje </a:t>
-                </a:r>
-                <a:r>
-                  <a:rPr lang="pl-PL" sz="1600" dirty="0"/>
-                  <a:t>swoje małe zmiany do opisanego powyżej algorytmu, ale jeżeli chodzi o same założenia to nie różni się od pokazanego podejścia.</a:t>
-                </a:r>
-                <a:endParaRPr lang="pl-PL" sz="1600" b="0" dirty="0"/>
               </a:p>
             </p:txBody>
           </p:sp>
         </mc:Choice>
-        <mc:Fallback xmlns="">
+        <mc:Fallback>
           <p:sp>
             <p:nvSpPr>
               <p:cNvPr id="14" name="Content Placeholder 2">
@@ -23850,6 +23799,1128 @@
       </p:grpSpPr>
       <p:sp>
         <p:nvSpPr>
+          <p:cNvPr id="2" name="Tytuł 1">
+            <a:extLst>
+              <a:ext uri="{FF2B5EF4-FFF2-40B4-BE49-F238E27FC236}">
+                <a16:creationId xmlns:a16="http://schemas.microsoft.com/office/drawing/2014/main" id="{E3775615-0FD6-A772-8FA5-6191B91B8D20}"/>
+              </a:ext>
+            </a:extLst>
+          </p:cNvPr>
+          <p:cNvSpPr>
+            <a:spLocks noGrp="1"/>
+          </p:cNvSpPr>
+          <p:nvPr>
+            <p:ph type="title"/>
+          </p:nvPr>
+        </p:nvSpPr>
+        <p:spPr>
+          <a:xfrm>
+            <a:off x="430790" y="290657"/>
+            <a:ext cx="11090274" cy="623743"/>
+          </a:xfrm>
+        </p:spPr>
+        <p:txBody>
+          <a:bodyPr/>
+          <a:lstStyle/>
+          <a:p>
+            <a:r>
+              <a:rPr lang="pl-PL" sz="3200" dirty="0"/>
+              <a:t>CRC – sztuka projektowania wielomianu G(x)</a:t>
+            </a:r>
+          </a:p>
+        </p:txBody>
+      </p:sp>
+      <p:sp>
+        <p:nvSpPr>
+          <p:cNvPr id="5" name="Symbol zastępczy daty 4">
+            <a:extLst>
+              <a:ext uri="{FF2B5EF4-FFF2-40B4-BE49-F238E27FC236}">
+                <a16:creationId xmlns:a16="http://schemas.microsoft.com/office/drawing/2014/main" id="{0BAA7A3A-5026-D349-5E45-F31AA262157C}"/>
+              </a:ext>
+            </a:extLst>
+          </p:cNvPr>
+          <p:cNvSpPr>
+            <a:spLocks noGrp="1"/>
+          </p:cNvSpPr>
+          <p:nvPr>
+            <p:ph type="dt" sz="half" idx="10"/>
+          </p:nvPr>
+        </p:nvSpPr>
+        <p:spPr/>
+        <p:txBody>
+          <a:bodyPr/>
+          <a:lstStyle/>
+          <a:p>
+            <a:pPr rtl="0"/>
+            <a:r>
+              <a:rPr lang="pl-PL"/>
+              <a:t>Wtorek, 2 lutego 20XX</a:t>
+            </a:r>
+          </a:p>
+        </p:txBody>
+      </p:sp>
+      <p:sp>
+        <p:nvSpPr>
+          <p:cNvPr id="6" name="Symbol zastępczy stopki 5">
+            <a:extLst>
+              <a:ext uri="{FF2B5EF4-FFF2-40B4-BE49-F238E27FC236}">
+                <a16:creationId xmlns:a16="http://schemas.microsoft.com/office/drawing/2014/main" id="{63F5ACA9-E8CC-8AE4-EB88-A20D851C0C61}"/>
+              </a:ext>
+            </a:extLst>
+          </p:cNvPr>
+          <p:cNvSpPr>
+            <a:spLocks noGrp="1"/>
+          </p:cNvSpPr>
+          <p:nvPr>
+            <p:ph type="ftr" sz="quarter" idx="11"/>
+          </p:nvPr>
+        </p:nvSpPr>
+        <p:spPr/>
+        <p:txBody>
+          <a:bodyPr/>
+          <a:lstStyle/>
+          <a:p>
+            <a:pPr rtl="0"/>
+            <a:r>
+              <a:rPr lang="pl-PL"/>
+              <a:t>Przykładowy tekst stopki</a:t>
+            </a:r>
+          </a:p>
+        </p:txBody>
+      </p:sp>
+      <p:sp>
+        <p:nvSpPr>
+          <p:cNvPr id="7" name="Symbol zastępczy numeru slajdu 6">
+            <a:extLst>
+              <a:ext uri="{FF2B5EF4-FFF2-40B4-BE49-F238E27FC236}">
+                <a16:creationId xmlns:a16="http://schemas.microsoft.com/office/drawing/2014/main" id="{75B4849C-8494-1CB4-0550-A461F5102CA9}"/>
+              </a:ext>
+            </a:extLst>
+          </p:cNvPr>
+          <p:cNvSpPr>
+            <a:spLocks noGrp="1"/>
+          </p:cNvSpPr>
+          <p:nvPr>
+            <p:ph type="sldNum" sz="quarter" idx="12"/>
+          </p:nvPr>
+        </p:nvSpPr>
+        <p:spPr/>
+        <p:txBody>
+          <a:bodyPr/>
+          <a:lstStyle/>
+          <a:p>
+            <a:pPr rtl="0"/>
+            <a:fld id="{DBA1B0FB-D917-4C8C-928F-313BD683BF39}" type="slidenum">
+              <a:rPr lang="pl-PL" smtClean="0"/>
+              <a:t>6</a:t>
+            </a:fld>
+            <a:endParaRPr lang="pl-PL"/>
+          </a:p>
+        </p:txBody>
+      </p:sp>
+      <mc:AlternateContent xmlns:mc="http://schemas.openxmlformats.org/markup-compatibility/2006">
+        <mc:Choice xmlns:a14="http://schemas.microsoft.com/office/drawing/2010/main" Requires="a14">
+          <p:sp>
+            <p:nvSpPr>
+              <p:cNvPr id="10" name="Zawartość — symbol zastępczy 8">
+                <a:extLst>
+                  <a:ext uri="{FF2B5EF4-FFF2-40B4-BE49-F238E27FC236}">
+                    <a16:creationId xmlns:a16="http://schemas.microsoft.com/office/drawing/2014/main" id="{66708DB3-BBD8-280A-4DF1-4098EAC933B9}"/>
+                  </a:ext>
+                </a:extLst>
+              </p:cNvPr>
+              <p:cNvSpPr txBox="1">
+                <a:spLocks/>
+              </p:cNvSpPr>
+              <p:nvPr/>
+            </p:nvSpPr>
+            <p:spPr>
+              <a:xfrm>
+                <a:off x="430789" y="944597"/>
+                <a:ext cx="11090274" cy="5326893"/>
+              </a:xfrm>
+              <a:prstGeom prst="rect">
+                <a:avLst/>
+              </a:prstGeom>
+            </p:spPr>
+            <p:txBody>
+              <a:bodyPr rtlCol="0">
+                <a:normAutofit lnSpcReduction="10000"/>
+              </a:bodyPr>
+              <a:lstStyle>
+                <a:lvl1pPr marL="228600" indent="-228600" algn="l" defTabSz="914400" rtl="0" eaLnBrk="1" latinLnBrk="0" hangingPunct="1">
+                  <a:lnSpc>
+                    <a:spcPct val="110000"/>
+                  </a:lnSpc>
+                  <a:spcBef>
+                    <a:spcPts val="1000"/>
+                  </a:spcBef>
+                  <a:spcAft>
+                    <a:spcPts val="800"/>
+                  </a:spcAft>
+                  <a:buFont typeface="Arial" panose="020B0604020202020204" pitchFamily="34" charset="0"/>
+                  <a:buChar char="•"/>
+                  <a:defRPr sz="2000" kern="1200">
+                    <a:solidFill>
+                      <a:schemeClr val="tx1">
+                        <a:alpha val="60000"/>
+                      </a:schemeClr>
+                    </a:solidFill>
+                    <a:latin typeface="+mn-lt"/>
+                    <a:ea typeface="+mn-ea"/>
+                    <a:cs typeface="+mn-cs"/>
+                  </a:defRPr>
+                </a:lvl1pPr>
+                <a:lvl2pPr marL="685800" indent="-228600" algn="l" defTabSz="914400" rtl="0" eaLnBrk="1" latinLnBrk="0" hangingPunct="1">
+                  <a:lnSpc>
+                    <a:spcPct val="110000"/>
+                  </a:lnSpc>
+                  <a:spcBef>
+                    <a:spcPts val="500"/>
+                  </a:spcBef>
+                  <a:spcAft>
+                    <a:spcPts val="800"/>
+                  </a:spcAft>
+                  <a:buFont typeface="Arial" panose="020B0604020202020204" pitchFamily="34" charset="0"/>
+                  <a:buChar char="•"/>
+                  <a:defRPr sz="1400" kern="1200">
+                    <a:solidFill>
+                      <a:schemeClr val="tx1">
+                        <a:alpha val="60000"/>
+                      </a:schemeClr>
+                    </a:solidFill>
+                    <a:latin typeface="+mn-lt"/>
+                    <a:ea typeface="+mn-ea"/>
+                    <a:cs typeface="+mn-cs"/>
+                  </a:defRPr>
+                </a:lvl2pPr>
+                <a:lvl3pPr marL="1143000" indent="-228600" algn="l" defTabSz="914400" rtl="0" eaLnBrk="1" latinLnBrk="0" hangingPunct="1">
+                  <a:lnSpc>
+                    <a:spcPct val="110000"/>
+                  </a:lnSpc>
+                  <a:spcBef>
+                    <a:spcPts val="500"/>
+                  </a:spcBef>
+                  <a:spcAft>
+                    <a:spcPts val="800"/>
+                  </a:spcAft>
+                  <a:buFont typeface="Arial" panose="020B0604020202020204" pitchFamily="34" charset="0"/>
+                  <a:buChar char="•"/>
+                  <a:defRPr sz="1400" kern="1200">
+                    <a:solidFill>
+                      <a:schemeClr val="tx1">
+                        <a:alpha val="60000"/>
+                      </a:schemeClr>
+                    </a:solidFill>
+                    <a:latin typeface="+mn-lt"/>
+                    <a:ea typeface="+mn-ea"/>
+                    <a:cs typeface="+mn-cs"/>
+                  </a:defRPr>
+                </a:lvl3pPr>
+                <a:lvl4pPr marL="1600200" indent="-228600" algn="l" defTabSz="914400" rtl="0" eaLnBrk="1" latinLnBrk="0" hangingPunct="1">
+                  <a:lnSpc>
+                    <a:spcPct val="110000"/>
+                  </a:lnSpc>
+                  <a:spcBef>
+                    <a:spcPts val="500"/>
+                  </a:spcBef>
+                  <a:spcAft>
+                    <a:spcPts val="800"/>
+                  </a:spcAft>
+                  <a:buFont typeface="Arial" panose="020B0604020202020204" pitchFamily="34" charset="0"/>
+                  <a:buChar char="•"/>
+                  <a:defRPr sz="1400" kern="1200">
+                    <a:solidFill>
+                      <a:schemeClr val="tx1">
+                        <a:alpha val="60000"/>
+                      </a:schemeClr>
+                    </a:solidFill>
+                    <a:latin typeface="+mn-lt"/>
+                    <a:ea typeface="+mn-ea"/>
+                    <a:cs typeface="+mn-cs"/>
+                  </a:defRPr>
+                </a:lvl4pPr>
+                <a:lvl5pPr marL="2057400" indent="-228600" algn="l" defTabSz="914400" rtl="0" eaLnBrk="1" latinLnBrk="0" hangingPunct="1">
+                  <a:lnSpc>
+                    <a:spcPct val="110000"/>
+                  </a:lnSpc>
+                  <a:spcBef>
+                    <a:spcPts val="500"/>
+                  </a:spcBef>
+                  <a:spcAft>
+                    <a:spcPts val="800"/>
+                  </a:spcAft>
+                  <a:buFont typeface="Arial" panose="020B0604020202020204" pitchFamily="34" charset="0"/>
+                  <a:buChar char="•"/>
+                  <a:defRPr sz="1400" kern="1200">
+                    <a:solidFill>
+                      <a:schemeClr val="tx1">
+                        <a:alpha val="60000"/>
+                      </a:schemeClr>
+                    </a:solidFill>
+                    <a:latin typeface="+mn-lt"/>
+                    <a:ea typeface="+mn-ea"/>
+                    <a:cs typeface="+mn-cs"/>
+                  </a:defRPr>
+                </a:lvl5pPr>
+                <a:lvl6pPr marL="2514600" indent="-228600" algn="l" defTabSz="914400" rtl="0" eaLnBrk="1" latinLnBrk="0" hangingPunct="1">
+                  <a:lnSpc>
+                    <a:spcPct val="90000"/>
+                  </a:lnSpc>
+                  <a:spcBef>
+                    <a:spcPts val="500"/>
+                  </a:spcBef>
+                  <a:buFont typeface="Arial" panose="020B0604020202020204" pitchFamily="34" charset="0"/>
+                  <a:buChar char="•"/>
+                  <a:defRPr sz="1800" kern="1200">
+                    <a:solidFill>
+                      <a:schemeClr val="tx1"/>
+                    </a:solidFill>
+                    <a:latin typeface="+mn-lt"/>
+                    <a:ea typeface="+mn-ea"/>
+                    <a:cs typeface="+mn-cs"/>
+                  </a:defRPr>
+                </a:lvl6pPr>
+                <a:lvl7pPr marL="2971800" indent="-228600" algn="l" defTabSz="914400" rtl="0" eaLnBrk="1" latinLnBrk="0" hangingPunct="1">
+                  <a:lnSpc>
+                    <a:spcPct val="90000"/>
+                  </a:lnSpc>
+                  <a:spcBef>
+                    <a:spcPts val="500"/>
+                  </a:spcBef>
+                  <a:buFont typeface="Arial" panose="020B0604020202020204" pitchFamily="34" charset="0"/>
+                  <a:buChar char="•"/>
+                  <a:defRPr sz="1800" kern="1200">
+                    <a:solidFill>
+                      <a:schemeClr val="tx1"/>
+                    </a:solidFill>
+                    <a:latin typeface="+mn-lt"/>
+                    <a:ea typeface="+mn-ea"/>
+                    <a:cs typeface="+mn-cs"/>
+                  </a:defRPr>
+                </a:lvl7pPr>
+                <a:lvl8pPr marL="3429000" indent="-228600" algn="l" defTabSz="914400" rtl="0" eaLnBrk="1" latinLnBrk="0" hangingPunct="1">
+                  <a:lnSpc>
+                    <a:spcPct val="90000"/>
+                  </a:lnSpc>
+                  <a:spcBef>
+                    <a:spcPts val="500"/>
+                  </a:spcBef>
+                  <a:buFont typeface="Arial" panose="020B0604020202020204" pitchFamily="34" charset="0"/>
+                  <a:buChar char="•"/>
+                  <a:defRPr sz="1800" kern="1200">
+                    <a:solidFill>
+                      <a:schemeClr val="tx1"/>
+                    </a:solidFill>
+                    <a:latin typeface="+mn-lt"/>
+                    <a:ea typeface="+mn-ea"/>
+                    <a:cs typeface="+mn-cs"/>
+                  </a:defRPr>
+                </a:lvl8pPr>
+                <a:lvl9pPr marL="3886200" indent="-228600" algn="l" defTabSz="914400" rtl="0" eaLnBrk="1" latinLnBrk="0" hangingPunct="1">
+                  <a:lnSpc>
+                    <a:spcPct val="90000"/>
+                  </a:lnSpc>
+                  <a:spcBef>
+                    <a:spcPts val="500"/>
+                  </a:spcBef>
+                  <a:buFont typeface="Arial" panose="020B0604020202020204" pitchFamily="34" charset="0"/>
+                  <a:buChar char="•"/>
+                  <a:defRPr sz="1800" kern="1200">
+                    <a:solidFill>
+                      <a:schemeClr val="tx1"/>
+                    </a:solidFill>
+                    <a:latin typeface="+mn-lt"/>
+                    <a:ea typeface="+mn-ea"/>
+                    <a:cs typeface="+mn-cs"/>
+                  </a:defRPr>
+                </a:lvl9pPr>
+              </a:lstStyle>
+              <a:p>
+                <a:pPr marL="0" indent="0">
+                  <a:buNone/>
+                </a:pPr>
+                <a:r>
+                  <a:rPr lang="pl-PL" sz="1600" dirty="0"/>
+                  <a:t>Wielomian stopnia n </a:t>
+                </a:r>
+                <a14:m>
+                  <m:oMath xmlns:m="http://schemas.openxmlformats.org/officeDocument/2006/math">
+                    <m:r>
+                      <a:rPr lang="pl-PL" sz="1600" b="0" i="1" smtClean="0">
+                        <a:latin typeface="Cambria Math" panose="02040503050406030204" pitchFamily="18" charset="0"/>
+                      </a:rPr>
+                      <m:t>→</m:t>
+                    </m:r>
+                  </m:oMath>
+                </a14:m>
+                <a:r>
+                  <a:rPr lang="pl-PL" sz="1600" dirty="0"/>
+                  <a:t> CRC o długości (n-1) bitów.</a:t>
+                </a:r>
+              </a:p>
+              <a:p>
+                <a:r>
+                  <a:rPr lang="pl-PL" sz="1600" dirty="0"/>
+                  <a:t>Wielomian pierwotny – ma on największy „cykl” wykrywalności, wykrywa:  wszystkie 1-bitowe błędy, wszystkie 2-bitowe błędy jeśli </a:t>
+                </a:r>
+                <a:r>
+                  <a:rPr lang="pl-PL" sz="1600" dirty="0" err="1"/>
+                  <a:t>blok_danych</a:t>
+                </a:r>
+                <a:r>
+                  <a:rPr lang="pl-PL" sz="1600" dirty="0"/>
+                  <a:t> ≤ </a:t>
+                </a:r>
+                <a14:m>
+                  <m:oMath xmlns:m="http://schemas.openxmlformats.org/officeDocument/2006/math">
+                    <m:sSup>
+                      <m:sSupPr>
+                        <m:ctrlPr>
+                          <a:rPr lang="pl-PL" sz="1600" i="1" dirty="0" smtClean="0">
+                            <a:latin typeface="Cambria Math" panose="02040503050406030204" pitchFamily="18" charset="0"/>
+                          </a:rPr>
+                        </m:ctrlPr>
+                      </m:sSupPr>
+                      <m:e>
+                        <m:r>
+                          <a:rPr lang="pl-PL" sz="1600" i="1" dirty="0" smtClean="0">
+                            <a:latin typeface="Cambria Math" panose="02040503050406030204" pitchFamily="18" charset="0"/>
+                          </a:rPr>
+                          <m:t>2</m:t>
+                        </m:r>
+                      </m:e>
+                      <m:sup>
+                        <m:r>
+                          <a:rPr lang="pl-PL" sz="1600" i="1" dirty="0" smtClean="0">
+                            <a:latin typeface="Cambria Math" panose="02040503050406030204" pitchFamily="18" charset="0"/>
+                          </a:rPr>
+                          <m:t>𝑟</m:t>
+                        </m:r>
+                      </m:sup>
+                    </m:sSup>
+                    <m:r>
+                      <a:rPr lang="pl-PL" sz="1600" i="1" dirty="0" smtClean="0">
+                        <a:latin typeface="Cambria Math" panose="02040503050406030204" pitchFamily="18" charset="0"/>
+                      </a:rPr>
+                      <m:t>−1 </m:t>
+                    </m:r>
+                  </m:oMath>
+                </a14:m>
+                <a:r>
+                  <a:rPr lang="pl-PL" sz="1600" dirty="0"/>
+                  <a:t>( gdzie </a:t>
+                </a:r>
+                <a14:m>
+                  <m:oMath xmlns:m="http://schemas.openxmlformats.org/officeDocument/2006/math">
+                    <m:r>
+                      <a:rPr lang="pl-PL" sz="1600" i="1" dirty="0" smtClean="0">
+                        <a:latin typeface="Cambria Math" panose="02040503050406030204" pitchFamily="18" charset="0"/>
+                      </a:rPr>
+                      <m:t>𝑟</m:t>
+                    </m:r>
+                  </m:oMath>
+                </a14:m>
+                <a:r>
+                  <a:rPr lang="pl-PL" sz="1600" dirty="0"/>
+                  <a:t> to stopień wielomianu )</a:t>
+                </a:r>
+                <a:br>
+                  <a:rPr lang="pl-PL" sz="1600" dirty="0"/>
+                </a:br>
+                <a:br>
+                  <a:rPr lang="pl-PL" sz="1600" dirty="0"/>
+                </a:br>
+                <a:r>
+                  <a:rPr lang="pl-PL" sz="1600" dirty="0"/>
+                  <a:t>Nie mamy natomiast gwarancji wykrycia wszystkich błędów 3-bitowych, 4-bitowych itd. </a:t>
+                </a:r>
+                <a:br>
+                  <a:rPr lang="pl-PL" sz="1600" dirty="0"/>
+                </a:br>
+                <a:endParaRPr lang="pl-PL" sz="1600" dirty="0"/>
+              </a:p>
+              <a:p>
+                <a:r>
+                  <a:rPr lang="pl-PL" sz="1600" dirty="0"/>
+                  <a:t>Wielomian typu </a:t>
+                </a:r>
+                <a14:m>
+                  <m:oMath xmlns:m="http://schemas.openxmlformats.org/officeDocument/2006/math">
+                    <m:r>
+                      <a:rPr lang="pl-PL" sz="1600" i="1" dirty="0" smtClean="0">
+                        <a:latin typeface="Cambria Math" panose="02040503050406030204" pitchFamily="18" charset="0"/>
+                      </a:rPr>
+                      <m:t>𝑔</m:t>
+                    </m:r>
+                    <m:r>
+                      <a:rPr lang="pl-PL" sz="1600" i="1" dirty="0" smtClean="0">
+                        <a:latin typeface="Cambria Math" panose="02040503050406030204" pitchFamily="18" charset="0"/>
+                      </a:rPr>
+                      <m:t>(</m:t>
+                    </m:r>
+                    <m:r>
+                      <a:rPr lang="pl-PL" sz="1600" i="1" dirty="0" smtClean="0">
+                        <a:latin typeface="Cambria Math" panose="02040503050406030204" pitchFamily="18" charset="0"/>
+                      </a:rPr>
+                      <m:t>𝑥</m:t>
+                    </m:r>
+                    <m:r>
+                      <a:rPr lang="pl-PL" sz="1600" i="1" dirty="0" smtClean="0">
+                        <a:latin typeface="Cambria Math" panose="02040503050406030204" pitchFamily="18" charset="0"/>
+                      </a:rPr>
+                      <m:t>) = </m:t>
+                    </m:r>
+                    <m:r>
+                      <a:rPr lang="pl-PL" sz="1600" i="1" dirty="0" smtClean="0">
+                        <a:latin typeface="Cambria Math" panose="02040503050406030204" pitchFamily="18" charset="0"/>
+                      </a:rPr>
+                      <m:t>𝑝</m:t>
+                    </m:r>
+                    <m:r>
+                      <a:rPr lang="pl-PL" sz="1600" i="1" dirty="0" smtClean="0">
+                        <a:latin typeface="Cambria Math" panose="02040503050406030204" pitchFamily="18" charset="0"/>
+                      </a:rPr>
+                      <m:t>(</m:t>
+                    </m:r>
+                    <m:r>
+                      <a:rPr lang="pl-PL" sz="1600" i="1" dirty="0" smtClean="0">
+                        <a:latin typeface="Cambria Math" panose="02040503050406030204" pitchFamily="18" charset="0"/>
+                      </a:rPr>
+                      <m:t>𝑥</m:t>
+                    </m:r>
+                    <m:r>
+                      <a:rPr lang="pl-PL" sz="1600" i="1" dirty="0" smtClean="0">
+                        <a:latin typeface="Cambria Math" panose="02040503050406030204" pitchFamily="18" charset="0"/>
+                      </a:rPr>
+                      <m:t>) ∗ </m:t>
+                    </m:r>
+                    <m:d>
+                      <m:dPr>
+                        <m:ctrlPr>
+                          <a:rPr lang="pl-PL" sz="1600" i="1" dirty="0" smtClean="0">
+                            <a:latin typeface="Cambria Math" panose="02040503050406030204" pitchFamily="18" charset="0"/>
+                          </a:rPr>
+                        </m:ctrlPr>
+                      </m:dPr>
+                      <m:e>
+                        <m:r>
+                          <a:rPr lang="pl-PL" sz="1600" i="1" dirty="0" smtClean="0">
+                            <a:latin typeface="Cambria Math" panose="02040503050406030204" pitchFamily="18" charset="0"/>
+                          </a:rPr>
+                          <m:t>𝑥</m:t>
+                        </m:r>
+                        <m:r>
+                          <a:rPr lang="pl-PL" sz="1600" i="1" dirty="0" smtClean="0">
+                            <a:latin typeface="Cambria Math" panose="02040503050406030204" pitchFamily="18" charset="0"/>
+                          </a:rPr>
+                          <m:t>+1</m:t>
+                        </m:r>
+                      </m:e>
+                    </m:d>
+                  </m:oMath>
+                </a14:m>
+                <a:r>
+                  <a:rPr lang="pl-PL" sz="1000" dirty="0"/>
+                  <a:t> </a:t>
+                </a:r>
+                <a:r>
+                  <a:rPr lang="pl-PL" sz="1500" dirty="0"/>
+                  <a:t>, gdzie </a:t>
+                </a:r>
+                <a14:m>
+                  <m:oMath xmlns:m="http://schemas.openxmlformats.org/officeDocument/2006/math">
+                    <m:r>
+                      <a:rPr lang="pl-PL" sz="1500" i="1" dirty="0" smtClean="0">
+                        <a:latin typeface="Cambria Math" panose="02040503050406030204" pitchFamily="18" charset="0"/>
+                      </a:rPr>
+                      <m:t>𝑝</m:t>
+                    </m:r>
+                    <m:r>
+                      <a:rPr lang="pl-PL" sz="1500" i="1" dirty="0" smtClean="0">
+                        <a:latin typeface="Cambria Math" panose="02040503050406030204" pitchFamily="18" charset="0"/>
+                      </a:rPr>
+                      <m:t>(</m:t>
+                    </m:r>
+                    <m:r>
+                      <a:rPr lang="pl-PL" sz="1500" i="1" dirty="0" smtClean="0">
+                        <a:latin typeface="Cambria Math" panose="02040503050406030204" pitchFamily="18" charset="0"/>
+                      </a:rPr>
+                      <m:t>𝑥</m:t>
+                    </m:r>
+                    <m:r>
+                      <a:rPr lang="pl-PL" sz="1500" i="1" dirty="0" smtClean="0">
+                        <a:latin typeface="Cambria Math" panose="02040503050406030204" pitchFamily="18" charset="0"/>
+                      </a:rPr>
+                      <m:t>) −&gt; </m:t>
+                    </m:r>
+                  </m:oMath>
+                </a14:m>
+                <a:r>
+                  <a:rPr lang="pl-PL" sz="1500" dirty="0"/>
+                  <a:t>pierwiastek pierwotny stopnia </a:t>
+                </a:r>
+                <a14:m>
+                  <m:oMath xmlns:m="http://schemas.openxmlformats.org/officeDocument/2006/math">
+                    <m:r>
+                      <a:rPr lang="pl-PL" sz="1500" i="1" dirty="0" smtClean="0">
+                        <a:latin typeface="Cambria Math" panose="02040503050406030204" pitchFamily="18" charset="0"/>
+                      </a:rPr>
+                      <m:t>(</m:t>
+                    </m:r>
+                    <m:r>
+                      <a:rPr lang="pl-PL" sz="1500" i="1" dirty="0" smtClean="0">
+                        <a:latin typeface="Cambria Math" panose="02040503050406030204" pitchFamily="18" charset="0"/>
+                      </a:rPr>
+                      <m:t>𝑟</m:t>
+                    </m:r>
+                    <m:r>
+                      <a:rPr lang="pl-PL" sz="1500" i="1" dirty="0" smtClean="0">
+                        <a:latin typeface="Cambria Math" panose="02040503050406030204" pitchFamily="18" charset="0"/>
+                      </a:rPr>
+                      <m:t>−1)</m:t>
+                    </m:r>
+                  </m:oMath>
+                </a14:m>
+                <a:r>
+                  <a:rPr lang="pl-PL" sz="1500" dirty="0"/>
+                  <a:t>. Wielomian generujący w taki formacie wykrywa: wszystkie błędu 1-bitowe, 2-bitowe oraz wszystkie błędu o nieparzystej liczbie bitów.</a:t>
+                </a:r>
+                <a:br>
+                  <a:rPr lang="pl-PL" sz="1500" dirty="0"/>
+                </a:br>
+                <a:br>
+                  <a:rPr lang="pl-PL" sz="1500" dirty="0"/>
+                </a:br>
+                <a:r>
+                  <a:rPr lang="pl-PL" sz="1500" dirty="0"/>
+                  <a:t>Jedynie ma on krótszy maksymalny blok danych, w którym można wykryć błąd: </a:t>
+                </a:r>
+                <a14:m>
+                  <m:oMath xmlns:m="http://schemas.openxmlformats.org/officeDocument/2006/math">
+                    <m:sSup>
+                      <m:sSupPr>
+                        <m:ctrlPr>
+                          <a:rPr lang="pl-PL" sz="1500" i="1" dirty="0" smtClean="0">
+                            <a:latin typeface="Cambria Math" panose="02040503050406030204" pitchFamily="18" charset="0"/>
+                          </a:rPr>
+                        </m:ctrlPr>
+                      </m:sSupPr>
+                      <m:e>
+                        <m:r>
+                          <a:rPr lang="pl-PL" sz="1500" i="1" dirty="0" smtClean="0">
+                            <a:latin typeface="Cambria Math" panose="02040503050406030204" pitchFamily="18" charset="0"/>
+                          </a:rPr>
+                          <m:t>2</m:t>
+                        </m:r>
+                      </m:e>
+                      <m:sup>
+                        <m:r>
+                          <a:rPr lang="pl-PL" sz="1500" i="1" dirty="0" smtClean="0">
+                            <a:latin typeface="Cambria Math" panose="02040503050406030204" pitchFamily="18" charset="0"/>
+                          </a:rPr>
+                          <m:t>𝑟</m:t>
+                        </m:r>
+                        <m:r>
+                          <a:rPr lang="pl-PL" sz="1500" i="1" dirty="0" smtClean="0">
+                            <a:latin typeface="Cambria Math" panose="02040503050406030204" pitchFamily="18" charset="0"/>
+                          </a:rPr>
+                          <m:t>−1</m:t>
+                        </m:r>
+                      </m:sup>
+                    </m:sSup>
+                    <m:r>
+                      <a:rPr lang="pl-PL" sz="1500" i="1" dirty="0" smtClean="0">
+                        <a:latin typeface="Cambria Math" panose="02040503050406030204" pitchFamily="18" charset="0"/>
+                      </a:rPr>
+                      <m:t>– 1</m:t>
+                    </m:r>
+                  </m:oMath>
+                </a14:m>
+                <a:r>
+                  <a:rPr lang="pl-PL" sz="1500" dirty="0"/>
+                  <a:t>, czyli o połowę mniej niż w przypadku wielomianu generującego czysto pierwotnego.</a:t>
+                </a:r>
+              </a:p>
+              <a:p>
+                <a:r>
+                  <a:rPr lang="pl-PL" sz="1600" dirty="0"/>
+                  <a:t>A co w przypadku rozkładalnych wielomianów ?</a:t>
+                </a:r>
+                <a:br>
+                  <a:rPr lang="pl-PL" sz="1600" dirty="0"/>
+                </a:br>
+                <a:r>
+                  <a:rPr lang="pl-PL" sz="1600" dirty="0"/>
+                  <a:t>Wielomian G(x) jest rozkładalny, jeśli da się go zapisać jako:</a:t>
+                </a:r>
+                <a:br>
+                  <a:rPr lang="pl-PL" sz="1600" dirty="0"/>
+                </a:br>
+                <a14:m>
+                  <m:oMath xmlns:m="http://schemas.openxmlformats.org/officeDocument/2006/math">
+                    <m:r>
+                      <a:rPr lang="pl-PL" sz="1600" i="1" dirty="0" smtClean="0">
+                        <a:latin typeface="Cambria Math" panose="02040503050406030204" pitchFamily="18" charset="0"/>
+                      </a:rPr>
+                      <m:t>𝑔</m:t>
+                    </m:r>
+                    <m:r>
+                      <a:rPr lang="pl-PL" sz="1600" i="1" dirty="0" smtClean="0">
+                        <a:latin typeface="Cambria Math" panose="02040503050406030204" pitchFamily="18" charset="0"/>
+                      </a:rPr>
+                      <m:t>(</m:t>
+                    </m:r>
+                    <m:r>
+                      <a:rPr lang="pl-PL" sz="1600" i="1" dirty="0" smtClean="0">
+                        <a:latin typeface="Cambria Math" panose="02040503050406030204" pitchFamily="18" charset="0"/>
+                      </a:rPr>
+                      <m:t>𝑥</m:t>
+                    </m:r>
+                    <m:r>
+                      <a:rPr lang="pl-PL" sz="1600" i="1" dirty="0" smtClean="0">
+                        <a:latin typeface="Cambria Math" panose="02040503050406030204" pitchFamily="18" charset="0"/>
+                      </a:rPr>
+                      <m:t>) = </m:t>
+                    </m:r>
+                    <m:r>
+                      <a:rPr lang="pl-PL" sz="1600" i="1" dirty="0" smtClean="0">
+                        <a:latin typeface="Cambria Math" panose="02040503050406030204" pitchFamily="18" charset="0"/>
+                      </a:rPr>
+                      <m:t>𝑓</m:t>
+                    </m:r>
+                    <m:r>
+                      <a:rPr lang="pl-PL" sz="1600" i="1" dirty="0" smtClean="0">
+                        <a:latin typeface="Cambria Math" panose="02040503050406030204" pitchFamily="18" charset="0"/>
+                      </a:rPr>
+                      <m:t>(</m:t>
+                    </m:r>
+                    <m:r>
+                      <a:rPr lang="pl-PL" sz="1600" i="1" dirty="0" smtClean="0">
+                        <a:latin typeface="Cambria Math" panose="02040503050406030204" pitchFamily="18" charset="0"/>
+                      </a:rPr>
+                      <m:t>𝑥</m:t>
+                    </m:r>
+                    <m:r>
+                      <a:rPr lang="pl-PL" sz="1600" i="1" dirty="0" smtClean="0">
+                        <a:latin typeface="Cambria Math" panose="02040503050406030204" pitchFamily="18" charset="0"/>
+                      </a:rPr>
+                      <m:t>)∗</m:t>
+                    </m:r>
+                    <m:r>
+                      <a:rPr lang="pl-PL" sz="1600" i="1" dirty="0" smtClean="0">
+                        <a:latin typeface="Cambria Math" panose="02040503050406030204" pitchFamily="18" charset="0"/>
+                      </a:rPr>
+                      <m:t>h</m:t>
+                    </m:r>
+                    <m:r>
+                      <a:rPr lang="pl-PL" sz="1600" i="1" dirty="0" smtClean="0">
+                        <a:latin typeface="Cambria Math" panose="02040503050406030204" pitchFamily="18" charset="0"/>
+                      </a:rPr>
+                      <m:t>(</m:t>
+                    </m:r>
+                    <m:r>
+                      <a:rPr lang="pl-PL" sz="1600" i="1" dirty="0" smtClean="0">
+                        <a:latin typeface="Cambria Math" panose="02040503050406030204" pitchFamily="18" charset="0"/>
+                      </a:rPr>
+                      <m:t>𝑥</m:t>
+                    </m:r>
+                    <m:r>
+                      <a:rPr lang="pl-PL" sz="1600" i="1" dirty="0" smtClean="0">
+                        <a:latin typeface="Cambria Math" panose="02040503050406030204" pitchFamily="18" charset="0"/>
+                      </a:rPr>
+                      <m:t>)</m:t>
+                    </m:r>
+                  </m:oMath>
+                </a14:m>
+                <a:br>
+                  <a:rPr lang="pl-PL" sz="1600" dirty="0"/>
+                </a:br>
+                <a:r>
+                  <a:rPr lang="pl-PL" sz="1600" dirty="0"/>
+                  <a:t>Wtedy pierścień resztkowy nie jest ciałem, tylko ma w sobie tzw. Zero-dzielniki. Są to takie elementy a(x), dla którego istnieje element niezerowy b(x), że:</a:t>
+                </a:r>
+                <a:br>
+                  <a:rPr lang="pl-PL" sz="1600" dirty="0"/>
+                </a:br>
+                <a14:m>
+                  <m:oMath xmlns:m="http://schemas.openxmlformats.org/officeDocument/2006/math">
+                    <m:r>
+                      <a:rPr lang="pl-PL" sz="1600" i="1" dirty="0" smtClean="0">
+                        <a:latin typeface="Cambria Math" panose="02040503050406030204" pitchFamily="18" charset="0"/>
+                      </a:rPr>
+                      <m:t>𝑎</m:t>
+                    </m:r>
+                    <m:d>
+                      <m:dPr>
+                        <m:ctrlPr>
+                          <a:rPr lang="pl-PL" sz="1600" i="1" dirty="0" smtClean="0">
+                            <a:latin typeface="Cambria Math" panose="02040503050406030204" pitchFamily="18" charset="0"/>
+                          </a:rPr>
+                        </m:ctrlPr>
+                      </m:dPr>
+                      <m:e>
+                        <m:r>
+                          <a:rPr lang="pl-PL" sz="1600" i="1" dirty="0" smtClean="0">
+                            <a:latin typeface="Cambria Math" panose="02040503050406030204" pitchFamily="18" charset="0"/>
+                          </a:rPr>
+                          <m:t>𝑥</m:t>
+                        </m:r>
+                      </m:e>
+                    </m:d>
+                    <m:r>
+                      <a:rPr lang="pl-PL" sz="1600" i="1" dirty="0" smtClean="0">
+                        <a:latin typeface="Cambria Math" panose="02040503050406030204" pitchFamily="18" charset="0"/>
+                      </a:rPr>
+                      <m:t>∗</m:t>
+                    </m:r>
+                    <m:r>
+                      <a:rPr lang="pl-PL" sz="1600" i="1" dirty="0" smtClean="0">
+                        <a:latin typeface="Cambria Math" panose="02040503050406030204" pitchFamily="18" charset="0"/>
+                      </a:rPr>
+                      <m:t>𝑏</m:t>
+                    </m:r>
+                    <m:d>
+                      <m:dPr>
+                        <m:ctrlPr>
+                          <a:rPr lang="pl-PL" sz="1600" i="1" dirty="0" smtClean="0">
+                            <a:latin typeface="Cambria Math" panose="02040503050406030204" pitchFamily="18" charset="0"/>
+                          </a:rPr>
+                        </m:ctrlPr>
+                      </m:dPr>
+                      <m:e>
+                        <m:r>
+                          <a:rPr lang="pl-PL" sz="1600" i="1" dirty="0" smtClean="0">
+                            <a:latin typeface="Cambria Math" panose="02040503050406030204" pitchFamily="18" charset="0"/>
+                          </a:rPr>
+                          <m:t>𝑥</m:t>
+                        </m:r>
+                      </m:e>
+                    </m:d>
+                    <m:r>
+                      <a:rPr lang="pl-PL" sz="1600" i="1" dirty="0" smtClean="0">
+                        <a:latin typeface="Cambria Math" panose="02040503050406030204" pitchFamily="18" charset="0"/>
+                      </a:rPr>
+                      <m:t>= 0 </m:t>
+                    </m:r>
+                    <m:r>
+                      <a:rPr lang="pl-PL" sz="1600" i="1" dirty="0" err="1" smtClean="0">
+                        <a:latin typeface="Cambria Math" panose="02040503050406030204" pitchFamily="18" charset="0"/>
+                      </a:rPr>
+                      <m:t>𝑚𝑜𝑑</m:t>
+                    </m:r>
+                    <m:r>
+                      <a:rPr lang="pl-PL" sz="1600" i="1" dirty="0" smtClean="0">
+                        <a:latin typeface="Cambria Math" panose="02040503050406030204" pitchFamily="18" charset="0"/>
+                      </a:rPr>
+                      <m:t> </m:t>
+                    </m:r>
+                    <m:r>
+                      <a:rPr lang="pl-PL" sz="1600" i="1" dirty="0" smtClean="0">
+                        <a:latin typeface="Cambria Math" panose="02040503050406030204" pitchFamily="18" charset="0"/>
+                      </a:rPr>
+                      <m:t>𝑔</m:t>
+                    </m:r>
+                    <m:d>
+                      <m:dPr>
+                        <m:ctrlPr>
+                          <a:rPr lang="pl-PL" sz="1600" i="1" dirty="0" smtClean="0">
+                            <a:latin typeface="Cambria Math" panose="02040503050406030204" pitchFamily="18" charset="0"/>
+                          </a:rPr>
+                        </m:ctrlPr>
+                      </m:dPr>
+                      <m:e>
+                        <m:r>
+                          <a:rPr lang="pl-PL" sz="1600" i="1" dirty="0" smtClean="0">
+                            <a:latin typeface="Cambria Math" panose="02040503050406030204" pitchFamily="18" charset="0"/>
+                          </a:rPr>
+                          <m:t>𝑥</m:t>
+                        </m:r>
+                      </m:e>
+                    </m:d>
+                  </m:oMath>
+                </a14:m>
+                <a:br>
+                  <a:rPr lang="pl-PL" sz="1600" dirty="0"/>
+                </a:br>
+                <a:r>
+                  <a:rPr lang="pl-PL" sz="1600" dirty="0"/>
+                  <a:t>Zatem jeśli jakiś błąd przyjmie taką właśnie postać, to nie będziemy w stanie go wykryć za pomocą CRC.</a:t>
+                </a:r>
+              </a:p>
+            </p:txBody>
+          </p:sp>
+        </mc:Choice>
+        <mc:Fallback>
+          <p:sp>
+            <p:nvSpPr>
+              <p:cNvPr id="10" name="Zawartość — symbol zastępczy 8">
+                <a:extLst>
+                  <a:ext uri="{FF2B5EF4-FFF2-40B4-BE49-F238E27FC236}">
+                    <a16:creationId xmlns:a16="http://schemas.microsoft.com/office/drawing/2014/main" id="{66708DB3-BBD8-280A-4DF1-4098EAC933B9}"/>
+                  </a:ext>
+                </a:extLst>
+              </p:cNvPr>
+              <p:cNvSpPr txBox="1">
+                <a:spLocks noRot="1" noChangeAspect="1" noMove="1" noResize="1" noEditPoints="1" noAdjustHandles="1" noChangeArrowheads="1" noChangeShapeType="1" noTextEdit="1"/>
+              </p:cNvSpPr>
+              <p:nvPr/>
+            </p:nvSpPr>
+            <p:spPr>
+              <a:xfrm>
+                <a:off x="430789" y="944597"/>
+                <a:ext cx="11090274" cy="5326893"/>
+              </a:xfrm>
+              <a:prstGeom prst="rect">
+                <a:avLst/>
+              </a:prstGeom>
+              <a:blipFill>
+                <a:blip r:embed="rId2"/>
+                <a:stretch>
+                  <a:fillRect l="-330" t="-343" r="-220"/>
+                </a:stretch>
+              </a:blipFill>
+            </p:spPr>
+            <p:txBody>
+              <a:bodyPr/>
+              <a:lstStyle/>
+              <a:p>
+                <a:r>
+                  <a:rPr lang="pl-PL">
+                    <a:noFill/>
+                  </a:rPr>
+                  <a:t> </a:t>
+                </a:r>
+              </a:p>
+            </p:txBody>
+          </p:sp>
+        </mc:Fallback>
+      </mc:AlternateContent>
+    </p:spTree>
+    <p:extLst>
+      <p:ext uri="{BB962C8B-B14F-4D97-AF65-F5344CB8AC3E}">
+        <p14:creationId xmlns:p14="http://schemas.microsoft.com/office/powerpoint/2010/main" val="3152177789"/>
+      </p:ext>
+    </p:extLst>
+  </p:cSld>
+  <p:clrMapOvr>
+    <a:masterClrMapping/>
+  </p:clrMapOvr>
+</p:sld>
+</file>
+
+<file path=ppt/slides/slide7.xml><?xml version="1.0" encoding="utf-8"?>
+<p:sld xmlns:a="http://schemas.openxmlformats.org/drawingml/2006/main" xmlns:r="http://schemas.openxmlformats.org/officeDocument/2006/relationships" xmlns:p="http://schemas.openxmlformats.org/presentationml/2006/main">
+  <p:cSld>
+    <p:spTree>
+      <p:nvGrpSpPr>
+        <p:cNvPr id="1" name=""/>
+        <p:cNvGrpSpPr/>
+        <p:nvPr/>
+      </p:nvGrpSpPr>
+      <p:grpSpPr>
+        <a:xfrm>
+          <a:off x="0" y="0"/>
+          <a:ext cx="0" cy="0"/>
+          <a:chOff x="0" y="0"/>
+          <a:chExt cx="0" cy="0"/>
+        </a:xfrm>
+      </p:grpSpPr>
+      <p:sp>
+        <p:nvSpPr>
+          <p:cNvPr id="2" name="Tytuł 1">
+            <a:extLst>
+              <a:ext uri="{FF2B5EF4-FFF2-40B4-BE49-F238E27FC236}">
+                <a16:creationId xmlns:a16="http://schemas.microsoft.com/office/drawing/2014/main" id="{3A21D8B7-E5B0-7582-2B4A-AA51CDE17638}"/>
+              </a:ext>
+            </a:extLst>
+          </p:cNvPr>
+          <p:cNvSpPr>
+            <a:spLocks noGrp="1"/>
+          </p:cNvSpPr>
+          <p:nvPr>
+            <p:ph type="title"/>
+          </p:nvPr>
+        </p:nvSpPr>
+        <p:spPr/>
+        <p:txBody>
+          <a:bodyPr/>
+          <a:lstStyle/>
+          <a:p>
+            <a:endParaRPr lang="pl-PL"/>
+          </a:p>
+        </p:txBody>
+      </p:sp>
+      <p:sp>
+        <p:nvSpPr>
+          <p:cNvPr id="3" name="Symbol zastępczy zawartości 2">
+            <a:extLst>
+              <a:ext uri="{FF2B5EF4-FFF2-40B4-BE49-F238E27FC236}">
+                <a16:creationId xmlns:a16="http://schemas.microsoft.com/office/drawing/2014/main" id="{98DF8D17-2DD5-199C-58E2-91C5B895A1C8}"/>
+              </a:ext>
+            </a:extLst>
+          </p:cNvPr>
+          <p:cNvSpPr>
+            <a:spLocks noGrp="1"/>
+          </p:cNvSpPr>
+          <p:nvPr>
+            <p:ph sz="quarter" idx="15"/>
+          </p:nvPr>
+        </p:nvSpPr>
+        <p:spPr/>
+        <p:txBody>
+          <a:bodyPr/>
+          <a:lstStyle/>
+          <a:p>
+            <a:endParaRPr lang="pl-PL"/>
+          </a:p>
+        </p:txBody>
+      </p:sp>
+      <p:sp>
+        <p:nvSpPr>
+          <p:cNvPr id="4" name="Symbol zastępczy obrazu 3">
+            <a:extLst>
+              <a:ext uri="{FF2B5EF4-FFF2-40B4-BE49-F238E27FC236}">
+                <a16:creationId xmlns:a16="http://schemas.microsoft.com/office/drawing/2014/main" id="{89EE3B3D-82A8-C5B2-45C4-43C4CD794367}"/>
+              </a:ext>
+            </a:extLst>
+          </p:cNvPr>
+          <p:cNvSpPr>
+            <a:spLocks noGrp="1"/>
+          </p:cNvSpPr>
+          <p:nvPr>
+            <p:ph type="pic" sz="quarter" idx="13"/>
+          </p:nvPr>
+        </p:nvSpPr>
+        <p:spPr/>
+        <p:txBody>
+          <a:bodyPr/>
+          <a:lstStyle/>
+          <a:p>
+            <a:endParaRPr lang="pl-PL"/>
+          </a:p>
+        </p:txBody>
+      </p:sp>
+      <p:sp>
+        <p:nvSpPr>
+          <p:cNvPr id="5" name="Symbol zastępczy daty 4">
+            <a:extLst>
+              <a:ext uri="{FF2B5EF4-FFF2-40B4-BE49-F238E27FC236}">
+                <a16:creationId xmlns:a16="http://schemas.microsoft.com/office/drawing/2014/main" id="{911D19DC-90C1-9509-6C34-115ACB1C4B0D}"/>
+              </a:ext>
+            </a:extLst>
+          </p:cNvPr>
+          <p:cNvSpPr>
+            <a:spLocks noGrp="1"/>
+          </p:cNvSpPr>
+          <p:nvPr>
+            <p:ph type="dt" sz="half" idx="10"/>
+          </p:nvPr>
+        </p:nvSpPr>
+        <p:spPr/>
+        <p:txBody>
+          <a:bodyPr/>
+          <a:lstStyle/>
+          <a:p>
+            <a:pPr rtl="0"/>
+            <a:r>
+              <a:rPr lang="pl-PL"/>
+              <a:t>Wtorek, 2 lutego 20XX</a:t>
+            </a:r>
+          </a:p>
+        </p:txBody>
+      </p:sp>
+      <p:sp>
+        <p:nvSpPr>
+          <p:cNvPr id="6" name="Symbol zastępczy stopki 5">
+            <a:extLst>
+              <a:ext uri="{FF2B5EF4-FFF2-40B4-BE49-F238E27FC236}">
+                <a16:creationId xmlns:a16="http://schemas.microsoft.com/office/drawing/2014/main" id="{E8BE03B6-8D4E-1FCD-3186-B7FC1FF8CC2D}"/>
+              </a:ext>
+            </a:extLst>
+          </p:cNvPr>
+          <p:cNvSpPr>
+            <a:spLocks noGrp="1"/>
+          </p:cNvSpPr>
+          <p:nvPr>
+            <p:ph type="ftr" sz="quarter" idx="11"/>
+          </p:nvPr>
+        </p:nvSpPr>
+        <p:spPr/>
+        <p:txBody>
+          <a:bodyPr/>
+          <a:lstStyle/>
+          <a:p>
+            <a:pPr rtl="0"/>
+            <a:r>
+              <a:rPr lang="pl-PL"/>
+              <a:t>Przykładowy tekst stopki</a:t>
+            </a:r>
+          </a:p>
+        </p:txBody>
+      </p:sp>
+      <p:sp>
+        <p:nvSpPr>
+          <p:cNvPr id="7" name="Symbol zastępczy numeru slajdu 6">
+            <a:extLst>
+              <a:ext uri="{FF2B5EF4-FFF2-40B4-BE49-F238E27FC236}">
+                <a16:creationId xmlns:a16="http://schemas.microsoft.com/office/drawing/2014/main" id="{B0E4ADD1-4AAF-FCFB-2523-C3B18693E959}"/>
+              </a:ext>
+            </a:extLst>
+          </p:cNvPr>
+          <p:cNvSpPr>
+            <a:spLocks noGrp="1"/>
+          </p:cNvSpPr>
+          <p:nvPr>
+            <p:ph type="sldNum" sz="quarter" idx="12"/>
+          </p:nvPr>
+        </p:nvSpPr>
+        <p:spPr/>
+        <p:txBody>
+          <a:bodyPr/>
+          <a:lstStyle/>
+          <a:p>
+            <a:pPr rtl="0"/>
+            <a:fld id="{DBA1B0FB-D917-4C8C-928F-313BD683BF39}" type="slidenum">
+              <a:rPr lang="pl-PL" smtClean="0"/>
+              <a:t>7</a:t>
+            </a:fld>
+            <a:endParaRPr lang="pl-PL"/>
+          </a:p>
+        </p:txBody>
+      </p:sp>
+    </p:spTree>
+    <p:extLst>
+      <p:ext uri="{BB962C8B-B14F-4D97-AF65-F5344CB8AC3E}">
+        <p14:creationId xmlns:p14="http://schemas.microsoft.com/office/powerpoint/2010/main" val="3436805233"/>
+      </p:ext>
+    </p:extLst>
+  </p:cSld>
+  <p:clrMapOvr>
+    <a:masterClrMapping/>
+  </p:clrMapOvr>
+</p:sld>
+</file>
+
+<file path=ppt/slides/slide8.xml><?xml version="1.0" encoding="utf-8"?>
+<p:sld xmlns:a="http://schemas.openxmlformats.org/drawingml/2006/main" xmlns:r="http://schemas.openxmlformats.org/officeDocument/2006/relationships" xmlns:p="http://schemas.openxmlformats.org/presentationml/2006/main">
+  <p:cSld>
+    <p:spTree>
+      <p:nvGrpSpPr>
+        <p:cNvPr id="1" name=""/>
+        <p:cNvGrpSpPr/>
+        <p:nvPr/>
+      </p:nvGrpSpPr>
+      <p:grpSpPr>
+        <a:xfrm>
+          <a:off x="0" y="0"/>
+          <a:ext cx="0" cy="0"/>
+          <a:chOff x="0" y="0"/>
+          <a:chExt cx="0" cy="0"/>
+        </a:xfrm>
+      </p:grpSpPr>
+      <p:sp>
+        <p:nvSpPr>
           <p:cNvPr id="12" name="Title 1">
             <a:extLst>
               <a:ext uri="{FF2B5EF4-FFF2-40B4-BE49-F238E27FC236}">
@@ -23922,7 +24993,7 @@
                   <a:spcPts val="600"/>
                 </a:spcAft>
               </a:pPr>
-              <a:t>6</a:t>
+              <a:t>8</a:t>
             </a:fld>
             <a:endParaRPr lang="pl-PL"/>
           </a:p>
@@ -24001,7 +25072,7 @@
 </p:sld>
 </file>
 
-<file path=ppt/slides/slide7.xml><?xml version="1.0" encoding="utf-8"?>
+<file path=ppt/slides/slide9.xml><?xml version="1.0" encoding="utf-8"?>
 <p:sld xmlns:a="http://schemas.openxmlformats.org/drawingml/2006/main" xmlns:r="http://schemas.openxmlformats.org/officeDocument/2006/relationships" xmlns:p="http://schemas.openxmlformats.org/presentationml/2006/main">
   <p:cSld>
     <p:spTree>
@@ -24054,75 +25125,6 @@
       </p:sp>
       <p:sp>
         <p:nvSpPr>
-          <p:cNvPr id="4" name="Data — symbol zastępczy 3">
-            <a:extLst>
-              <a:ext uri="{FF2B5EF4-FFF2-40B4-BE49-F238E27FC236}">
-                <a16:creationId xmlns:a16="http://schemas.microsoft.com/office/drawing/2014/main" id="{E39EF484-38C8-4EDC-ACF5-695CFB216839}"/>
-              </a:ext>
-            </a:extLst>
-          </p:cNvPr>
-          <p:cNvSpPr>
-            <a:spLocks noGrp="1"/>
-          </p:cNvSpPr>
-          <p:nvPr>
-            <p:ph type="dt" sz="half" idx="10"/>
-          </p:nvPr>
-        </p:nvSpPr>
-        <p:spPr>
-          <a:xfrm>
-            <a:off x="550863" y="6507212"/>
-            <a:ext cx="2628900" cy="153888"/>
-          </a:xfrm>
-        </p:spPr>
-        <p:txBody>
-          <a:bodyPr rtlCol="0"/>
-          <a:lstStyle/>
-          <a:p>
-            <a:pPr rtl="0"/>
-            <a:r>
-              <a:rPr lang="pl-PL"/>
-              <a:t>Wtorek, 2 lutego 20XX</a:t>
-            </a:r>
-            <a:endParaRPr lang="pl-PL" dirty="0"/>
-          </a:p>
-        </p:txBody>
-      </p:sp>
-      <p:sp>
-        <p:nvSpPr>
-          <p:cNvPr id="5" name="Stopka — symbol zastępczy 4">
-            <a:extLst>
-              <a:ext uri="{FF2B5EF4-FFF2-40B4-BE49-F238E27FC236}">
-                <a16:creationId xmlns:a16="http://schemas.microsoft.com/office/drawing/2014/main" id="{AFD183D7-B16E-4A9D-BC4B-D1EC347BF97E}"/>
-              </a:ext>
-            </a:extLst>
-          </p:cNvPr>
-          <p:cNvSpPr>
-            <a:spLocks noGrp="1"/>
-          </p:cNvSpPr>
-          <p:nvPr>
-            <p:ph type="ftr" sz="quarter" idx="11"/>
-          </p:nvPr>
-        </p:nvSpPr>
-        <p:spPr>
-          <a:xfrm>
-            <a:off x="3359150" y="6507212"/>
-            <a:ext cx="6379210" cy="153888"/>
-          </a:xfrm>
-        </p:spPr>
-        <p:txBody>
-          <a:bodyPr rtlCol="0"/>
-          <a:lstStyle/>
-          <a:p>
-            <a:pPr rtl="0"/>
-            <a:r>
-              <a:rPr lang="pl-PL"/>
-              <a:t>Przykładowy tekst stopki</a:t>
-            </a:r>
-          </a:p>
-        </p:txBody>
-      </p:sp>
-      <p:sp>
-        <p:nvSpPr>
           <p:cNvPr id="6" name="Numer slajdu — symbol zastępczy 5">
             <a:extLst>
               <a:ext uri="{FF2B5EF4-FFF2-40B4-BE49-F238E27FC236}">
@@ -24151,14 +25153,14 @@
             <a:fld id="{DBA1B0FB-D917-4C8C-928F-313BD683BF39}" type="slidenum">
               <a:rPr lang="pl-PL" smtClean="0"/>
               <a:pPr rtl="0"/>
-              <a:t>7</a:t>
+              <a:t>9</a:t>
             </a:fld>
             <a:endParaRPr lang="pl-PL"/>
           </a:p>
         </p:txBody>
       </p:sp>
-      <mc:AlternateContent xmlns:mc="http://schemas.openxmlformats.org/markup-compatibility/2006" xmlns:a14="http://schemas.microsoft.com/office/drawing/2010/main">
-        <mc:Choice Requires="a14">
+      <mc:AlternateContent xmlns:mc="http://schemas.openxmlformats.org/markup-compatibility/2006">
+        <mc:Choice xmlns:a14="http://schemas.microsoft.com/office/drawing/2010/main" Requires="a14">
           <p:sp>
             <p:nvSpPr>
               <p:cNvPr id="3" name="Symbol zastępczy zawartości 2">
@@ -24175,81 +25177,45 @@
                 <p:ph idx="1"/>
               </p:nvPr>
             </p:nvSpPr>
-            <p:spPr/>
+            <p:spPr>
+              <a:xfrm>
+                <a:off x="550862" y="1219200"/>
+                <a:ext cx="11188555" cy="5375563"/>
+              </a:xfrm>
+            </p:spPr>
             <p:txBody>
               <a:bodyPr/>
               <a:lstStyle/>
               <a:p>
+                <a:pPr marL="0" indent="0">
+                  <a:buNone/>
+                </a:pPr>
                 <a:r>
-                  <a:rPr lang="pl-PL" dirty="0"/>
-                  <a:t>CRC opiera się na teorii systematycznych kodów cyklicznych. Kody cykliczne są szczególnie efektywne w wykrywaniu tzw. błędów grupowych ( </a:t>
-                </a:r>
-                <a:r>
-                  <a:rPr lang="pl-PL" b="1" i="1" dirty="0" err="1"/>
-                  <a:t>burst</a:t>
-                </a:r>
-                <a:r>
-                  <a:rPr lang="pl-PL" b="1" i="1" dirty="0"/>
-                  <a:t> </a:t>
-                </a:r>
-                <a:r>
-                  <a:rPr lang="pl-PL" b="1" i="1" dirty="0" err="1"/>
-                  <a:t>errors</a:t>
-                </a:r>
-                <a:r>
-                  <a:rPr lang="pl-PL" dirty="0"/>
-                  <a:t> ).  Wynika to z faktu iż błąd grupowy jest to po prostu ciąg błędnych bitów o długości </a:t>
+                  <a:rPr lang="pl-PL" sz="1500" dirty="0"/>
+                  <a:t>Jeśli dane zostaną zmienione ( np. przez zakłócenie transmisji ), to odebrany ciąg będzie się różnił od oryginału. Tę różnicę zapisuje się jako wielomian błędu </a:t>
                 </a:r>
                 <a14:m>
                   <m:oMath xmlns:m="http://schemas.openxmlformats.org/officeDocument/2006/math">
                     <m:r>
-                      <a:rPr lang="pl-PL" i="1" dirty="0" smtClean="0">
-                        <a:latin typeface="Cambria Math" panose="02040503050406030204" pitchFamily="18" charset="0"/>
-                      </a:rPr>
-                      <m:t>𝐿</m:t>
-                    </m:r>
-                  </m:oMath>
-                </a14:m>
-                <a:r>
-                  <a:rPr lang="pl-PL" dirty="0"/>
-                  <a:t> np. </a:t>
-                </a:r>
-                <a14:m>
-                  <m:oMath xmlns:m="http://schemas.openxmlformats.org/officeDocument/2006/math">
-                    <m:r>
-                      <a:rPr lang="pl-PL" i="1" dirty="0" smtClean="0">
-                        <a:latin typeface="Cambria Math" panose="02040503050406030204" pitchFamily="18" charset="0"/>
-                      </a:rPr>
-                      <m:t>0011100</m:t>
-                    </m:r>
-                  </m:oMath>
-                </a14:m>
-                <a:r>
-                  <a:rPr lang="pl-PL" dirty="0"/>
-                  <a:t>, gdzie błędy występują na sąsiadujących pozycjach. Matematycznie takowy błąd może zostać przedstawiony jako wielomian </a:t>
-                </a:r>
-                <a14:m>
-                  <m:oMath xmlns:m="http://schemas.openxmlformats.org/officeDocument/2006/math">
-                    <m:r>
-                      <a:rPr lang="pl-PL" i="1" dirty="0" smtClean="0">
+                      <a:rPr lang="pl-PL" sz="1500" i="1" dirty="0" smtClean="0">
                         <a:latin typeface="Cambria Math" panose="02040503050406030204" pitchFamily="18" charset="0"/>
                       </a:rPr>
                       <m:t>𝐸</m:t>
                     </m:r>
                     <m:r>
-                      <a:rPr lang="pl-PL" i="1" dirty="0" smtClean="0">
+                      <a:rPr lang="pl-PL" sz="1500" i="1" dirty="0" smtClean="0">
                         <a:latin typeface="Cambria Math" panose="02040503050406030204" pitchFamily="18" charset="0"/>
                       </a:rPr>
                       <m:t>(</m:t>
                     </m:r>
                     <m:r>
-                      <a:rPr lang="pl-PL" i="1" dirty="0" smtClean="0">
+                      <a:rPr lang="pl-PL" sz="1500" i="1" dirty="0" smtClean="0">
                         <a:latin typeface="Cambria Math" panose="02040503050406030204" pitchFamily="18" charset="0"/>
                       </a:rPr>
                       <m:t>𝑥</m:t>
                     </m:r>
                     <m:r>
-                      <a:rPr lang="pl-PL" i="1" dirty="0" smtClean="0">
+                      <a:rPr lang="pl-PL" sz="1500" i="1" dirty="0" smtClean="0">
                         <a:latin typeface="Cambria Math" panose="02040503050406030204" pitchFamily="18" charset="0"/>
                       </a:rPr>
                       <m:t>)</m:t>
@@ -24257,118 +25223,73 @@
                   </m:oMath>
                 </a14:m>
                 <a:r>
-                  <a:rPr lang="pl-PL" dirty="0"/>
-                  <a:t> ( stopnień takiego wielomianu jest ograniczony przez długość </a:t>
+                  <a:rPr lang="pl-PL" sz="1500" dirty="0"/>
+                  <a:t>.</a:t>
                 </a:r>
+                <a:br>
+                  <a:rPr lang="pl-PL" sz="1500" dirty="0"/>
+                </a:br>
+                <a:br>
+                  <a:rPr lang="pl-PL" sz="1500" dirty="0"/>
+                </a:br>
                 <a:r>
-                  <a:rPr lang="pl-PL" dirty="0" err="1"/>
-                  <a:t>burst</a:t>
-                </a:r>
-                <a:r>
-                  <a:rPr lang="pl-PL" dirty="0"/>
-                  <a:t>-u  </a:t>
+                  <a:rPr lang="pl-PL" sz="1500" dirty="0"/>
+                  <a:t>CRC będzie w stanie wykryć błąd tylko wtedy gdy </a:t>
                 </a:r>
                 <a14:m>
                   <m:oMath xmlns:m="http://schemas.openxmlformats.org/officeDocument/2006/math">
                     <m:r>
-                      <a:rPr lang="pl-PL" b="0" i="0" dirty="0" smtClean="0">
-                        <a:latin typeface="Cambria Math" panose="02040503050406030204" pitchFamily="18" charset="0"/>
-                      </a:rPr>
-                      <m:t>→</m:t>
-                    </m:r>
-                    <m:r>
-                      <a:rPr lang="pl-PL" i="1" dirty="0" smtClean="0">
-                        <a:latin typeface="Cambria Math" panose="02040503050406030204" pitchFamily="18" charset="0"/>
-                      </a:rPr>
-                      <m:t>𝐿</m:t>
-                    </m:r>
-                    <m:r>
-                      <a:rPr lang="pl-PL" i="1" dirty="0" smtClean="0">
-                        <a:latin typeface="Cambria Math" panose="02040503050406030204" pitchFamily="18" charset="0"/>
-                      </a:rPr>
-                      <m:t>−1</m:t>
-                    </m:r>
-                  </m:oMath>
-                </a14:m>
-                <a:r>
-                  <a:rPr lang="pl-PL" dirty="0"/>
-                  <a:t> dla naszego przykładu ).  CRC gwarantuje wykrycie wszystkich błędów grupowych o długości </a:t>
-                </a:r>
-                <a14:m>
-                  <m:oMath xmlns:m="http://schemas.openxmlformats.org/officeDocument/2006/math">
-                    <m:r>
-                      <a:rPr lang="pl-PL" i="1" dirty="0" smtClean="0">
-                        <a:latin typeface="Cambria Math" panose="02040503050406030204" pitchFamily="18" charset="0"/>
-                      </a:rPr>
-                      <m:t>𝐿</m:t>
-                    </m:r>
-                    <m:r>
-                      <a:rPr lang="pl-PL" i="1" dirty="0" smtClean="0">
-                        <a:latin typeface="Cambria Math" panose="02040503050406030204" pitchFamily="18" charset="0"/>
-                      </a:rPr>
-                      <m:t> ≤ </m:t>
-                    </m:r>
-                    <m:r>
-                      <a:rPr lang="pl-PL" i="1" dirty="0" smtClean="0">
-                        <a:latin typeface="Cambria Math" panose="02040503050406030204" pitchFamily="18" charset="0"/>
-                      </a:rPr>
-                      <m:t>𝑛</m:t>
-                    </m:r>
-                    <m:r>
-                      <a:rPr lang="pl-PL" i="1" dirty="0" smtClean="0">
-                        <a:latin typeface="Cambria Math" panose="02040503050406030204" pitchFamily="18" charset="0"/>
-                      </a:rPr>
-                      <m:t>+1</m:t>
-                    </m:r>
-                  </m:oMath>
-                </a14:m>
-                <a:r>
-                  <a:rPr lang="pl-PL" dirty="0"/>
-                  <a:t>,  gdzie </a:t>
-                </a:r>
-                <a14:m>
-                  <m:oMath xmlns:m="http://schemas.openxmlformats.org/officeDocument/2006/math">
-                    <m:r>
-                      <a:rPr lang="pl-PL" i="1" dirty="0" smtClean="0">
-                        <a:latin typeface="Cambria Math" panose="02040503050406030204" pitchFamily="18" charset="0"/>
-                      </a:rPr>
-                      <m:t>𝑛</m:t>
-                    </m:r>
-                  </m:oMath>
-                </a14:m>
-                <a:r>
-                  <a:rPr lang="pl-PL" dirty="0"/>
-                  <a:t> to stopień wielomianu generującego. </a:t>
-                </a:r>
-                <a:br>
-                  <a:rPr lang="pl-PL" dirty="0"/>
-                </a:br>
-                <a:r>
-                  <a:rPr lang="pl-PL" dirty="0"/>
-                  <a:t>Fakt ten wynika z tego, że wielomian błędu </a:t>
-                </a:r>
-                <a14:m>
-                  <m:oMath xmlns:m="http://schemas.openxmlformats.org/officeDocument/2006/math">
-                    <m:r>
-                      <a:rPr lang="pl-PL" i="1" dirty="0" smtClean="0">
+                      <a:rPr lang="pl-PL" sz="1500" i="1" dirty="0" smtClean="0">
                         <a:latin typeface="Cambria Math" panose="02040503050406030204" pitchFamily="18" charset="0"/>
                       </a:rPr>
                       <m:t>𝐸</m:t>
                     </m:r>
                     <m:r>
-                      <a:rPr lang="pl-PL" i="1" dirty="0" smtClean="0">
+                      <a:rPr lang="pl-PL" sz="1500" i="1" dirty="0" smtClean="0">
                         <a:latin typeface="Cambria Math" panose="02040503050406030204" pitchFamily="18" charset="0"/>
                       </a:rPr>
                       <m:t>(</m:t>
                     </m:r>
                     <m:r>
-                      <a:rPr lang="pl-PL" i="1" dirty="0" smtClean="0">
+                      <a:rPr lang="pl-PL" sz="1500" i="1" dirty="0" smtClean="0">
                         <a:latin typeface="Cambria Math" panose="02040503050406030204" pitchFamily="18" charset="0"/>
                       </a:rPr>
                       <m:t>𝑥</m:t>
                     </m:r>
                     <m:r>
-                      <a:rPr lang="pl-PL" i="1" dirty="0" smtClean="0">
+                      <a:rPr lang="pl-PL" sz="1500" i="1" dirty="0" smtClean="0">
+                        <a:latin typeface="Cambria Math" panose="02040503050406030204" pitchFamily="18" charset="0"/>
+                      </a:rPr>
+                      <m:t>) </m:t>
+                    </m:r>
+                  </m:oMath>
+                </a14:m>
+                <a:r>
+                  <a:rPr lang="pl-PL" sz="1500" dirty="0"/>
+                  <a:t>nie dzieli się przez </a:t>
+                </a:r>
+                <a14:m>
+                  <m:oMath xmlns:m="http://schemas.openxmlformats.org/officeDocument/2006/math">
+                    <m:r>
+                      <a:rPr lang="pl-PL" sz="1500" i="1" dirty="0" smtClean="0">
+                        <a:latin typeface="Cambria Math" panose="02040503050406030204" pitchFamily="18" charset="0"/>
+                      </a:rPr>
+                      <m:t>𝐺</m:t>
+                    </m:r>
+                    <m:r>
+                      <a:rPr lang="pl-PL" sz="1500" i="1" dirty="0" smtClean="0">
+                        <a:latin typeface="Cambria Math" panose="02040503050406030204" pitchFamily="18" charset="0"/>
+                      </a:rPr>
+                      <m:t>(</m:t>
+                    </m:r>
+                    <m:r>
+                      <a:rPr lang="pl-PL" sz="1500" i="1" dirty="0" smtClean="0">
+                        <a:latin typeface="Cambria Math" panose="02040503050406030204" pitchFamily="18" charset="0"/>
+                      </a:rPr>
+                      <m:t>𝑥</m:t>
+                    </m:r>
+                    <m:r>
+                      <a:rPr lang="pl-PL" sz="1500" i="1" dirty="0" smtClean="0">
                         <a:latin typeface="Cambria Math" panose="02040503050406030204" pitchFamily="18" charset="0"/>
                       </a:rPr>
                       <m:t>)</m:t>
@@ -24376,31 +25297,396 @@
                   </m:oMath>
                 </a14:m>
                 <a:r>
-                  <a:rPr lang="pl-PL" dirty="0"/>
-                  <a:t> musi być podzielny przez </a:t>
+                  <a:rPr lang="pl-PL" sz="1500" dirty="0"/>
+                  <a:t>.</a:t>
+                </a:r>
+                <a:br>
+                  <a:rPr lang="pl-PL" sz="1500" dirty="0"/>
+                </a:br>
+                <a:br>
+                  <a:rPr lang="pl-PL" sz="1500" dirty="0"/>
+                </a:br>
+                <a:r>
+                  <a:rPr lang="pl-PL" sz="1500" dirty="0"/>
+                  <a:t>Jakie błędy zatem jesteśmy w stanie wykryć z pomocą kodów cyklicznych CRC-x ?</a:t>
+                </a:r>
+              </a:p>
+              <a:p>
+                <a:r>
+                  <a:rPr lang="pl-PL" sz="1500" dirty="0"/>
+                  <a:t>Błędy pojedynczego bitu:</a:t>
+                </a:r>
+                <a:br>
+                  <a:rPr lang="pl-PL" sz="1500" dirty="0"/>
+                </a:br>
+                <a:r>
+                  <a:rPr lang="pl-PL" sz="1500" dirty="0"/>
+                  <a:t>Tego typu błędy są wykrywane zawsze, jeśli wielomian G(x) ma co najmniej dwa niezerowe wyrazy.</a:t>
+                </a:r>
+                <a:br>
+                  <a:rPr lang="pl-PL" sz="1500" dirty="0"/>
+                </a:br>
+                <a:r>
+                  <a:rPr lang="pl-PL" sz="1500" dirty="0"/>
+                  <a:t>Wyjaśnienie:</a:t>
+                </a:r>
+                <a:br>
+                  <a:rPr lang="pl-PL" sz="1500" dirty="0"/>
+                </a:br>
+                <a14:m>
+                  <m:oMath xmlns:m="http://schemas.openxmlformats.org/officeDocument/2006/math">
+                    <m:r>
+                      <a:rPr lang="pl-PL" sz="1500" i="1" dirty="0" smtClean="0">
+                        <a:latin typeface="Cambria Math" panose="02040503050406030204" pitchFamily="18" charset="0"/>
+                      </a:rPr>
+                      <m:t>𝐸</m:t>
+                    </m:r>
+                    <m:d>
+                      <m:dPr>
+                        <m:ctrlPr>
+                          <a:rPr lang="pl-PL" sz="1500" i="1" dirty="0" smtClean="0">
+                            <a:latin typeface="Cambria Math" panose="02040503050406030204" pitchFamily="18" charset="0"/>
+                          </a:rPr>
+                        </m:ctrlPr>
+                      </m:dPr>
+                      <m:e>
+                        <m:r>
+                          <a:rPr lang="pl-PL" sz="1500" i="1" dirty="0" smtClean="0">
+                            <a:latin typeface="Cambria Math" panose="02040503050406030204" pitchFamily="18" charset="0"/>
+                          </a:rPr>
+                          <m:t>𝑥</m:t>
+                        </m:r>
+                      </m:e>
+                    </m:d>
+                    <m:r>
+                      <a:rPr lang="pl-PL" sz="1500" i="1" dirty="0" smtClean="0">
+                        <a:latin typeface="Cambria Math" panose="02040503050406030204" pitchFamily="18" charset="0"/>
+                      </a:rPr>
+                      <m:t>= </m:t>
+                    </m:r>
+                    <m:sSup>
+                      <m:sSupPr>
+                        <m:ctrlPr>
+                          <a:rPr lang="pl-PL" sz="1500" i="1" dirty="0" smtClean="0">
+                            <a:latin typeface="Cambria Math" panose="02040503050406030204" pitchFamily="18" charset="0"/>
+                          </a:rPr>
+                        </m:ctrlPr>
+                      </m:sSupPr>
+                      <m:e>
+                        <m:r>
+                          <a:rPr lang="pl-PL" sz="1500" i="1" dirty="0" smtClean="0">
+                            <a:latin typeface="Cambria Math" panose="02040503050406030204" pitchFamily="18" charset="0"/>
+                          </a:rPr>
+                          <m:t>𝑥</m:t>
+                        </m:r>
+                      </m:e>
+                      <m:sup>
+                        <m:r>
+                          <a:rPr lang="pl-PL" sz="1500" i="1" dirty="0" smtClean="0">
+                            <a:latin typeface="Cambria Math" panose="02040503050406030204" pitchFamily="18" charset="0"/>
+                          </a:rPr>
+                          <m:t>5</m:t>
+                        </m:r>
+                      </m:sup>
+                    </m:sSup>
+                    <m:r>
+                      <a:rPr lang="pl-PL" sz="1500" i="1" dirty="0" smtClean="0">
+                        <a:latin typeface="Cambria Math" panose="02040503050406030204" pitchFamily="18" charset="0"/>
+                      </a:rPr>
+                      <m:t>→ </m:t>
+                    </m:r>
+                    <m:r>
+                      <a:rPr lang="pl-PL" sz="1500" i="1" dirty="0" smtClean="0">
+                        <a:latin typeface="Cambria Math" panose="02040503050406030204" pitchFamily="18" charset="0"/>
+                      </a:rPr>
+                      <m:t>𝑤𝑖𝑒𝑙𝑜𝑚𝑖𝑎𝑛</m:t>
+                    </m:r>
+                    <m:r>
+                      <a:rPr lang="pl-PL" sz="1500" i="1" dirty="0" smtClean="0">
+                        <a:latin typeface="Cambria Math" panose="02040503050406030204" pitchFamily="18" charset="0"/>
+                      </a:rPr>
+                      <m:t> </m:t>
+                    </m:r>
+                    <m:sSup>
+                      <m:sSupPr>
+                        <m:ctrlPr>
+                          <a:rPr lang="pl-PL" sz="1500" i="1" dirty="0" err="1" smtClean="0">
+                            <a:latin typeface="Cambria Math" panose="02040503050406030204" pitchFamily="18" charset="0"/>
+                          </a:rPr>
+                        </m:ctrlPr>
+                      </m:sSupPr>
+                      <m:e>
+                        <m:r>
+                          <a:rPr lang="pl-PL" sz="1500" i="1" dirty="0" err="1" smtClean="0">
+                            <a:latin typeface="Cambria Math" panose="02040503050406030204" pitchFamily="18" charset="0"/>
+                          </a:rPr>
+                          <m:t>𝑥</m:t>
+                        </m:r>
+                      </m:e>
+                      <m:sup>
+                        <m:r>
+                          <a:rPr lang="pl-PL" sz="1500" i="1" dirty="0" err="1" smtClean="0">
+                            <a:latin typeface="Cambria Math" panose="02040503050406030204" pitchFamily="18" charset="0"/>
+                          </a:rPr>
+                          <m:t>𝑘</m:t>
+                        </m:r>
+                      </m:sup>
+                    </m:sSup>
+                    <m:r>
+                      <a:rPr lang="pl-PL" sz="1500" b="0" i="1" dirty="0" smtClean="0">
+                        <a:latin typeface="Cambria Math" panose="02040503050406030204" pitchFamily="18" charset="0"/>
+                      </a:rPr>
+                      <m:t> </m:t>
+                    </m:r>
+                    <m:r>
+                      <a:rPr lang="pl-PL" sz="1500" i="1" dirty="0" smtClean="0">
+                        <a:latin typeface="Cambria Math" panose="02040503050406030204" pitchFamily="18" charset="0"/>
+                      </a:rPr>
+                      <m:t>𝑑𝑧𝑖𝑒𝑙𝑖</m:t>
+                    </m:r>
+                    <m:r>
+                      <a:rPr lang="pl-PL" sz="1500" i="1" dirty="0" smtClean="0">
+                        <a:latin typeface="Cambria Math" panose="02040503050406030204" pitchFamily="18" charset="0"/>
+                      </a:rPr>
+                      <m:t> </m:t>
+                    </m:r>
+                    <m:r>
+                      <a:rPr lang="pl-PL" sz="1500" i="1" dirty="0" smtClean="0">
+                        <a:latin typeface="Cambria Math" panose="02040503050406030204" pitchFamily="18" charset="0"/>
+                      </a:rPr>
+                      <m:t>𝑠𝑖</m:t>
+                    </m:r>
+                    <m:r>
+                      <a:rPr lang="pl-PL" sz="1500" i="1" dirty="0" smtClean="0">
+                        <a:latin typeface="Cambria Math" panose="02040503050406030204" pitchFamily="18" charset="0"/>
+                      </a:rPr>
+                      <m:t>ę </m:t>
+                    </m:r>
+                    <m:r>
+                      <a:rPr lang="pl-PL" sz="1500" i="1" dirty="0" smtClean="0">
+                        <a:latin typeface="Cambria Math" panose="02040503050406030204" pitchFamily="18" charset="0"/>
+                      </a:rPr>
+                      <m:t>𝑡𝑦𝑙𝑘𝑜</m:t>
+                    </m:r>
+                    <m:r>
+                      <a:rPr lang="pl-PL" sz="1500" i="1" dirty="0" smtClean="0">
+                        <a:latin typeface="Cambria Math" panose="02040503050406030204" pitchFamily="18" charset="0"/>
+                      </a:rPr>
+                      <m:t> </m:t>
+                    </m:r>
+                    <m:r>
+                      <a:rPr lang="pl-PL" sz="1500" i="1" dirty="0" smtClean="0">
+                        <a:latin typeface="Cambria Math" panose="02040503050406030204" pitchFamily="18" charset="0"/>
+                      </a:rPr>
+                      <m:t>𝑝𝑟𝑧𝑒𝑧</m:t>
+                    </m:r>
+                    <m:r>
+                      <a:rPr lang="pl-PL" sz="1500" i="1" dirty="0" smtClean="0">
+                        <a:latin typeface="Cambria Math" panose="02040503050406030204" pitchFamily="18" charset="0"/>
+                      </a:rPr>
+                      <m:t> </m:t>
+                    </m:r>
+                    <m:r>
+                      <a:rPr lang="pl-PL" sz="1500" i="1" dirty="0" smtClean="0">
+                        <a:latin typeface="Cambria Math" panose="02040503050406030204" pitchFamily="18" charset="0"/>
+                      </a:rPr>
+                      <m:t>𝑥</m:t>
+                    </m:r>
+                    <m:r>
+                      <a:rPr lang="pl-PL" sz="1500" i="1" dirty="0" smtClean="0">
+                        <a:latin typeface="Cambria Math" panose="02040503050406030204" pitchFamily="18" charset="0"/>
+                      </a:rPr>
+                      <m:t>, </m:t>
+                    </m:r>
+                    <m:sSup>
+                      <m:sSupPr>
+                        <m:ctrlPr>
+                          <a:rPr lang="pl-PL" sz="1500" i="1" dirty="0" smtClean="0">
+                            <a:latin typeface="Cambria Math" panose="02040503050406030204" pitchFamily="18" charset="0"/>
+                          </a:rPr>
+                        </m:ctrlPr>
+                      </m:sSupPr>
+                      <m:e>
+                        <m:r>
+                          <a:rPr lang="pl-PL" sz="1500" i="1" dirty="0" smtClean="0">
+                            <a:latin typeface="Cambria Math" panose="02040503050406030204" pitchFamily="18" charset="0"/>
+                          </a:rPr>
+                          <m:t>𝑥</m:t>
+                        </m:r>
+                      </m:e>
+                      <m:sup>
+                        <m:r>
+                          <a:rPr lang="pl-PL" sz="1500" i="1" dirty="0" smtClean="0">
+                            <a:latin typeface="Cambria Math" panose="02040503050406030204" pitchFamily="18" charset="0"/>
+                          </a:rPr>
+                          <m:t>2</m:t>
+                        </m:r>
+                      </m:sup>
+                    </m:sSup>
+                    <m:r>
+                      <a:rPr lang="pl-PL" sz="1500" i="1" dirty="0" smtClean="0">
+                        <a:latin typeface="Cambria Math" panose="02040503050406030204" pitchFamily="18" charset="0"/>
+                      </a:rPr>
+                      <m:t>, </m:t>
+                    </m:r>
+                    <m:sSup>
+                      <m:sSupPr>
+                        <m:ctrlPr>
+                          <a:rPr lang="pl-PL" sz="1500" i="1" dirty="0" smtClean="0">
+                            <a:latin typeface="Cambria Math" panose="02040503050406030204" pitchFamily="18" charset="0"/>
+                          </a:rPr>
+                        </m:ctrlPr>
+                      </m:sSupPr>
+                      <m:e>
+                        <m:r>
+                          <a:rPr lang="pl-PL" sz="1500" i="1" dirty="0" smtClean="0">
+                            <a:latin typeface="Cambria Math" panose="02040503050406030204" pitchFamily="18" charset="0"/>
+                          </a:rPr>
+                          <m:t>𝑥</m:t>
+                        </m:r>
+                      </m:e>
+                      <m:sup>
+                        <m:r>
+                          <a:rPr lang="pl-PL" sz="1500" i="1" dirty="0" smtClean="0">
+                            <a:latin typeface="Cambria Math" panose="02040503050406030204" pitchFamily="18" charset="0"/>
+                          </a:rPr>
+                          <m:t>3</m:t>
+                        </m:r>
+                      </m:sup>
+                    </m:sSup>
+                    <m:r>
+                      <a:rPr lang="pl-PL" sz="1500" i="1" dirty="0" smtClean="0">
+                        <a:latin typeface="Cambria Math" panose="02040503050406030204" pitchFamily="18" charset="0"/>
+                      </a:rPr>
+                      <m:t>, … </m:t>
+                    </m:r>
+                    <m:d>
+                      <m:dPr>
+                        <m:ctrlPr>
+                          <a:rPr lang="pl-PL" sz="1500" i="1" dirty="0" smtClean="0">
+                            <a:latin typeface="Cambria Math" panose="02040503050406030204" pitchFamily="18" charset="0"/>
+                          </a:rPr>
+                        </m:ctrlPr>
+                      </m:dPr>
+                      <m:e>
+                        <m:r>
+                          <a:rPr lang="pl-PL" sz="1500" i="1" dirty="0" smtClean="0">
+                            <a:latin typeface="Cambria Math" panose="02040503050406030204" pitchFamily="18" charset="0"/>
+                          </a:rPr>
+                          <m:t> </m:t>
+                        </m:r>
+                        <m:r>
+                          <a:rPr lang="pl-PL" sz="1500" i="1" dirty="0" smtClean="0">
+                            <a:latin typeface="Cambria Math" panose="02040503050406030204" pitchFamily="18" charset="0"/>
+                          </a:rPr>
+                          <m:t>𝑤𝑖𝑒𝑙𝑜𝑚𝑖𝑎𝑛𝑦</m:t>
+                        </m:r>
+                        <m:r>
+                          <a:rPr lang="pl-PL" sz="1500" i="1" dirty="0" smtClean="0">
+                            <a:latin typeface="Cambria Math" panose="02040503050406030204" pitchFamily="18" charset="0"/>
+                          </a:rPr>
+                          <m:t> </m:t>
+                        </m:r>
+                        <m:r>
+                          <a:rPr lang="pl-PL" sz="1500" i="1" dirty="0" smtClean="0">
+                            <a:latin typeface="Cambria Math" panose="02040503050406030204" pitchFamily="18" charset="0"/>
+                          </a:rPr>
+                          <m:t>𝑡𝑦𝑙𝑘𝑜</m:t>
+                        </m:r>
+                        <m:r>
+                          <a:rPr lang="pl-PL" sz="1500" i="1" dirty="0" smtClean="0">
+                            <a:latin typeface="Cambria Math" panose="02040503050406030204" pitchFamily="18" charset="0"/>
+                          </a:rPr>
+                          <m:t> </m:t>
+                        </m:r>
+                        <m:r>
+                          <a:rPr lang="pl-PL" sz="1500" i="1" dirty="0" smtClean="0">
+                            <a:latin typeface="Cambria Math" panose="02040503050406030204" pitchFamily="18" charset="0"/>
+                          </a:rPr>
+                          <m:t>𝑧</m:t>
+                        </m:r>
+                        <m:r>
+                          <a:rPr lang="pl-PL" sz="1500" i="1" dirty="0" smtClean="0">
+                            <a:latin typeface="Cambria Math" panose="02040503050406030204" pitchFamily="18" charset="0"/>
+                          </a:rPr>
+                          <m:t> </m:t>
+                        </m:r>
+                        <m:r>
+                          <a:rPr lang="pl-PL" sz="1500" i="1" dirty="0" smtClean="0">
+                            <a:latin typeface="Cambria Math" panose="02040503050406030204" pitchFamily="18" charset="0"/>
+                          </a:rPr>
+                          <m:t>𝑗𝑒𝑑𝑛𝑦𝑚</m:t>
+                        </m:r>
+                        <m:r>
+                          <a:rPr lang="pl-PL" sz="1500" i="1" dirty="0" smtClean="0">
+                            <a:latin typeface="Cambria Math" panose="02040503050406030204" pitchFamily="18" charset="0"/>
+                          </a:rPr>
+                          <m:t> </m:t>
+                        </m:r>
+                        <m:r>
+                          <a:rPr lang="pl-PL" sz="1500" i="1" dirty="0" smtClean="0">
+                            <a:latin typeface="Cambria Math" panose="02040503050406030204" pitchFamily="18" charset="0"/>
+                          </a:rPr>
+                          <m:t>𝑤𝑠𝑝</m:t>
+                        </m:r>
+                        <m:r>
+                          <a:rPr lang="pl-PL" sz="1500" i="1" dirty="0" smtClean="0">
+                            <a:latin typeface="Cambria Math" panose="02040503050406030204" pitchFamily="18" charset="0"/>
+                          </a:rPr>
+                          <m:t>ół</m:t>
+                        </m:r>
+                        <m:r>
+                          <a:rPr lang="pl-PL" sz="1500" i="1" dirty="0" smtClean="0">
+                            <a:latin typeface="Cambria Math" panose="02040503050406030204" pitchFamily="18" charset="0"/>
+                          </a:rPr>
+                          <m:t>𝑐𝑧𝑦𝑛𝑛𝑖𝑘𝑖𝑒𝑚</m:t>
+                        </m:r>
+                        <m:r>
+                          <a:rPr lang="pl-PL" sz="1500" i="1" dirty="0" smtClean="0">
+                            <a:latin typeface="Cambria Math" panose="02040503050406030204" pitchFamily="18" charset="0"/>
+                          </a:rPr>
+                          <m:t> </m:t>
+                        </m:r>
+                      </m:e>
+                    </m:d>
+                  </m:oMath>
+                </a14:m>
+                <a:endParaRPr lang="pl-PL" sz="1500" dirty="0"/>
+              </a:p>
+              <a:p>
+                <a:r>
+                  <a:rPr lang="pl-PL" sz="1500" dirty="0"/>
+                  <a:t>Błędy dwóch bitów</a:t>
+                </a:r>
+                <a:br>
+                  <a:rPr lang="pl-PL" sz="1500" dirty="0"/>
+                </a:br>
+                <a:r>
+                  <a:rPr lang="pl-PL" sz="1500" dirty="0"/>
+                  <a:t>Taki błąd zostanie wykryty, jeśli odległość między błędnymi bitami jest mniejsza niż rząd ( order ) tzw. wielomianu pierwotnego zawartego pod postacią </a:t>
                 </a:r>
                 <a14:m>
                   <m:oMath xmlns:m="http://schemas.openxmlformats.org/officeDocument/2006/math">
                     <m:r>
-                      <a:rPr lang="pl-PL" i="1" dirty="0" smtClean="0">
+                      <a:rPr lang="pl-PL" sz="1500" i="1" dirty="0" smtClean="0">
                         <a:latin typeface="Cambria Math" panose="02040503050406030204" pitchFamily="18" charset="0"/>
                       </a:rPr>
                       <m:t>𝐺</m:t>
                     </m:r>
                     <m:r>
-                      <a:rPr lang="pl-PL" i="1" dirty="0" smtClean="0">
+                      <a:rPr lang="pl-PL" sz="1500" i="1" dirty="0" smtClean="0">
                         <a:latin typeface="Cambria Math" panose="02040503050406030204" pitchFamily="18" charset="0"/>
                       </a:rPr>
                       <m:t>(</m:t>
                     </m:r>
                     <m:r>
-                      <a:rPr lang="pl-PL" i="1" dirty="0" smtClean="0">
+                      <a:rPr lang="pl-PL" sz="1500" i="1" dirty="0" smtClean="0">
                         <a:latin typeface="Cambria Math" panose="02040503050406030204" pitchFamily="18" charset="0"/>
                       </a:rPr>
                       <m:t>𝑥</m:t>
                     </m:r>
                     <m:r>
-                      <a:rPr lang="pl-PL" i="1" dirty="0" smtClean="0">
+                      <a:rPr lang="pl-PL" sz="1500" i="1" dirty="0" smtClean="0">
                         <a:latin typeface="Cambria Math" panose="02040503050406030204" pitchFamily="18" charset="0"/>
                       </a:rPr>
                       <m:t>)</m:t>
@@ -24408,24 +25694,431 @@
                   </m:oMath>
                 </a14:m>
                 <a:r>
-                  <a:rPr lang="pl-PL" dirty="0"/>
-                  <a:t>, aby błąd pozostał niewykryty, co jest bardzo mało prawdopodobne dla dobrze dobranych wielomianów generujących.</a:t>
+                  <a:rPr lang="pl-PL" sz="1500" dirty="0"/>
+                  <a:t>. </a:t>
                 </a:r>
                 <a:br>
-                  <a:rPr lang="pl-PL" dirty="0"/>
-                </a:br>
-                <a:br>
-                  <a:rPr lang="pl-PL" dirty="0"/>
+                  <a:rPr lang="pl-PL" sz="1500" dirty="0"/>
                 </a:br>
                 <a:r>
-                  <a:rPr lang="pl-PL" dirty="0"/>
-                  <a:t>Oczywiście detekcja dłuższych przekłamań jest możliwa, ale nie jest już gwarantowana.</a:t>
+                  <a:rPr lang="pl-PL" sz="1500" dirty="0"/>
+                  <a:t>Wyjaśnienie:</a:t>
                 </a:r>
+                <a:br>
+                  <a:rPr lang="pl-PL" sz="1500" dirty="0"/>
+                </a:br>
+                <a14:m>
+                  <m:oMath xmlns:m="http://schemas.openxmlformats.org/officeDocument/2006/math">
+                    <m:r>
+                      <a:rPr lang="pl-PL" sz="1500" i="1" dirty="0">
+                        <a:latin typeface="Cambria Math" panose="02040503050406030204" pitchFamily="18" charset="0"/>
+                      </a:rPr>
+                      <m:t>𝐸</m:t>
+                    </m:r>
+                    <m:d>
+                      <m:dPr>
+                        <m:ctrlPr>
+                          <a:rPr lang="pl-PL" sz="1500" i="1" dirty="0">
+                            <a:latin typeface="Cambria Math" panose="02040503050406030204" pitchFamily="18" charset="0"/>
+                          </a:rPr>
+                        </m:ctrlPr>
+                      </m:dPr>
+                      <m:e>
+                        <m:r>
+                          <a:rPr lang="pl-PL" sz="1500" i="1" dirty="0">
+                            <a:latin typeface="Cambria Math" panose="02040503050406030204" pitchFamily="18" charset="0"/>
+                          </a:rPr>
+                          <m:t>𝑥</m:t>
+                        </m:r>
+                      </m:e>
+                    </m:d>
+                    <m:r>
+                      <a:rPr lang="pl-PL" sz="1500" i="1" dirty="0">
+                        <a:latin typeface="Cambria Math" panose="02040503050406030204" pitchFamily="18" charset="0"/>
+                      </a:rPr>
+                      <m:t>= </m:t>
+                    </m:r>
+                    <m:sSup>
+                      <m:sSupPr>
+                        <m:ctrlPr>
+                          <a:rPr lang="pl-PL" sz="1500" i="1" dirty="0" err="1">
+                            <a:latin typeface="Cambria Math" panose="02040503050406030204" pitchFamily="18" charset="0"/>
+                          </a:rPr>
+                        </m:ctrlPr>
+                      </m:sSupPr>
+                      <m:e>
+                        <m:r>
+                          <a:rPr lang="pl-PL" sz="1500" i="1" dirty="0" err="1">
+                            <a:latin typeface="Cambria Math" panose="02040503050406030204" pitchFamily="18" charset="0"/>
+                          </a:rPr>
+                          <m:t>𝑥</m:t>
+                        </m:r>
+                      </m:e>
+                      <m:sup>
+                        <m:r>
+                          <a:rPr lang="pl-PL" sz="1500" i="1" dirty="0" err="1">
+                            <a:latin typeface="Cambria Math" panose="02040503050406030204" pitchFamily="18" charset="0"/>
+                          </a:rPr>
+                          <m:t>𝑘</m:t>
+                        </m:r>
+                      </m:sup>
+                    </m:sSup>
+                    <m:r>
+                      <a:rPr lang="pl-PL" sz="1500" i="1" dirty="0">
+                        <a:latin typeface="Cambria Math" panose="02040503050406030204" pitchFamily="18" charset="0"/>
+                      </a:rPr>
+                      <m:t>∗ </m:t>
+                    </m:r>
+                    <m:d>
+                      <m:dPr>
+                        <m:ctrlPr>
+                          <a:rPr lang="pl-PL" sz="1500" i="1" dirty="0">
+                            <a:latin typeface="Cambria Math" panose="02040503050406030204" pitchFamily="18" charset="0"/>
+                          </a:rPr>
+                        </m:ctrlPr>
+                      </m:dPr>
+                      <m:e>
+                        <m:sSup>
+                          <m:sSupPr>
+                            <m:ctrlPr>
+                              <a:rPr lang="pl-PL" sz="1500" i="1" dirty="0">
+                                <a:latin typeface="Cambria Math" panose="02040503050406030204" pitchFamily="18" charset="0"/>
+                              </a:rPr>
+                            </m:ctrlPr>
+                          </m:sSupPr>
+                          <m:e>
+                            <m:r>
+                              <a:rPr lang="pl-PL" sz="1500" i="1" dirty="0">
+                                <a:latin typeface="Cambria Math" panose="02040503050406030204" pitchFamily="18" charset="0"/>
+                              </a:rPr>
+                              <m:t>𝑥</m:t>
+                            </m:r>
+                          </m:e>
+                          <m:sup>
+                            <m:r>
+                              <a:rPr lang="pl-PL" sz="1500" i="1" dirty="0">
+                                <a:latin typeface="Cambria Math" panose="02040503050406030204" pitchFamily="18" charset="0"/>
+                              </a:rPr>
+                              <m:t>𝑖</m:t>
+                            </m:r>
+                            <m:r>
+                              <a:rPr lang="pl-PL" sz="1500" i="1" dirty="0">
+                                <a:latin typeface="Cambria Math" panose="02040503050406030204" pitchFamily="18" charset="0"/>
+                              </a:rPr>
+                              <m:t>−</m:t>
+                            </m:r>
+                            <m:r>
+                              <a:rPr lang="pl-PL" sz="1500" i="1" dirty="0">
+                                <a:latin typeface="Cambria Math" panose="02040503050406030204" pitchFamily="18" charset="0"/>
+                              </a:rPr>
+                              <m:t>𝑘</m:t>
+                            </m:r>
+                          </m:sup>
+                        </m:sSup>
+                        <m:r>
+                          <a:rPr lang="pl-PL" sz="1500" i="1" dirty="0">
+                            <a:latin typeface="Cambria Math" panose="02040503050406030204" pitchFamily="18" charset="0"/>
+                          </a:rPr>
+                          <m:t>+1</m:t>
+                        </m:r>
+                      </m:e>
+                    </m:d>
+                    <m:r>
+                      <a:rPr lang="pl-PL" sz="1500" i="1" dirty="0">
+                        <a:latin typeface="Cambria Math" panose="02040503050406030204" pitchFamily="18" charset="0"/>
+                      </a:rPr>
+                      <m:t> →</m:t>
+                    </m:r>
+                    <m:r>
+                      <a:rPr lang="pl-PL" sz="1500" i="1" dirty="0">
+                        <a:latin typeface="Cambria Math" panose="02040503050406030204" pitchFamily="18" charset="0"/>
+                      </a:rPr>
+                      <m:t>𝑤𝑖𝑑𝑧𝑖𝑚𝑦</m:t>
+                    </m:r>
+                    <m:r>
+                      <a:rPr lang="pl-PL" sz="1500" i="1" dirty="0">
+                        <a:latin typeface="Cambria Math" panose="02040503050406030204" pitchFamily="18" charset="0"/>
+                      </a:rPr>
+                      <m:t>, ż</m:t>
+                    </m:r>
+                    <m:r>
+                      <a:rPr lang="pl-PL" sz="1500" i="1" dirty="0">
+                        <a:latin typeface="Cambria Math" panose="02040503050406030204" pitchFamily="18" charset="0"/>
+                      </a:rPr>
+                      <m:t>𝑒</m:t>
+                    </m:r>
+                    <m:r>
+                      <a:rPr lang="pl-PL" sz="1500" i="1" dirty="0">
+                        <a:latin typeface="Cambria Math" panose="02040503050406030204" pitchFamily="18" charset="0"/>
+                      </a:rPr>
+                      <m:t> </m:t>
+                    </m:r>
+                    <m:r>
+                      <a:rPr lang="pl-PL" sz="1500" i="1" dirty="0">
+                        <a:latin typeface="Cambria Math" panose="02040503050406030204" pitchFamily="18" charset="0"/>
+                      </a:rPr>
+                      <m:t>𝐺</m:t>
+                    </m:r>
+                    <m:d>
+                      <m:dPr>
+                        <m:ctrlPr>
+                          <a:rPr lang="pl-PL" sz="1500" i="1" dirty="0">
+                            <a:latin typeface="Cambria Math" panose="02040503050406030204" pitchFamily="18" charset="0"/>
+                          </a:rPr>
+                        </m:ctrlPr>
+                      </m:dPr>
+                      <m:e>
+                        <m:r>
+                          <a:rPr lang="pl-PL" sz="1500" i="1" dirty="0">
+                            <a:latin typeface="Cambria Math" panose="02040503050406030204" pitchFamily="18" charset="0"/>
+                          </a:rPr>
+                          <m:t>𝑥</m:t>
+                        </m:r>
+                      </m:e>
+                    </m:d>
+                    <m:r>
+                      <a:rPr lang="pl-PL" sz="1500" b="0" i="1" dirty="0" smtClean="0">
+                        <a:latin typeface="Cambria Math" panose="02040503050406030204" pitchFamily="18" charset="0"/>
+                      </a:rPr>
+                      <m:t> </m:t>
+                    </m:r>
+                    <m:r>
+                      <a:rPr lang="pl-PL" sz="1500" i="1" dirty="0">
+                        <a:latin typeface="Cambria Math" panose="02040503050406030204" pitchFamily="18" charset="0"/>
+                      </a:rPr>
+                      <m:t>𝑚𝑢𝑠𝑖</m:t>
+                    </m:r>
+                    <m:r>
+                      <a:rPr lang="pl-PL" sz="1500" i="1" dirty="0">
+                        <a:latin typeface="Cambria Math" panose="02040503050406030204" pitchFamily="18" charset="0"/>
+                      </a:rPr>
+                      <m:t> </m:t>
+                    </m:r>
+                    <m:r>
+                      <a:rPr lang="pl-PL" sz="1500" i="1" dirty="0">
+                        <a:latin typeface="Cambria Math" panose="02040503050406030204" pitchFamily="18" charset="0"/>
+                      </a:rPr>
+                      <m:t>𝑑𝑧𝑖𝑒𝑙𝑖</m:t>
+                    </m:r>
+                    <m:r>
+                      <a:rPr lang="pl-PL" sz="1500" i="1" dirty="0">
+                        <a:latin typeface="Cambria Math" panose="02040503050406030204" pitchFamily="18" charset="0"/>
+                      </a:rPr>
+                      <m:t>ć </m:t>
+                    </m:r>
+                    <m:d>
+                      <m:dPr>
+                        <m:ctrlPr>
+                          <a:rPr lang="pl-PL" sz="1500" b="0" i="1" dirty="0" smtClean="0">
+                            <a:latin typeface="Cambria Math" panose="02040503050406030204" pitchFamily="18" charset="0"/>
+                          </a:rPr>
+                        </m:ctrlPr>
+                      </m:dPr>
+                      <m:e>
+                        <m:sSup>
+                          <m:sSupPr>
+                            <m:ctrlPr>
+                              <a:rPr lang="pl-PL" sz="1500" i="1" dirty="0">
+                                <a:latin typeface="Cambria Math" panose="02040503050406030204" pitchFamily="18" charset="0"/>
+                              </a:rPr>
+                            </m:ctrlPr>
+                          </m:sSupPr>
+                          <m:e>
+                            <m:r>
+                              <a:rPr lang="pl-PL" sz="1500" i="1" dirty="0">
+                                <a:latin typeface="Cambria Math" panose="02040503050406030204" pitchFamily="18" charset="0"/>
+                              </a:rPr>
+                              <m:t>𝑥</m:t>
+                            </m:r>
+                          </m:e>
+                          <m:sup>
+                            <m:r>
+                              <a:rPr lang="pl-PL" sz="1500" i="1" dirty="0">
+                                <a:latin typeface="Cambria Math" panose="02040503050406030204" pitchFamily="18" charset="0"/>
+                              </a:rPr>
+                              <m:t>𝑖</m:t>
+                            </m:r>
+                            <m:r>
+                              <a:rPr lang="pl-PL" sz="1500" i="1" dirty="0">
+                                <a:latin typeface="Cambria Math" panose="02040503050406030204" pitchFamily="18" charset="0"/>
+                              </a:rPr>
+                              <m:t>−</m:t>
+                            </m:r>
+                            <m:r>
+                              <a:rPr lang="pl-PL" sz="1500" i="1" dirty="0">
+                                <a:latin typeface="Cambria Math" panose="02040503050406030204" pitchFamily="18" charset="0"/>
+                              </a:rPr>
+                              <m:t>𝑘</m:t>
+                            </m:r>
+                          </m:sup>
+                        </m:sSup>
+                        <m:r>
+                          <a:rPr lang="pl-PL" sz="1500" i="1" dirty="0">
+                            <a:latin typeface="Cambria Math" panose="02040503050406030204" pitchFamily="18" charset="0"/>
+                          </a:rPr>
+                          <m:t>+1</m:t>
+                        </m:r>
+                      </m:e>
+                    </m:d>
+                    <m:r>
+                      <a:rPr lang="pl-PL" sz="1500" i="1" dirty="0">
+                        <a:latin typeface="Cambria Math" panose="02040503050406030204" pitchFamily="18" charset="0"/>
+                      </a:rPr>
+                      <m:t>ż</m:t>
+                    </m:r>
+                    <m:r>
+                      <a:rPr lang="pl-PL" sz="1500" i="1" dirty="0">
+                        <a:latin typeface="Cambria Math" panose="02040503050406030204" pitchFamily="18" charset="0"/>
+                      </a:rPr>
+                      <m:t>𝑒𝑏𝑦</m:t>
+                    </m:r>
+                    <m:r>
+                      <a:rPr lang="pl-PL" sz="1500" i="1" dirty="0">
+                        <a:latin typeface="Cambria Math" panose="02040503050406030204" pitchFamily="18" charset="0"/>
+                      </a:rPr>
+                      <m:t> </m:t>
+                    </m:r>
+                    <m:r>
+                      <a:rPr lang="pl-PL" sz="1500" i="1" dirty="0">
+                        <a:latin typeface="Cambria Math" panose="02040503050406030204" pitchFamily="18" charset="0"/>
+                      </a:rPr>
+                      <m:t>𝑛𝑖𝑒</m:t>
+                    </m:r>
+                    <m:r>
+                      <a:rPr lang="pl-PL" sz="1500" i="1" dirty="0">
+                        <a:latin typeface="Cambria Math" panose="02040503050406030204" pitchFamily="18" charset="0"/>
+                      </a:rPr>
+                      <m:t> </m:t>
+                    </m:r>
+                    <m:r>
+                      <a:rPr lang="pl-PL" sz="1500" i="1" dirty="0">
+                        <a:latin typeface="Cambria Math" panose="02040503050406030204" pitchFamily="18" charset="0"/>
+                      </a:rPr>
+                      <m:t>𝑤𝑦𝑘𝑟𝑦</m:t>
+                    </m:r>
+                    <m:r>
+                      <a:rPr lang="pl-PL" sz="1500" i="1" dirty="0">
+                        <a:latin typeface="Cambria Math" panose="02040503050406030204" pitchFamily="18" charset="0"/>
+                      </a:rPr>
+                      <m:t>ć </m:t>
+                    </m:r>
+                    <m:r>
+                      <a:rPr lang="pl-PL" sz="1500" i="1" dirty="0">
+                        <a:latin typeface="Cambria Math" panose="02040503050406030204" pitchFamily="18" charset="0"/>
+                      </a:rPr>
+                      <m:t>𝑡𝑒𝑔𝑜</m:t>
+                    </m:r>
+                    <m:r>
+                      <a:rPr lang="pl-PL" sz="1500" i="1" dirty="0">
+                        <a:latin typeface="Cambria Math" panose="02040503050406030204" pitchFamily="18" charset="0"/>
+                      </a:rPr>
+                      <m:t> </m:t>
+                    </m:r>
+                    <m:r>
+                      <a:rPr lang="pl-PL" sz="1500" i="1" dirty="0">
+                        <a:latin typeface="Cambria Math" panose="02040503050406030204" pitchFamily="18" charset="0"/>
+                      </a:rPr>
+                      <m:t>𝑏</m:t>
+                    </m:r>
+                    <m:r>
+                      <a:rPr lang="pl-PL" sz="1500" i="1" dirty="0">
+                        <a:latin typeface="Cambria Math" panose="02040503050406030204" pitchFamily="18" charset="0"/>
+                      </a:rPr>
+                      <m:t>łę</m:t>
+                    </m:r>
+                    <m:r>
+                      <a:rPr lang="pl-PL" sz="1500" i="1" dirty="0">
+                        <a:latin typeface="Cambria Math" panose="02040503050406030204" pitchFamily="18" charset="0"/>
+                      </a:rPr>
+                      <m:t>𝑑𝑢</m:t>
+                    </m:r>
+                  </m:oMath>
+                </a14:m>
+                <a:br>
+                  <a:rPr lang="pl-PL" sz="1500" dirty="0"/>
+                </a:br>
+                <a:r>
+                  <a:rPr lang="pl-PL" sz="1500" dirty="0"/>
+                  <a:t>	Czym jest ( rząd wielomianu ) ? Jest to najmniejsza liczba m, dla której:</a:t>
+                </a:r>
+                <a:br>
+                  <a:rPr lang="pl-PL" sz="1500" dirty="0"/>
+                </a:br>
+                <a14:m>
+                  <m:oMath xmlns:m="http://schemas.openxmlformats.org/officeDocument/2006/math">
+                    <m:r>
+                      <a:rPr lang="pl-PL" sz="1500" i="1" dirty="0" smtClean="0">
+                        <a:latin typeface="Cambria Math" panose="02040503050406030204" pitchFamily="18" charset="0"/>
+                      </a:rPr>
+                      <m:t>𝐺</m:t>
+                    </m:r>
+                    <m:r>
+                      <a:rPr lang="pl-PL" sz="1500" i="1" dirty="0" smtClean="0">
+                        <a:latin typeface="Cambria Math" panose="02040503050406030204" pitchFamily="18" charset="0"/>
+                      </a:rPr>
+                      <m:t>(</m:t>
+                    </m:r>
+                    <m:r>
+                      <a:rPr lang="pl-PL" sz="1500" i="1" dirty="0" smtClean="0">
+                        <a:latin typeface="Cambria Math" panose="02040503050406030204" pitchFamily="18" charset="0"/>
+                      </a:rPr>
+                      <m:t>𝑥</m:t>
+                    </m:r>
+                    <m:r>
+                      <a:rPr lang="pl-PL" sz="1500" i="1" dirty="0" smtClean="0">
+                        <a:latin typeface="Cambria Math" panose="02040503050406030204" pitchFamily="18" charset="0"/>
+                      </a:rPr>
+                      <m:t>) | (</m:t>
+                    </m:r>
+                    <m:sSup>
+                      <m:sSupPr>
+                        <m:ctrlPr>
+                          <a:rPr lang="pl-PL" sz="1500" i="1" dirty="0" smtClean="0">
+                            <a:latin typeface="Cambria Math" panose="02040503050406030204" pitchFamily="18" charset="0"/>
+                          </a:rPr>
+                        </m:ctrlPr>
+                      </m:sSupPr>
+                      <m:e>
+                        <m:r>
+                          <a:rPr lang="pl-PL" sz="1500" b="0" i="1" dirty="0" smtClean="0">
+                            <a:latin typeface="Cambria Math" panose="02040503050406030204" pitchFamily="18" charset="0"/>
+                          </a:rPr>
+                          <m:t>𝑥</m:t>
+                        </m:r>
+                      </m:e>
+                      <m:sup>
+                        <m:r>
+                          <a:rPr lang="pl-PL" sz="1500" b="0" i="1" dirty="0" smtClean="0">
+                            <a:latin typeface="Cambria Math" panose="02040503050406030204" pitchFamily="18" charset="0"/>
+                          </a:rPr>
+                          <m:t>𝑚</m:t>
+                        </m:r>
+                      </m:sup>
+                    </m:sSup>
+                    <m:r>
+                      <a:rPr lang="pl-PL" sz="1500" i="1" dirty="0" smtClean="0">
+                        <a:latin typeface="Cambria Math" panose="02040503050406030204" pitchFamily="18" charset="0"/>
+                      </a:rPr>
+                      <m:t>+1)</m:t>
+                    </m:r>
+                  </m:oMath>
+                </a14:m>
+                <a:br>
+                  <a:rPr lang="pl-PL" sz="1500" dirty="0"/>
+                </a:br>
+                <a:r>
+                  <a:rPr lang="pl-PL" sz="1500" dirty="0"/>
+                  <a:t>		</a:t>
+                </a:r>
+                <a:br>
+                  <a:rPr lang="pl-PL" sz="1500" dirty="0"/>
+                </a:br>
+                <a:endParaRPr lang="pl-PL" sz="1500" dirty="0"/>
               </a:p>
             </p:txBody>
           </p:sp>
         </mc:Choice>
-        <mc:Fallback xmlns="">
+        <mc:Fallback>
           <p:sp>
             <p:nvSpPr>
               <p:cNvPr id="3" name="Symbol zastępczy zawartości 2">
@@ -24443,10 +26136,14 @@
               </p:nvPr>
             </p:nvSpPr>
             <p:spPr>
+              <a:xfrm>
+                <a:off x="550862" y="1219200"/>
+                <a:ext cx="11188555" cy="5375563"/>
+              </a:xfrm>
               <a:blipFill>
                 <a:blip r:embed="rId2"/>
                 <a:stretch>
-                  <a:fillRect l="-1319" t="-1840" r="-1703"/>
+                  <a:fillRect l="-1035" t="-1020" r="-817"/>
                 </a:stretch>
               </a:blipFill>
             </p:spPr>
@@ -24469,613 +26166,6 @@
     <p:extLst>
       <p:ext uri="{BB962C8B-B14F-4D97-AF65-F5344CB8AC3E}">
         <p14:creationId xmlns:p14="http://schemas.microsoft.com/office/powerpoint/2010/main" val="3740286033"/>
-      </p:ext>
-    </p:extLst>
-  </p:cSld>
-  <p:clrMapOvr>
-    <a:masterClrMapping/>
-  </p:clrMapOvr>
-</p:sld>
-</file>
-
-<file path=ppt/slides/slide8.xml><?xml version="1.0" encoding="utf-8"?>
-<p:sld xmlns:a="http://schemas.openxmlformats.org/drawingml/2006/main" xmlns:r="http://schemas.openxmlformats.org/officeDocument/2006/relationships" xmlns:p="http://schemas.openxmlformats.org/presentationml/2006/main">
-  <p:cSld>
-    <p:spTree>
-      <p:nvGrpSpPr>
-        <p:cNvPr id="1" name=""/>
-        <p:cNvGrpSpPr/>
-        <p:nvPr/>
-      </p:nvGrpSpPr>
-      <p:grpSpPr>
-        <a:xfrm>
-          <a:off x="0" y="0"/>
-          <a:ext cx="0" cy="0"/>
-          <a:chOff x="0" y="0"/>
-          <a:chExt cx="0" cy="0"/>
-        </a:xfrm>
-      </p:grpSpPr>
-      <p:sp>
-        <p:nvSpPr>
-          <p:cNvPr id="11" name="Tytuł 10">
-            <a:extLst>
-              <a:ext uri="{FF2B5EF4-FFF2-40B4-BE49-F238E27FC236}">
-                <a16:creationId xmlns:a16="http://schemas.microsoft.com/office/drawing/2014/main" id="{23418ADF-358F-4647-A511-FCFFEDA83429}"/>
-              </a:ext>
-            </a:extLst>
-          </p:cNvPr>
-          <p:cNvSpPr>
-            <a:spLocks noGrp="1"/>
-          </p:cNvSpPr>
-          <p:nvPr>
-            <p:ph type="title"/>
-          </p:nvPr>
-        </p:nvSpPr>
-        <p:spPr>
-          <a:xfrm>
-            <a:off x="550863" y="4507200"/>
-            <a:ext cx="4500562" cy="1562959"/>
-          </a:xfrm>
-        </p:spPr>
-        <p:txBody>
-          <a:bodyPr rtlCol="0"/>
-          <a:lstStyle/>
-          <a:p>
-            <a:pPr rtl="0"/>
-            <a:r>
-              <a:rPr lang="pl-PL"/>
-              <a:t>Wstęp</a:t>
-            </a:r>
-            <a:endParaRPr lang="pl-PL" dirty="0"/>
-          </a:p>
-        </p:txBody>
-      </p:sp>
-      <p:pic>
-        <p:nvPicPr>
-          <p:cNvPr id="18" name="Obraz — symbol zastępczy 17" descr="Grupa osób siedzących przy stole">
-            <a:extLst>
-              <a:ext uri="{FF2B5EF4-FFF2-40B4-BE49-F238E27FC236}">
-                <a16:creationId xmlns:a16="http://schemas.microsoft.com/office/drawing/2014/main" id="{E2536017-F539-430C-A901-70AB81CA612A}"/>
-              </a:ext>
-            </a:extLst>
-          </p:cNvPr>
-          <p:cNvPicPr>
-            <a:picLocks noGrp="1" noChangeAspect="1"/>
-          </p:cNvPicPr>
-          <p:nvPr>
-            <p:ph type="pic" sz="quarter" idx="13"/>
-          </p:nvPr>
-        </p:nvPicPr>
-        <p:blipFill rotWithShape="1">
-          <a:blip r:embed="rId3" cstate="screen">
-            <a:extLst>
-              <a:ext uri="{28A0092B-C50C-407E-A947-70E740481C1C}">
-                <a14:useLocalDpi xmlns:a14="http://schemas.microsoft.com/office/drawing/2010/main" val="0"/>
-              </a:ext>
-            </a:extLst>
-          </a:blip>
-          <a:srcRect t="42" b="42"/>
-          <a:stretch/>
-        </p:blipFill>
-        <p:spPr>
-          <a:xfrm>
-            <a:off x="0" y="0"/>
-            <a:ext cx="3054096" cy="3776472"/>
-          </a:xfrm>
-        </p:spPr>
-      </p:pic>
-      <p:pic>
-        <p:nvPicPr>
-          <p:cNvPr id="20" name="Obraz — symbol zastępczy 19" descr="Cyfrowe tło punktów danych">
-            <a:extLst>
-              <a:ext uri="{FF2B5EF4-FFF2-40B4-BE49-F238E27FC236}">
-                <a16:creationId xmlns:a16="http://schemas.microsoft.com/office/drawing/2014/main" id="{528A7D8D-1AB5-46C4-93FA-D92C2FD51692}"/>
-              </a:ext>
-            </a:extLst>
-          </p:cNvPr>
-          <p:cNvPicPr>
-            <a:picLocks noGrp="1" noChangeAspect="1"/>
-          </p:cNvPicPr>
-          <p:nvPr>
-            <p:ph type="pic" sz="quarter" idx="14"/>
-          </p:nvPr>
-        </p:nvPicPr>
-        <p:blipFill rotWithShape="1">
-          <a:blip r:embed="rId4" cstate="screen">
-            <a:extLst>
-              <a:ext uri="{28A0092B-C50C-407E-A947-70E740481C1C}">
-                <a14:useLocalDpi xmlns:a14="http://schemas.microsoft.com/office/drawing/2010/main" val="0"/>
-              </a:ext>
-            </a:extLst>
-          </a:blip>
-          <a:srcRect t="42" b="42"/>
-          <a:stretch/>
-        </p:blipFill>
-        <p:spPr>
-          <a:xfrm>
-            <a:off x="3054096" y="0"/>
-            <a:ext cx="3054096" cy="3776472"/>
-          </a:xfrm>
-        </p:spPr>
-      </p:pic>
-      <p:pic>
-        <p:nvPicPr>
-          <p:cNvPr id="25" name="Obraz — symbol zastępczy 24" descr="Ekran wykresu cyfrowego">
-            <a:extLst>
-              <a:ext uri="{FF2B5EF4-FFF2-40B4-BE49-F238E27FC236}">
-                <a16:creationId xmlns:a16="http://schemas.microsoft.com/office/drawing/2014/main" id="{B7353C46-ACC1-4078-85C2-26B57B0E58B7}"/>
-              </a:ext>
-            </a:extLst>
-          </p:cNvPr>
-          <p:cNvPicPr>
-            <a:picLocks noGrp="1" noChangeAspect="1"/>
-          </p:cNvPicPr>
-          <p:nvPr>
-            <p:ph type="pic" sz="quarter" idx="16"/>
-          </p:nvPr>
-        </p:nvPicPr>
-        <p:blipFill rotWithShape="1">
-          <a:blip r:embed="rId5" cstate="screen">
-            <a:extLst>
-              <a:ext uri="{28A0092B-C50C-407E-A947-70E740481C1C}">
-                <a14:useLocalDpi xmlns:a14="http://schemas.microsoft.com/office/drawing/2010/main" val="0"/>
-              </a:ext>
-            </a:extLst>
-          </a:blip>
-          <a:srcRect t="42" b="42"/>
-          <a:stretch/>
-        </p:blipFill>
-        <p:spPr>
-          <a:xfrm>
-            <a:off x="9137904" y="0"/>
-            <a:ext cx="3054096" cy="3776472"/>
-          </a:xfrm>
-        </p:spPr>
-      </p:pic>
-      <p:sp>
-        <p:nvSpPr>
-          <p:cNvPr id="4" name="Data — symbol zastępczy 3">
-            <a:extLst>
-              <a:ext uri="{FF2B5EF4-FFF2-40B4-BE49-F238E27FC236}">
-                <a16:creationId xmlns:a16="http://schemas.microsoft.com/office/drawing/2014/main" id="{0C329F70-04F7-4C70-BCF8-D4371F54EF2F}"/>
-              </a:ext>
-            </a:extLst>
-          </p:cNvPr>
-          <p:cNvSpPr>
-            <a:spLocks noGrp="1"/>
-          </p:cNvSpPr>
-          <p:nvPr>
-            <p:ph type="dt" sz="half" idx="10"/>
-          </p:nvPr>
-        </p:nvSpPr>
-        <p:spPr>
-          <a:xfrm>
-            <a:off x="550863" y="6507212"/>
-            <a:ext cx="2628900" cy="153888"/>
-          </a:xfrm>
-        </p:spPr>
-        <p:txBody>
-          <a:bodyPr rtlCol="0"/>
-          <a:lstStyle/>
-          <a:p>
-            <a:pPr rtl="0"/>
-            <a:r>
-              <a:rPr lang="pl-PL"/>
-              <a:t>Wtorek, 2 lutego 20XX</a:t>
-            </a:r>
-            <a:endParaRPr lang="pl-PL" dirty="0"/>
-          </a:p>
-        </p:txBody>
-      </p:sp>
-      <p:sp>
-        <p:nvSpPr>
-          <p:cNvPr id="5" name="Stopka — symbol zastępczy 4">
-            <a:extLst>
-              <a:ext uri="{FF2B5EF4-FFF2-40B4-BE49-F238E27FC236}">
-                <a16:creationId xmlns:a16="http://schemas.microsoft.com/office/drawing/2014/main" id="{06A3302E-502D-4151-81C9-5FD6AF9596D6}"/>
-              </a:ext>
-            </a:extLst>
-          </p:cNvPr>
-          <p:cNvSpPr>
-            <a:spLocks noGrp="1"/>
-          </p:cNvSpPr>
-          <p:nvPr>
-            <p:ph type="ftr" sz="quarter" idx="11"/>
-          </p:nvPr>
-        </p:nvSpPr>
-        <p:spPr>
-          <a:xfrm>
-            <a:off x="3359150" y="6507212"/>
-            <a:ext cx="6379210" cy="153888"/>
-          </a:xfrm>
-        </p:spPr>
-        <p:txBody>
-          <a:bodyPr rtlCol="0"/>
-          <a:lstStyle/>
-          <a:p>
-            <a:pPr rtl="0"/>
-            <a:r>
-              <a:rPr lang="pl-PL"/>
-              <a:t>Przykładowy tekst stopki</a:t>
-            </a:r>
-          </a:p>
-        </p:txBody>
-      </p:sp>
-      <p:sp>
-        <p:nvSpPr>
-          <p:cNvPr id="6" name="Numer slajdu — symbol zastępczy 5">
-            <a:extLst>
-              <a:ext uri="{FF2B5EF4-FFF2-40B4-BE49-F238E27FC236}">
-                <a16:creationId xmlns:a16="http://schemas.microsoft.com/office/drawing/2014/main" id="{9ED907F8-C614-4D59-A03F-BF9CD5E35703}"/>
-              </a:ext>
-            </a:extLst>
-          </p:cNvPr>
-          <p:cNvSpPr>
-            <a:spLocks noGrp="1"/>
-          </p:cNvSpPr>
-          <p:nvPr>
-            <p:ph type="sldNum" sz="quarter" idx="12"/>
-          </p:nvPr>
-        </p:nvSpPr>
-        <p:spPr>
-          <a:xfrm>
-            <a:off x="9948863" y="6507212"/>
-            <a:ext cx="1692274" cy="153888"/>
-          </a:xfrm>
-        </p:spPr>
-        <p:txBody>
-          <a:bodyPr rtlCol="0"/>
-          <a:lstStyle/>
-          <a:p>
-            <a:pPr rtl="0"/>
-            <a:fld id="{DBA1B0FB-D917-4C8C-928F-313BD683BF39}" type="slidenum">
-              <a:rPr lang="pl-PL" smtClean="0"/>
-              <a:pPr rtl="0"/>
-              <a:t>8</a:t>
-            </a:fld>
-            <a:endParaRPr lang="pl-PL"/>
-          </a:p>
-        </p:txBody>
-      </p:sp>
-      <p:pic>
-        <p:nvPicPr>
-          <p:cNvPr id="23" name="Obraz — symbol zastępczy 22" descr="Osoba rysująca na białej tablicy">
-            <a:extLst>
-              <a:ext uri="{FF2B5EF4-FFF2-40B4-BE49-F238E27FC236}">
-                <a16:creationId xmlns:a16="http://schemas.microsoft.com/office/drawing/2014/main" id="{2B3C4F95-A0FA-45D9-BF43-1C398F65B891}"/>
-              </a:ext>
-            </a:extLst>
-          </p:cNvPr>
-          <p:cNvPicPr>
-            <a:picLocks noGrp="1" noChangeAspect="1"/>
-          </p:cNvPicPr>
-          <p:nvPr>
-            <p:ph type="pic" sz="quarter" idx="15"/>
-          </p:nvPr>
-        </p:nvPicPr>
-        <p:blipFill rotWithShape="1">
-          <a:blip r:embed="rId6" cstate="screen">
-            <a:extLst>
-              <a:ext uri="{28A0092B-C50C-407E-A947-70E740481C1C}">
-                <a14:useLocalDpi xmlns:a14="http://schemas.microsoft.com/office/drawing/2010/main" val="0"/>
-              </a:ext>
-            </a:extLst>
-          </a:blip>
-          <a:srcRect t="42" b="42"/>
-          <a:stretch/>
-        </p:blipFill>
-        <p:spPr>
-          <a:xfrm>
-            <a:off x="6083808" y="0"/>
-            <a:ext cx="3054096" cy="3776472"/>
-          </a:xfrm>
-        </p:spPr>
-      </p:pic>
-      <p:sp>
-        <p:nvSpPr>
-          <p:cNvPr id="12" name="Zawartość — symbol zastępczy 11">
-            <a:extLst>
-              <a:ext uri="{FF2B5EF4-FFF2-40B4-BE49-F238E27FC236}">
-                <a16:creationId xmlns:a16="http://schemas.microsoft.com/office/drawing/2014/main" id="{E5127060-CDBF-435F-9009-A5451CCE305D}"/>
-              </a:ext>
-            </a:extLst>
-          </p:cNvPr>
-          <p:cNvSpPr>
-            <a:spLocks noGrp="1"/>
-          </p:cNvSpPr>
-          <p:nvPr>
-            <p:ph sz="quarter" idx="15"/>
-          </p:nvPr>
-        </p:nvSpPr>
-        <p:spPr>
-          <a:xfrm>
-            <a:off x="5164783" y="4508500"/>
-            <a:ext cx="6319192" cy="1563688"/>
-          </a:xfrm>
-          <a:noFill/>
-        </p:spPr>
-        <p:txBody>
-          <a:bodyPr rtlCol="0">
-            <a:noAutofit/>
-          </a:bodyPr>
-          <a:lstStyle/>
-          <a:p>
-            <a:pPr rtl="0"/>
-            <a:r>
-              <a:rPr lang="pl-PL" sz="1700" dirty="0"/>
-              <a:t>W programie PowerPoint możesz tworzyć prezentacje i udostępniać je innym osobom, niezależnie od tego, gdzie się znajdują. Tutaj wpisz jakiś tekst, aby rozpocząć. Do tego szablonu można również dodawać obrazy, grafiki i klipy wideo. Zapisuj prezentacje w usłudze OneDrive i uzyskuj do nich dostęp z komputera, tabletu lub telefonu. </a:t>
-            </a:r>
-          </a:p>
-        </p:txBody>
-      </p:sp>
-    </p:spTree>
-    <p:extLst>
-      <p:ext uri="{BB962C8B-B14F-4D97-AF65-F5344CB8AC3E}">
-        <p14:creationId xmlns:p14="http://schemas.microsoft.com/office/powerpoint/2010/main" val="2158886557"/>
-      </p:ext>
-    </p:extLst>
-  </p:cSld>
-  <p:clrMapOvr>
-    <a:masterClrMapping/>
-  </p:clrMapOvr>
-</p:sld>
-</file>
-
-<file path=ppt/slides/slide9.xml><?xml version="1.0" encoding="utf-8"?>
-<p:sld xmlns:a="http://schemas.openxmlformats.org/drawingml/2006/main" xmlns:r="http://schemas.openxmlformats.org/officeDocument/2006/relationships" xmlns:p="http://schemas.openxmlformats.org/presentationml/2006/main">
-  <p:cSld>
-    <p:spTree>
-      <p:nvGrpSpPr>
-        <p:cNvPr id="1" name=""/>
-        <p:cNvGrpSpPr/>
-        <p:nvPr/>
-      </p:nvGrpSpPr>
-      <p:grpSpPr>
-        <a:xfrm>
-          <a:off x="0" y="0"/>
-          <a:ext cx="0" cy="0"/>
-          <a:chOff x="0" y="0"/>
-          <a:chExt cx="0" cy="0"/>
-        </a:xfrm>
-      </p:grpSpPr>
-      <p:sp>
-        <p:nvSpPr>
-          <p:cNvPr id="14" name="Tytuł 13">
-            <a:extLst>
-              <a:ext uri="{FF2B5EF4-FFF2-40B4-BE49-F238E27FC236}">
-                <a16:creationId xmlns:a16="http://schemas.microsoft.com/office/drawing/2014/main" id="{C15EE852-24F1-4643-8082-AB45CFF2BA10}"/>
-              </a:ext>
-            </a:extLst>
-          </p:cNvPr>
-          <p:cNvSpPr>
-            <a:spLocks noGrp="1"/>
-          </p:cNvSpPr>
-          <p:nvPr>
-            <p:ph type="title"/>
-          </p:nvPr>
-        </p:nvSpPr>
-        <p:spPr>
-          <a:xfrm>
-            <a:off x="550864" y="549275"/>
-            <a:ext cx="3566160" cy="3384550"/>
-          </a:xfrm>
-        </p:spPr>
-        <p:txBody>
-          <a:bodyPr rtlCol="0">
-            <a:noAutofit/>
-          </a:bodyPr>
-          <a:lstStyle/>
-          <a:p>
-            <a:pPr rtl="0"/>
-            <a:r>
-              <a:rPr lang="pl-PL" sz="3600" dirty="0"/>
-              <a:t>Najlepszym sposobem na rozpoczęcie jest skończenie </a:t>
-            </a:r>
-            <a:br>
-              <a:rPr lang="pl-PL" sz="3600" dirty="0"/>
-            </a:br>
-            <a:r>
-              <a:rPr lang="pl-PL" sz="3600" dirty="0"/>
-              <a:t>z mówieniem </a:t>
-            </a:r>
-            <a:br>
-              <a:rPr lang="pl-PL" sz="3600" dirty="0"/>
-            </a:br>
-            <a:r>
-              <a:rPr lang="pl-PL" sz="3600" dirty="0"/>
-              <a:t>i przystąpienie </a:t>
-            </a:r>
-            <a:br>
-              <a:rPr lang="pl-PL" sz="3600" dirty="0"/>
-            </a:br>
-            <a:r>
-              <a:rPr lang="pl-PL" sz="3600" dirty="0"/>
-              <a:t>do działania.</a:t>
-            </a:r>
-          </a:p>
-        </p:txBody>
-      </p:sp>
-      <p:sp>
-        <p:nvSpPr>
-          <p:cNvPr id="15" name="Zawartość — symbol zastępczy 14">
-            <a:extLst>
-              <a:ext uri="{FF2B5EF4-FFF2-40B4-BE49-F238E27FC236}">
-                <a16:creationId xmlns:a16="http://schemas.microsoft.com/office/drawing/2014/main" id="{4139825C-53C7-44F4-A064-9795CECD081B}"/>
-              </a:ext>
-            </a:extLst>
-          </p:cNvPr>
-          <p:cNvSpPr>
-            <a:spLocks noGrp="1"/>
-          </p:cNvSpPr>
-          <p:nvPr>
-            <p:ph sz="quarter" idx="15"/>
-          </p:nvPr>
-        </p:nvSpPr>
-        <p:spPr>
-          <a:xfrm>
-            <a:off x="550863" y="4097338"/>
-            <a:ext cx="3565524" cy="2351087"/>
-          </a:xfrm>
-        </p:spPr>
-        <p:txBody>
-          <a:bodyPr rtlCol="0"/>
-          <a:lstStyle/>
-          <a:p>
-            <a:pPr rtl="0"/>
-            <a:r>
-              <a:rPr lang="pl-PL" dirty="0"/>
-              <a:t>Walt Disney</a:t>
-            </a:r>
-          </a:p>
-          <a:p>
-            <a:pPr rtl="0"/>
-            <a:endParaRPr lang="pl-PL" dirty="0"/>
-          </a:p>
-        </p:txBody>
-      </p:sp>
-      <p:pic>
-        <p:nvPicPr>
-          <p:cNvPr id="18" name="Obraz — symbol zastępczy 17" descr="Osoba rysująca na białej tablicy">
-            <a:extLst>
-              <a:ext uri="{FF2B5EF4-FFF2-40B4-BE49-F238E27FC236}">
-                <a16:creationId xmlns:a16="http://schemas.microsoft.com/office/drawing/2014/main" id="{301557C2-9072-409B-88EC-E8577CEFCAFB}"/>
-              </a:ext>
-            </a:extLst>
-          </p:cNvPr>
-          <p:cNvPicPr>
-            <a:picLocks noGrp="1" noChangeAspect="1"/>
-          </p:cNvPicPr>
-          <p:nvPr>
-            <p:ph type="pic" sz="quarter" idx="13"/>
-          </p:nvPr>
-        </p:nvPicPr>
-        <p:blipFill rotWithShape="1">
-          <a:blip r:embed="rId2" cstate="screen">
-            <a:extLst>
-              <a:ext uri="{28A0092B-C50C-407E-A947-70E740481C1C}">
-                <a14:useLocalDpi xmlns:a14="http://schemas.microsoft.com/office/drawing/2010/main" val="0"/>
-              </a:ext>
-            </a:extLst>
-          </a:blip>
-          <a:srcRect/>
-          <a:stretch/>
-        </p:blipFill>
-        <p:spPr>
-          <a:xfrm>
-            <a:off x="5535809" y="656633"/>
-            <a:ext cx="5132388" cy="5132388"/>
-          </a:xfrm>
-        </p:spPr>
-      </p:pic>
-      <p:sp>
-        <p:nvSpPr>
-          <p:cNvPr id="19" name="Data — symbol zastępczy 18">
-            <a:extLst>
-              <a:ext uri="{FF2B5EF4-FFF2-40B4-BE49-F238E27FC236}">
-                <a16:creationId xmlns:a16="http://schemas.microsoft.com/office/drawing/2014/main" id="{386DB667-0553-4FB8-B0E0-776539934AFF}"/>
-              </a:ext>
-            </a:extLst>
-          </p:cNvPr>
-          <p:cNvSpPr>
-            <a:spLocks noGrp="1"/>
-          </p:cNvSpPr>
-          <p:nvPr>
-            <p:ph type="dt" sz="half" idx="10"/>
-          </p:nvPr>
-        </p:nvSpPr>
-        <p:spPr>
-          <a:xfrm>
-            <a:off x="550863" y="6507212"/>
-            <a:ext cx="2628900" cy="153888"/>
-          </a:xfrm>
-        </p:spPr>
-        <p:txBody>
-          <a:bodyPr rtlCol="0"/>
-          <a:lstStyle/>
-          <a:p>
-            <a:pPr rtl="0"/>
-            <a:r>
-              <a:rPr lang="pl-PL"/>
-              <a:t>Wtorek, 2 lutego 20XX</a:t>
-            </a:r>
-            <a:endParaRPr lang="pl-PL" dirty="0"/>
-          </a:p>
-        </p:txBody>
-      </p:sp>
-      <p:sp>
-        <p:nvSpPr>
-          <p:cNvPr id="20" name="Stopka — symbol zastępczy 19">
-            <a:extLst>
-              <a:ext uri="{FF2B5EF4-FFF2-40B4-BE49-F238E27FC236}">
-                <a16:creationId xmlns:a16="http://schemas.microsoft.com/office/drawing/2014/main" id="{C77C6228-C5A8-44DC-ABD7-A22A4475D3DF}"/>
-              </a:ext>
-            </a:extLst>
-          </p:cNvPr>
-          <p:cNvSpPr>
-            <a:spLocks noGrp="1"/>
-          </p:cNvSpPr>
-          <p:nvPr>
-            <p:ph type="ftr" sz="quarter" idx="11"/>
-          </p:nvPr>
-        </p:nvSpPr>
-        <p:spPr>
-          <a:xfrm>
-            <a:off x="3359150" y="6507212"/>
-            <a:ext cx="6379210" cy="153888"/>
-          </a:xfrm>
-        </p:spPr>
-        <p:txBody>
-          <a:bodyPr rtlCol="0"/>
-          <a:lstStyle/>
-          <a:p>
-            <a:pPr rtl="0"/>
-            <a:r>
-              <a:rPr lang="pl-PL"/>
-              <a:t>Przykładowy tekst stopki</a:t>
-            </a:r>
-          </a:p>
-        </p:txBody>
-      </p:sp>
-      <p:sp>
-        <p:nvSpPr>
-          <p:cNvPr id="21" name="Numer slajdu — symbol zastępczy 20">
-            <a:extLst>
-              <a:ext uri="{FF2B5EF4-FFF2-40B4-BE49-F238E27FC236}">
-                <a16:creationId xmlns:a16="http://schemas.microsoft.com/office/drawing/2014/main" id="{1C563B34-DD53-4FB1-B8C2-8914E01C6365}"/>
-              </a:ext>
-            </a:extLst>
-          </p:cNvPr>
-          <p:cNvSpPr>
-            <a:spLocks noGrp="1"/>
-          </p:cNvSpPr>
-          <p:nvPr>
-            <p:ph type="sldNum" sz="quarter" idx="12"/>
-          </p:nvPr>
-        </p:nvSpPr>
-        <p:spPr>
-          <a:xfrm>
-            <a:off x="9948863" y="6507212"/>
-            <a:ext cx="1692274" cy="153888"/>
-          </a:xfrm>
-        </p:spPr>
-        <p:txBody>
-          <a:bodyPr rtlCol="0"/>
-          <a:lstStyle/>
-          <a:p>
-            <a:pPr rtl="0"/>
-            <a:fld id="{DBA1B0FB-D917-4C8C-928F-313BD683BF39}" type="slidenum">
-              <a:rPr lang="pl-PL" smtClean="0"/>
-              <a:pPr rtl="0"/>
-              <a:t>9</a:t>
-            </a:fld>
-            <a:endParaRPr lang="pl-PL"/>
-          </a:p>
-        </p:txBody>
-      </p:sp>
-    </p:spTree>
-    <p:extLst>
-      <p:ext uri="{BB962C8B-B14F-4D97-AF65-F5344CB8AC3E}">
-        <p14:creationId xmlns:p14="http://schemas.microsoft.com/office/powerpoint/2010/main" val="395518310"/>
       </p:ext>
     </p:extLst>
   </p:cSld>
@@ -25877,6 +26967,34 @@
 </file>
 
 <file path=customXml/item1.xml><?xml version="1.0" encoding="utf-8"?>
+<?mso-contentType ?>
+<FormTemplates xmlns="http://schemas.microsoft.com/sharepoint/v3/contenttype/forms">
+  <Display>DocumentLibraryForm</Display>
+  <Edit>DocumentLibraryForm</Edit>
+  <New>DocumentLibraryForm</New>
+</FormTemplates>
+</file>
+
+<file path=customXml/item2.xml><?xml version="1.0" encoding="utf-8"?>
+<p:properties xmlns:p="http://schemas.microsoft.com/office/2006/metadata/properties" xmlns:xsi="http://www.w3.org/2001/XMLSchema-instance" xmlns:pc="http://schemas.microsoft.com/office/infopath/2007/PartnerControls">
+  <documentManagement>
+    <_ip_UnifiedCompliancePolicyUIAction xmlns="http://schemas.microsoft.com/sharepoint/v3" xsi:nil="true"/>
+    <Image xmlns="71af3243-3dd4-4a8d-8c0d-dd76da1f02a5">
+      <Url xsi:nil="true"/>
+      <Description xsi:nil="true"/>
+    </Image>
+    <Status xmlns="71af3243-3dd4-4a8d-8c0d-dd76da1f02a5">Not started</Status>
+    <_ip_UnifiedCompliancePolicyProperties xmlns="http://schemas.microsoft.com/sharepoint/v3" xsi:nil="true"/>
+    <lcf76f155ced4ddcb4097134ff3c332f xmlns="71af3243-3dd4-4a8d-8c0d-dd76da1f02a5">
+      <Terms xmlns="http://schemas.microsoft.com/office/infopath/2007/PartnerControls"/>
+    </lcf76f155ced4ddcb4097134ff3c332f>
+    <TaxCatchAll xmlns="230e9df3-be65-4c73-a93b-d1236ebd677e"/>
+    <MediaServiceKeyPoints xmlns="71af3243-3dd4-4a8d-8c0d-dd76da1f02a5" xsi:nil="true"/>
+  </documentManagement>
+</p:properties>
+</file>
+
+<file path=customXml/item3.xml><?xml version="1.0" encoding="utf-8"?>
 <ct:contentTypeSchema xmlns:ct="http://schemas.microsoft.com/office/2006/metadata/contentType" xmlns:ma="http://schemas.microsoft.com/office/2006/metadata/properties/metaAttributes" ct:_="" ma:_="" ma:contentTypeName="Document" ma:contentTypeID="0x01010079F111ED35F8CC479449609E8A0923A6" ma:contentTypeVersion="18" ma:contentTypeDescription="Create a new document." ma:contentTypeScope="" ma:versionID="22a266b9fa9a230c5a512669d8b298c3">
   <xsd:schema xmlns:xsd="http://www.w3.org/2001/XMLSchema" xmlns:xs="http://www.w3.org/2001/XMLSchema" xmlns:p="http://schemas.microsoft.com/office/2006/metadata/properties" xmlns:ns1="http://schemas.microsoft.com/sharepoint/v3" xmlns:ns2="71af3243-3dd4-4a8d-8c0d-dd76da1f02a5" xmlns:ns3="16c05727-aa75-4e4a-9b5f-8a80a1165891" xmlns:ns4="230e9df3-be65-4c73-a93b-d1236ebd677e" targetNamespace="http://schemas.microsoft.com/office/2006/metadata/properties" ma:root="true" ma:fieldsID="eddc33fff6b14141ee5c74a0d29ea6a1" ns1:_="" ns2:_="" ns3:_="" ns4:_="">
     <xsd:import namespace="http://schemas.microsoft.com/sharepoint/v3"/>
@@ -26152,35 +27270,27 @@
 </ct:contentTypeSchema>
 </file>
 
-<file path=customXml/item2.xml><?xml version="1.0" encoding="utf-8"?>
-<p:properties xmlns:p="http://schemas.microsoft.com/office/2006/metadata/properties" xmlns:xsi="http://www.w3.org/2001/XMLSchema-instance" xmlns:pc="http://schemas.microsoft.com/office/infopath/2007/PartnerControls">
-  <documentManagement>
-    <_ip_UnifiedCompliancePolicyUIAction xmlns="http://schemas.microsoft.com/sharepoint/v3" xsi:nil="true"/>
-    <Image xmlns="71af3243-3dd4-4a8d-8c0d-dd76da1f02a5">
-      <Url xsi:nil="true"/>
-      <Description xsi:nil="true"/>
-    </Image>
-    <Status xmlns="71af3243-3dd4-4a8d-8c0d-dd76da1f02a5">Not started</Status>
-    <_ip_UnifiedCompliancePolicyProperties xmlns="http://schemas.microsoft.com/sharepoint/v3" xsi:nil="true"/>
-    <lcf76f155ced4ddcb4097134ff3c332f xmlns="71af3243-3dd4-4a8d-8c0d-dd76da1f02a5">
-      <Terms xmlns="http://schemas.microsoft.com/office/infopath/2007/PartnerControls"/>
-    </lcf76f155ced4ddcb4097134ff3c332f>
-    <TaxCatchAll xmlns="230e9df3-be65-4c73-a93b-d1236ebd677e"/>
-    <MediaServiceKeyPoints xmlns="71af3243-3dd4-4a8d-8c0d-dd76da1f02a5" xsi:nil="true"/>
-  </documentManagement>
-</p:properties>
+<file path=customXml/itemProps1.xml><?xml version="1.0" encoding="utf-8"?>
+<ds:datastoreItem xmlns:ds="http://schemas.openxmlformats.org/officeDocument/2006/customXml" ds:itemID="{904751AB-E840-446F-8D49-E697067EC887}">
+  <ds:schemaRefs>
+    <ds:schemaRef ds:uri="http://schemas.microsoft.com/sharepoint/v3/contenttype/forms"/>
+  </ds:schemaRefs>
+</ds:datastoreItem>
 </file>
 
-<file path=customXml/item3.xml><?xml version="1.0" encoding="utf-8"?>
-<?mso-contentType ?>
-<FormTemplates xmlns="http://schemas.microsoft.com/sharepoint/v3/contenttype/forms">
-  <Display>DocumentLibraryForm</Display>
-  <Edit>DocumentLibraryForm</Edit>
-  <New>DocumentLibraryForm</New>
-</FormTemplates>
+<file path=customXml/itemProps2.xml><?xml version="1.0" encoding="utf-8"?>
+<ds:datastoreItem xmlns:ds="http://schemas.openxmlformats.org/officeDocument/2006/customXml" ds:itemID="{50811A92-D464-4AC4-A396-BA73B10CEEAC}">
+  <ds:schemaRefs>
+    <ds:schemaRef ds:uri="http://schemas.microsoft.com/office/2006/metadata/properties"/>
+    <ds:schemaRef ds:uri="http://schemas.microsoft.com/office/infopath/2007/PartnerControls"/>
+    <ds:schemaRef ds:uri="http://schemas.microsoft.com/sharepoint/v3"/>
+    <ds:schemaRef ds:uri="71af3243-3dd4-4a8d-8c0d-dd76da1f02a5"/>
+    <ds:schemaRef ds:uri="230e9df3-be65-4c73-a93b-d1236ebd677e"/>
+  </ds:schemaRefs>
+</ds:datastoreItem>
 </file>
 
-<file path=customXml/itemProps1.xml><?xml version="1.0" encoding="utf-8"?>
+<file path=customXml/itemProps3.xml><?xml version="1.0" encoding="utf-8"?>
 <ds:datastoreItem xmlns:ds="http://schemas.openxmlformats.org/officeDocument/2006/customXml" ds:itemID="{DE4876F9-7AE1-498D-B8FE-1E3AD703D2AF}">
   <ds:schemaRefs>
     <ds:schemaRef ds:uri="http://schemas.microsoft.com/office/2006/metadata/contentType"/>
@@ -26201,26 +27311,6 @@
 </ds:datastoreItem>
 </file>
 
-<file path=customXml/itemProps2.xml><?xml version="1.0" encoding="utf-8"?>
-<ds:datastoreItem xmlns:ds="http://schemas.openxmlformats.org/officeDocument/2006/customXml" ds:itemID="{50811A92-D464-4AC4-A396-BA73B10CEEAC}">
-  <ds:schemaRefs>
-    <ds:schemaRef ds:uri="http://schemas.microsoft.com/office/2006/metadata/properties"/>
-    <ds:schemaRef ds:uri="http://schemas.microsoft.com/office/infopath/2007/PartnerControls"/>
-    <ds:schemaRef ds:uri="http://schemas.microsoft.com/sharepoint/v3"/>
-    <ds:schemaRef ds:uri="71af3243-3dd4-4a8d-8c0d-dd76da1f02a5"/>
-    <ds:schemaRef ds:uri="230e9df3-be65-4c73-a93b-d1236ebd677e"/>
-  </ds:schemaRefs>
-</ds:datastoreItem>
-</file>
-
-<file path=customXml/itemProps3.xml><?xml version="1.0" encoding="utf-8"?>
-<ds:datastoreItem xmlns:ds="http://schemas.openxmlformats.org/officeDocument/2006/customXml" ds:itemID="{904751AB-E840-446F-8D49-E697067EC887}">
-  <ds:schemaRefs>
-    <ds:schemaRef ds:uri="http://schemas.microsoft.com/sharepoint/v3/contenttype/forms"/>
-  </ds:schemaRefs>
-</ds:datastoreItem>
-</file>
-
 <file path=docMetadata/LabelInfo.xml><?xml version="1.0" encoding="utf-8"?>
 <clbl:labelList xmlns:clbl="http://schemas.microsoft.com/office/2020/mipLabelMetadata">
   <clbl:label id="{f42aa342-8706-4288-bd11-ebb85995028c}" enabled="1" method="Standard" siteId="{72f988bf-86f1-41af-91ab-2d7cd011db47}" contentBits="0" removed="0"/>

</xml_diff>